<commit_message>
Planificar fue pasado a Doing.
</commit_message>
<xml_diff>
--- a/Iteracion1/TaskBoard.pptx
+++ b/Iteracion1/TaskBoard.pptx
@@ -4,8 +4,12 @@
   <p:sldMasterIdLst>
     <p:sldMasterId id="2147483648" r:id="rId1"/>
   </p:sldMasterIdLst>
+  <p:notesMasterIdLst>
+    <p:notesMasterId r:id="rId4"/>
+  </p:notesMasterIdLst>
   <p:sldIdLst>
     <p:sldId id="256" r:id="rId2"/>
+    <p:sldId id="257" r:id="rId3"/>
   </p:sldIdLst>
   <p:sldSz cx="12192000" cy="6858000"/>
   <p:notesSz cx="6858000" cy="9144000"/>
@@ -104,7 +108,462 @@
       </a:defRPr>
     </a:lvl9pPr>
   </p:defaultTextStyle>
+  <p:extLst>
+    <p:ext uri="{EFAFB233-063F-42B5-8137-9DF3F51BA10A}">
+      <p15:sldGuideLst xmlns:p15="http://schemas.microsoft.com/office/powerpoint/2012/main"/>
+    </p:ext>
+  </p:extLst>
 </p:presentation>
+</file>
+
+<file path=ppt/notesMasters/notesMaster1.xml><?xml version="1.0" encoding="utf-8"?>
+<p:notesMaster xmlns:a="http://schemas.openxmlformats.org/drawingml/2006/main" xmlns:r="http://schemas.openxmlformats.org/officeDocument/2006/relationships" xmlns:p="http://schemas.openxmlformats.org/presentationml/2006/main">
+  <p:cSld>
+    <p:bg>
+      <p:bgRef idx="1001">
+        <a:schemeClr val="bg1"/>
+      </p:bgRef>
+    </p:bg>
+    <p:spTree>
+      <p:nvGrpSpPr>
+        <p:cNvPr id="1" name=""/>
+        <p:cNvGrpSpPr/>
+        <p:nvPr/>
+      </p:nvGrpSpPr>
+      <p:grpSpPr>
+        <a:xfrm>
+          <a:off x="0" y="0"/>
+          <a:ext cx="0" cy="0"/>
+          <a:chOff x="0" y="0"/>
+          <a:chExt cx="0" cy="0"/>
+        </a:xfrm>
+      </p:grpSpPr>
+      <p:sp>
+        <p:nvSpPr>
+          <p:cNvPr id="2" name="Marcador de encabezado 1"/>
+          <p:cNvSpPr>
+            <a:spLocks noGrp="1"/>
+          </p:cNvSpPr>
+          <p:nvPr>
+            <p:ph type="hdr" sz="quarter"/>
+          </p:nvPr>
+        </p:nvSpPr>
+        <p:spPr>
+          <a:xfrm>
+            <a:off x="0" y="0"/>
+            <a:ext cx="2971800" cy="458788"/>
+          </a:xfrm>
+          <a:prstGeom prst="rect">
+            <a:avLst/>
+          </a:prstGeom>
+        </p:spPr>
+        <p:txBody>
+          <a:bodyPr vert="horz" lIns="91440" tIns="45720" rIns="91440" bIns="45720" rtlCol="0"/>
+          <a:lstStyle>
+            <a:lvl1pPr algn="l">
+              <a:defRPr sz="1200"/>
+            </a:lvl1pPr>
+          </a:lstStyle>
+          <a:p>
+            <a:endParaRPr lang="en-US"/>
+          </a:p>
+        </p:txBody>
+      </p:sp>
+      <p:sp>
+        <p:nvSpPr>
+          <p:cNvPr id="3" name="Marcador de fecha 2"/>
+          <p:cNvSpPr>
+            <a:spLocks noGrp="1"/>
+          </p:cNvSpPr>
+          <p:nvPr>
+            <p:ph type="dt" idx="1"/>
+          </p:nvPr>
+        </p:nvSpPr>
+        <p:spPr>
+          <a:xfrm>
+            <a:off x="3884613" y="0"/>
+            <a:ext cx="2971800" cy="458788"/>
+          </a:xfrm>
+          <a:prstGeom prst="rect">
+            <a:avLst/>
+          </a:prstGeom>
+        </p:spPr>
+        <p:txBody>
+          <a:bodyPr vert="horz" lIns="91440" tIns="45720" rIns="91440" bIns="45720" rtlCol="0"/>
+          <a:lstStyle>
+            <a:lvl1pPr algn="r">
+              <a:defRPr sz="1200"/>
+            </a:lvl1pPr>
+          </a:lstStyle>
+          <a:p>
+            <a:fld id="{8B45D529-B2FB-4235-85C4-556325968B0B}" type="datetimeFigureOut">
+              <a:rPr lang="en-US" smtClean="0"/>
+              <a:t>28-Sep-21</a:t>
+            </a:fld>
+            <a:endParaRPr lang="en-US"/>
+          </a:p>
+        </p:txBody>
+      </p:sp>
+      <p:sp>
+        <p:nvSpPr>
+          <p:cNvPr id="4" name="Marcador de imagen de diapositiva 3"/>
+          <p:cNvSpPr>
+            <a:spLocks noGrp="1" noRot="1" noChangeAspect="1"/>
+          </p:cNvSpPr>
+          <p:nvPr>
+            <p:ph type="sldImg" idx="2"/>
+          </p:nvPr>
+        </p:nvSpPr>
+        <p:spPr>
+          <a:xfrm>
+            <a:off x="685800" y="1143000"/>
+            <a:ext cx="5486400" cy="3086100"/>
+          </a:xfrm>
+          <a:prstGeom prst="rect">
+            <a:avLst/>
+          </a:prstGeom>
+          <a:noFill/>
+          <a:ln w="12700">
+            <a:solidFill>
+              <a:prstClr val="black"/>
+            </a:solidFill>
+          </a:ln>
+        </p:spPr>
+        <p:txBody>
+          <a:bodyPr vert="horz" lIns="91440" tIns="45720" rIns="91440" bIns="45720" rtlCol="0" anchor="ctr"/>
+          <a:lstStyle/>
+          <a:p>
+            <a:endParaRPr lang="en-US"/>
+          </a:p>
+        </p:txBody>
+      </p:sp>
+      <p:sp>
+        <p:nvSpPr>
+          <p:cNvPr id="5" name="Marcador de notas 4"/>
+          <p:cNvSpPr>
+            <a:spLocks noGrp="1"/>
+          </p:cNvSpPr>
+          <p:nvPr>
+            <p:ph type="body" sz="quarter" idx="3"/>
+          </p:nvPr>
+        </p:nvSpPr>
+        <p:spPr>
+          <a:xfrm>
+            <a:off x="685800" y="4400550"/>
+            <a:ext cx="5486400" cy="3600450"/>
+          </a:xfrm>
+          <a:prstGeom prst="rect">
+            <a:avLst/>
+          </a:prstGeom>
+        </p:spPr>
+        <p:txBody>
+          <a:bodyPr vert="horz" lIns="91440" tIns="45720" rIns="91440" bIns="45720" rtlCol="0"/>
+          <a:lstStyle/>
+          <a:p>
+            <a:pPr lvl="0"/>
+            <a:r>
+              <a:rPr lang="es-ES"/>
+              <a:t>Haga clic para modificar los estilos de texto del patrón</a:t>
+            </a:r>
+          </a:p>
+          <a:p>
+            <a:pPr lvl="1"/>
+            <a:r>
+              <a:rPr lang="es-ES"/>
+              <a:t>Segundo nivel</a:t>
+            </a:r>
+          </a:p>
+          <a:p>
+            <a:pPr lvl="2"/>
+            <a:r>
+              <a:rPr lang="es-ES"/>
+              <a:t>Tercer nivel</a:t>
+            </a:r>
+          </a:p>
+          <a:p>
+            <a:pPr lvl="3"/>
+            <a:r>
+              <a:rPr lang="es-ES"/>
+              <a:t>Cuarto nivel</a:t>
+            </a:r>
+          </a:p>
+          <a:p>
+            <a:pPr lvl="4"/>
+            <a:r>
+              <a:rPr lang="es-ES"/>
+              <a:t>Quinto nivel</a:t>
+            </a:r>
+            <a:endParaRPr lang="en-US"/>
+          </a:p>
+        </p:txBody>
+      </p:sp>
+      <p:sp>
+        <p:nvSpPr>
+          <p:cNvPr id="6" name="Marcador de pie de página 5"/>
+          <p:cNvSpPr>
+            <a:spLocks noGrp="1"/>
+          </p:cNvSpPr>
+          <p:nvPr>
+            <p:ph type="ftr" sz="quarter" idx="4"/>
+          </p:nvPr>
+        </p:nvSpPr>
+        <p:spPr>
+          <a:xfrm>
+            <a:off x="0" y="8685213"/>
+            <a:ext cx="2971800" cy="458787"/>
+          </a:xfrm>
+          <a:prstGeom prst="rect">
+            <a:avLst/>
+          </a:prstGeom>
+        </p:spPr>
+        <p:txBody>
+          <a:bodyPr vert="horz" lIns="91440" tIns="45720" rIns="91440" bIns="45720" rtlCol="0" anchor="b"/>
+          <a:lstStyle>
+            <a:lvl1pPr algn="l">
+              <a:defRPr sz="1200"/>
+            </a:lvl1pPr>
+          </a:lstStyle>
+          <a:p>
+            <a:endParaRPr lang="en-US"/>
+          </a:p>
+        </p:txBody>
+      </p:sp>
+      <p:sp>
+        <p:nvSpPr>
+          <p:cNvPr id="7" name="Marcador de número de diapositiva 6"/>
+          <p:cNvSpPr>
+            <a:spLocks noGrp="1"/>
+          </p:cNvSpPr>
+          <p:nvPr>
+            <p:ph type="sldNum" sz="quarter" idx="5"/>
+          </p:nvPr>
+        </p:nvSpPr>
+        <p:spPr>
+          <a:xfrm>
+            <a:off x="3884613" y="8685213"/>
+            <a:ext cx="2971800" cy="458787"/>
+          </a:xfrm>
+          <a:prstGeom prst="rect">
+            <a:avLst/>
+          </a:prstGeom>
+        </p:spPr>
+        <p:txBody>
+          <a:bodyPr vert="horz" lIns="91440" tIns="45720" rIns="91440" bIns="45720" rtlCol="0" anchor="b"/>
+          <a:lstStyle>
+            <a:lvl1pPr algn="r">
+              <a:defRPr sz="1200"/>
+            </a:lvl1pPr>
+          </a:lstStyle>
+          <a:p>
+            <a:fld id="{90C5D989-6414-4EC9-97AC-BCF628C5D8B9}" type="slidenum">
+              <a:rPr lang="en-US" smtClean="0"/>
+              <a:t>‹Nº›</a:t>
+            </a:fld>
+            <a:endParaRPr lang="en-US"/>
+          </a:p>
+        </p:txBody>
+      </p:sp>
+    </p:spTree>
+    <p:extLst>
+      <p:ext uri="{BB962C8B-B14F-4D97-AF65-F5344CB8AC3E}">
+        <p14:creationId xmlns:p14="http://schemas.microsoft.com/office/powerpoint/2010/main" val="4076593138"/>
+      </p:ext>
+    </p:extLst>
+  </p:cSld>
+  <p:clrMap bg1="lt1" tx1="dk1" bg2="lt2" tx2="dk2" accent1="accent1" accent2="accent2" accent3="accent3" accent4="accent4" accent5="accent5" accent6="accent6" hlink="hlink" folHlink="folHlink"/>
+  <p:notesStyle>
+    <a:lvl1pPr marL="0" algn="l" defTabSz="914400" rtl="0" eaLnBrk="1" latinLnBrk="0" hangingPunct="1">
+      <a:defRPr sz="1200" kern="1200">
+        <a:solidFill>
+          <a:schemeClr val="tx1"/>
+        </a:solidFill>
+        <a:latin typeface="+mn-lt"/>
+        <a:ea typeface="+mn-ea"/>
+        <a:cs typeface="+mn-cs"/>
+      </a:defRPr>
+    </a:lvl1pPr>
+    <a:lvl2pPr marL="457200" algn="l" defTabSz="914400" rtl="0" eaLnBrk="1" latinLnBrk="0" hangingPunct="1">
+      <a:defRPr sz="1200" kern="1200">
+        <a:solidFill>
+          <a:schemeClr val="tx1"/>
+        </a:solidFill>
+        <a:latin typeface="+mn-lt"/>
+        <a:ea typeface="+mn-ea"/>
+        <a:cs typeface="+mn-cs"/>
+      </a:defRPr>
+    </a:lvl2pPr>
+    <a:lvl3pPr marL="914400" algn="l" defTabSz="914400" rtl="0" eaLnBrk="1" latinLnBrk="0" hangingPunct="1">
+      <a:defRPr sz="1200" kern="1200">
+        <a:solidFill>
+          <a:schemeClr val="tx1"/>
+        </a:solidFill>
+        <a:latin typeface="+mn-lt"/>
+        <a:ea typeface="+mn-ea"/>
+        <a:cs typeface="+mn-cs"/>
+      </a:defRPr>
+    </a:lvl3pPr>
+    <a:lvl4pPr marL="1371600" algn="l" defTabSz="914400" rtl="0" eaLnBrk="1" latinLnBrk="0" hangingPunct="1">
+      <a:defRPr sz="1200" kern="1200">
+        <a:solidFill>
+          <a:schemeClr val="tx1"/>
+        </a:solidFill>
+        <a:latin typeface="+mn-lt"/>
+        <a:ea typeface="+mn-ea"/>
+        <a:cs typeface="+mn-cs"/>
+      </a:defRPr>
+    </a:lvl4pPr>
+    <a:lvl5pPr marL="1828800" algn="l" defTabSz="914400" rtl="0" eaLnBrk="1" latinLnBrk="0" hangingPunct="1">
+      <a:defRPr sz="1200" kern="1200">
+        <a:solidFill>
+          <a:schemeClr val="tx1"/>
+        </a:solidFill>
+        <a:latin typeface="+mn-lt"/>
+        <a:ea typeface="+mn-ea"/>
+        <a:cs typeface="+mn-cs"/>
+      </a:defRPr>
+    </a:lvl5pPr>
+    <a:lvl6pPr marL="2286000" algn="l" defTabSz="914400" rtl="0" eaLnBrk="1" latinLnBrk="0" hangingPunct="1">
+      <a:defRPr sz="1200" kern="1200">
+        <a:solidFill>
+          <a:schemeClr val="tx1"/>
+        </a:solidFill>
+        <a:latin typeface="+mn-lt"/>
+        <a:ea typeface="+mn-ea"/>
+        <a:cs typeface="+mn-cs"/>
+      </a:defRPr>
+    </a:lvl6pPr>
+    <a:lvl7pPr marL="2743200" algn="l" defTabSz="914400" rtl="0" eaLnBrk="1" latinLnBrk="0" hangingPunct="1">
+      <a:defRPr sz="1200" kern="1200">
+        <a:solidFill>
+          <a:schemeClr val="tx1"/>
+        </a:solidFill>
+        <a:latin typeface="+mn-lt"/>
+        <a:ea typeface="+mn-ea"/>
+        <a:cs typeface="+mn-cs"/>
+      </a:defRPr>
+    </a:lvl7pPr>
+    <a:lvl8pPr marL="3200400" algn="l" defTabSz="914400" rtl="0" eaLnBrk="1" latinLnBrk="0" hangingPunct="1">
+      <a:defRPr sz="1200" kern="1200">
+        <a:solidFill>
+          <a:schemeClr val="tx1"/>
+        </a:solidFill>
+        <a:latin typeface="+mn-lt"/>
+        <a:ea typeface="+mn-ea"/>
+        <a:cs typeface="+mn-cs"/>
+      </a:defRPr>
+    </a:lvl8pPr>
+    <a:lvl9pPr marL="3657600" algn="l" defTabSz="914400" rtl="0" eaLnBrk="1" latinLnBrk="0" hangingPunct="1">
+      <a:defRPr sz="1200" kern="1200">
+        <a:solidFill>
+          <a:schemeClr val="tx1"/>
+        </a:solidFill>
+        <a:latin typeface="+mn-lt"/>
+        <a:ea typeface="+mn-ea"/>
+        <a:cs typeface="+mn-cs"/>
+      </a:defRPr>
+    </a:lvl9pPr>
+  </p:notesStyle>
+</p:notesMaster>
+</file>
+
+<file path=ppt/notesSlides/notesSlide1.xml><?xml version="1.0" encoding="utf-8"?>
+<p:notes xmlns:a="http://schemas.openxmlformats.org/drawingml/2006/main" xmlns:r="http://schemas.openxmlformats.org/officeDocument/2006/relationships" xmlns:p="http://schemas.openxmlformats.org/presentationml/2006/main">
+  <p:cSld>
+    <p:spTree>
+      <p:nvGrpSpPr>
+        <p:cNvPr id="1" name=""/>
+        <p:cNvGrpSpPr/>
+        <p:nvPr/>
+      </p:nvGrpSpPr>
+      <p:grpSpPr>
+        <a:xfrm>
+          <a:off x="0" y="0"/>
+          <a:ext cx="0" cy="0"/>
+          <a:chOff x="0" y="0"/>
+          <a:chExt cx="0" cy="0"/>
+        </a:xfrm>
+      </p:grpSpPr>
+      <p:sp>
+        <p:nvSpPr>
+          <p:cNvPr id="2" name="Marcador de imagen de diapositiva 1"/>
+          <p:cNvSpPr>
+            <a:spLocks noGrp="1" noRot="1" noChangeAspect="1"/>
+          </p:cNvSpPr>
+          <p:nvPr>
+            <p:ph type="sldImg"/>
+          </p:nvPr>
+        </p:nvSpPr>
+        <p:spPr/>
+      </p:sp>
+      <p:sp>
+        <p:nvSpPr>
+          <p:cNvPr id="3" name="Marcador de notas 2"/>
+          <p:cNvSpPr>
+            <a:spLocks noGrp="1"/>
+          </p:cNvSpPr>
+          <p:nvPr>
+            <p:ph type="body" idx="1"/>
+          </p:nvPr>
+        </p:nvSpPr>
+        <p:spPr/>
+        <p:txBody>
+          <a:bodyPr/>
+          <a:lstStyle/>
+          <a:p>
+            <a:r>
+              <a:rPr lang="en-US" dirty="0" err="1"/>
+              <a:t>Empezada</a:t>
+            </a:r>
+            <a:r>
+              <a:rPr lang="en-US" dirty="0"/>
+              <a:t> la </a:t>
+            </a:r>
+            <a:r>
+              <a:rPr lang="en-US" dirty="0" err="1"/>
+              <a:t>planificación</a:t>
+            </a:r>
+            <a:r>
+              <a:rPr lang="en-US"/>
+              <a:t>.</a:t>
+            </a:r>
+            <a:endParaRPr lang="en-US" dirty="0"/>
+          </a:p>
+        </p:txBody>
+      </p:sp>
+      <p:sp>
+        <p:nvSpPr>
+          <p:cNvPr id="4" name="Marcador de número de diapositiva 3"/>
+          <p:cNvSpPr>
+            <a:spLocks noGrp="1"/>
+          </p:cNvSpPr>
+          <p:nvPr>
+            <p:ph type="sldNum" sz="quarter" idx="5"/>
+          </p:nvPr>
+        </p:nvSpPr>
+        <p:spPr/>
+        <p:txBody>
+          <a:bodyPr/>
+          <a:lstStyle/>
+          <a:p>
+            <a:fld id="{90C5D989-6414-4EC9-97AC-BCF628C5D8B9}" type="slidenum">
+              <a:rPr lang="en-US" smtClean="0"/>
+              <a:t>2</a:t>
+            </a:fld>
+            <a:endParaRPr lang="en-US"/>
+          </a:p>
+        </p:txBody>
+      </p:sp>
+    </p:spTree>
+    <p:extLst>
+      <p:ext uri="{BB962C8B-B14F-4D97-AF65-F5344CB8AC3E}">
+        <p14:creationId xmlns:p14="http://schemas.microsoft.com/office/powerpoint/2010/main" val="2420125520"/>
+      </p:ext>
+    </p:extLst>
+  </p:cSld>
+  <p:clrMapOvr>
+    <a:masterClrMapping/>
+  </p:clrMapOvr>
+</p:notes>
 </file>
 
 <file path=ppt/slideLayouts/slideLayout1.xml><?xml version="1.0" encoding="utf-8"?>
@@ -308,7 +767,7 @@
           <a:p>
             <a:fld id="{ACB33697-2FA8-4DC4-A426-2A40D07A47EB}" type="slidenum">
               <a:rPr lang="en-US" smtClean="0"/>
-              <a:t>‹#›</a:t>
+              <a:t>‹Nº›</a:t>
             </a:fld>
             <a:endParaRPr lang="en-US"/>
           </a:p>
@@ -506,7 +965,7 @@
           <a:p>
             <a:fld id="{ACB33697-2FA8-4DC4-A426-2A40D07A47EB}" type="slidenum">
               <a:rPr lang="en-US" smtClean="0"/>
-              <a:t>‹#›</a:t>
+              <a:t>‹Nº›</a:t>
             </a:fld>
             <a:endParaRPr lang="en-US"/>
           </a:p>
@@ -714,7 +1173,7 @@
           <a:p>
             <a:fld id="{ACB33697-2FA8-4DC4-A426-2A40D07A47EB}" type="slidenum">
               <a:rPr lang="en-US" smtClean="0"/>
-              <a:t>‹#›</a:t>
+              <a:t>‹Nº›</a:t>
             </a:fld>
             <a:endParaRPr lang="en-US"/>
           </a:p>
@@ -912,7 +1371,7 @@
           <a:p>
             <a:fld id="{ACB33697-2FA8-4DC4-A426-2A40D07A47EB}" type="slidenum">
               <a:rPr lang="en-US" smtClean="0"/>
-              <a:t>‹#›</a:t>
+              <a:t>‹Nº›</a:t>
             </a:fld>
             <a:endParaRPr lang="en-US"/>
           </a:p>
@@ -1187,7 +1646,7 @@
           <a:p>
             <a:fld id="{ACB33697-2FA8-4DC4-A426-2A40D07A47EB}" type="slidenum">
               <a:rPr lang="en-US" smtClean="0"/>
-              <a:t>‹#›</a:t>
+              <a:t>‹Nº›</a:t>
             </a:fld>
             <a:endParaRPr lang="en-US"/>
           </a:p>
@@ -1452,7 +1911,7 @@
           <a:p>
             <a:fld id="{ACB33697-2FA8-4DC4-A426-2A40D07A47EB}" type="slidenum">
               <a:rPr lang="en-US" smtClean="0"/>
-              <a:t>‹#›</a:t>
+              <a:t>‹Nº›</a:t>
             </a:fld>
             <a:endParaRPr lang="en-US"/>
           </a:p>
@@ -1864,7 +2323,7 @@
           <a:p>
             <a:fld id="{ACB33697-2FA8-4DC4-A426-2A40D07A47EB}" type="slidenum">
               <a:rPr lang="en-US" smtClean="0"/>
-              <a:t>‹#›</a:t>
+              <a:t>‹Nº›</a:t>
             </a:fld>
             <a:endParaRPr lang="en-US"/>
           </a:p>
@@ -2005,7 +2464,7 @@
           <a:p>
             <a:fld id="{ACB33697-2FA8-4DC4-A426-2A40D07A47EB}" type="slidenum">
               <a:rPr lang="en-US" smtClean="0"/>
-              <a:t>‹#›</a:t>
+              <a:t>‹Nº›</a:t>
             </a:fld>
             <a:endParaRPr lang="en-US"/>
           </a:p>
@@ -2118,7 +2577,7 @@
           <a:p>
             <a:fld id="{ACB33697-2FA8-4DC4-A426-2A40D07A47EB}" type="slidenum">
               <a:rPr lang="en-US" smtClean="0"/>
-              <a:t>‹#›</a:t>
+              <a:t>‹Nº›</a:t>
             </a:fld>
             <a:endParaRPr lang="en-US"/>
           </a:p>
@@ -2429,7 +2888,7 @@
           <a:p>
             <a:fld id="{ACB33697-2FA8-4DC4-A426-2A40D07A47EB}" type="slidenum">
               <a:rPr lang="en-US" smtClean="0"/>
-              <a:t>‹#›</a:t>
+              <a:t>‹Nº›</a:t>
             </a:fld>
             <a:endParaRPr lang="en-US"/>
           </a:p>
@@ -2717,7 +3176,7 @@
           <a:p>
             <a:fld id="{ACB33697-2FA8-4DC4-A426-2A40D07A47EB}" type="slidenum">
               <a:rPr lang="en-US" smtClean="0"/>
-              <a:t>‹#›</a:t>
+              <a:t>‹Nº›</a:t>
             </a:fld>
             <a:endParaRPr lang="en-US"/>
           </a:p>
@@ -2994,7 +3453,7 @@
           <a:p>
             <a:fld id="{ACB33697-2FA8-4DC4-A426-2A40D07A47EB}" type="slidenum">
               <a:rPr lang="en-US" smtClean="0"/>
-              <a:t>‹#›</a:t>
+              <a:t>‹Nº›</a:t>
             </a:fld>
             <a:endParaRPr lang="en-US"/>
           </a:p>
@@ -3372,6 +3831,66 @@
 </p:sld>
 </file>
 
+<file path=ppt/slides/slide2.xml><?xml version="1.0" encoding="utf-8"?>
+<p:sld xmlns:a="http://schemas.openxmlformats.org/drawingml/2006/main" xmlns:r="http://schemas.openxmlformats.org/officeDocument/2006/relationships" xmlns:p="http://schemas.openxmlformats.org/presentationml/2006/main">
+  <p:cSld>
+    <p:spTree>
+      <p:nvGrpSpPr>
+        <p:cNvPr id="1" name=""/>
+        <p:cNvGrpSpPr/>
+        <p:nvPr/>
+      </p:nvGrpSpPr>
+      <p:grpSpPr>
+        <a:xfrm>
+          <a:off x="0" y="0"/>
+          <a:ext cx="0" cy="0"/>
+          <a:chOff x="0" y="0"/>
+          <a:chExt cx="0" cy="0"/>
+        </a:xfrm>
+      </p:grpSpPr>
+      <p:pic>
+        <p:nvPicPr>
+          <p:cNvPr id="5" name="Imagen 4">
+            <a:extLst>
+              <a:ext uri="{FF2B5EF4-FFF2-40B4-BE49-F238E27FC236}">
+                <a16:creationId xmlns:a16="http://schemas.microsoft.com/office/drawing/2014/main" id="{B8C12871-577B-468F-8E9A-8E3A0F3FE046}"/>
+              </a:ext>
+            </a:extLst>
+          </p:cNvPr>
+          <p:cNvPicPr>
+            <a:picLocks noChangeAspect="1"/>
+          </p:cNvPicPr>
+          <p:nvPr/>
+        </p:nvPicPr>
+        <p:blipFill>
+          <a:blip r:embed="rId3"/>
+          <a:stretch>
+            <a:fillRect/>
+          </a:stretch>
+        </p:blipFill>
+        <p:spPr>
+          <a:xfrm>
+            <a:off x="1189940" y="666364"/>
+            <a:ext cx="9812119" cy="5525271"/>
+          </a:xfrm>
+          <a:prstGeom prst="rect">
+            <a:avLst/>
+          </a:prstGeom>
+        </p:spPr>
+      </p:pic>
+    </p:spTree>
+    <p:extLst>
+      <p:ext uri="{BB962C8B-B14F-4D97-AF65-F5344CB8AC3E}">
+        <p14:creationId xmlns:p14="http://schemas.microsoft.com/office/powerpoint/2010/main" val="2879469989"/>
+      </p:ext>
+    </p:extLst>
+  </p:cSld>
+  <p:clrMapOvr>
+    <a:masterClrMapping/>
+  </p:clrMapOvr>
+</p:sld>
+</file>
+
 <file path=ppt/theme/theme1.xml><?xml version="1.0" encoding="utf-8"?>
 <a:theme xmlns:a="http://schemas.openxmlformats.org/drawingml/2006/main" name="Office Theme">
   <a:themeElements>
@@ -3665,4 +4184,299 @@
     </a:ext>
   </a:extLst>
 </a:theme>
+</file>
+
+<file path=ppt/theme/theme2.xml><?xml version="1.0" encoding="utf-8"?>
+<a:theme xmlns:a="http://schemas.openxmlformats.org/drawingml/2006/main" name="Tema de Office">
+  <a:themeElements>
+    <a:clrScheme name="Office">
+      <a:dk1>
+        <a:sysClr val="windowText" lastClr="000000"/>
+      </a:dk1>
+      <a:lt1>
+        <a:sysClr val="window" lastClr="FFFFFF"/>
+      </a:lt1>
+      <a:dk2>
+        <a:srgbClr val="44546A"/>
+      </a:dk2>
+      <a:lt2>
+        <a:srgbClr val="E7E6E6"/>
+      </a:lt2>
+      <a:accent1>
+        <a:srgbClr val="4472C4"/>
+      </a:accent1>
+      <a:accent2>
+        <a:srgbClr val="ED7D31"/>
+      </a:accent2>
+      <a:accent3>
+        <a:srgbClr val="A5A5A5"/>
+      </a:accent3>
+      <a:accent4>
+        <a:srgbClr val="FFC000"/>
+      </a:accent4>
+      <a:accent5>
+        <a:srgbClr val="5B9BD5"/>
+      </a:accent5>
+      <a:accent6>
+        <a:srgbClr val="70AD47"/>
+      </a:accent6>
+      <a:hlink>
+        <a:srgbClr val="0563C1"/>
+      </a:hlink>
+      <a:folHlink>
+        <a:srgbClr val="954F72"/>
+      </a:folHlink>
+    </a:clrScheme>
+    <a:fontScheme name="Office">
+      <a:majorFont>
+        <a:latin typeface="Calibri Light" panose="020F0302020204030204"/>
+        <a:ea typeface=""/>
+        <a:cs typeface=""/>
+        <a:font script="Jpan" typeface="游ゴシック Light"/>
+        <a:font script="Hang" typeface="맑은 고딕"/>
+        <a:font script="Hans" typeface="等线 Light"/>
+        <a:font script="Hant" typeface="新細明體"/>
+        <a:font script="Arab" typeface="Times New Roman"/>
+        <a:font script="Hebr" typeface="Times New Roman"/>
+        <a:font script="Thai" typeface="Angsana New"/>
+        <a:font script="Ethi" typeface="Nyala"/>
+        <a:font script="Beng" typeface="Vrinda"/>
+        <a:font script="Gujr" typeface="Shruti"/>
+        <a:font script="Khmr" typeface="MoolBoran"/>
+        <a:font script="Knda" typeface="Tunga"/>
+        <a:font script="Guru" typeface="Raavi"/>
+        <a:font script="Cans" typeface="Euphemia"/>
+        <a:font script="Cher" typeface="Plantagenet Cherokee"/>
+        <a:font script="Yiii" typeface="Microsoft Yi Baiti"/>
+        <a:font script="Tibt" typeface="Microsoft Himalaya"/>
+        <a:font script="Thaa" typeface="MV Boli"/>
+        <a:font script="Deva" typeface="Mangal"/>
+        <a:font script="Telu" typeface="Gautami"/>
+        <a:font script="Taml" typeface="Latha"/>
+        <a:font script="Syrc" typeface="Estrangelo Edessa"/>
+        <a:font script="Orya" typeface="Kalinga"/>
+        <a:font script="Mlym" typeface="Kartika"/>
+        <a:font script="Laoo" typeface="DokChampa"/>
+        <a:font script="Sinh" typeface="Iskoola Pota"/>
+        <a:font script="Mong" typeface="Mongolian Baiti"/>
+        <a:font script="Viet" typeface="Times New Roman"/>
+        <a:font script="Uigh" typeface="Microsoft Uighur"/>
+        <a:font script="Geor" typeface="Sylfaen"/>
+        <a:font script="Armn" typeface="Arial"/>
+        <a:font script="Bugi" typeface="Leelawadee UI"/>
+        <a:font script="Bopo" typeface="Microsoft JhengHei"/>
+        <a:font script="Java" typeface="Javanese Text"/>
+        <a:font script="Lisu" typeface="Segoe UI"/>
+        <a:font script="Mymr" typeface="Myanmar Text"/>
+        <a:font script="Nkoo" typeface="Ebrima"/>
+        <a:font script="Olck" typeface="Nirmala UI"/>
+        <a:font script="Osma" typeface="Ebrima"/>
+        <a:font script="Phag" typeface="Phagspa"/>
+        <a:font script="Syrn" typeface="Estrangelo Edessa"/>
+        <a:font script="Syrj" typeface="Estrangelo Edessa"/>
+        <a:font script="Syre" typeface="Estrangelo Edessa"/>
+        <a:font script="Sora" typeface="Nirmala UI"/>
+        <a:font script="Tale" typeface="Microsoft Tai Le"/>
+        <a:font script="Talu" typeface="Microsoft New Tai Lue"/>
+        <a:font script="Tfng" typeface="Ebrima"/>
+      </a:majorFont>
+      <a:minorFont>
+        <a:latin typeface="Calibri" panose="020F0502020204030204"/>
+        <a:ea typeface=""/>
+        <a:cs typeface=""/>
+        <a:font script="Jpan" typeface="游ゴシック"/>
+        <a:font script="Hang" typeface="맑은 고딕"/>
+        <a:font script="Hans" typeface="等线"/>
+        <a:font script="Hant" typeface="新細明體"/>
+        <a:font script="Arab" typeface="Arial"/>
+        <a:font script="Hebr" typeface="Arial"/>
+        <a:font script="Thai" typeface="Cordia New"/>
+        <a:font script="Ethi" typeface="Nyala"/>
+        <a:font script="Beng" typeface="Vrinda"/>
+        <a:font script="Gujr" typeface="Shruti"/>
+        <a:font script="Khmr" typeface="DaunPenh"/>
+        <a:font script="Knda" typeface="Tunga"/>
+        <a:font script="Guru" typeface="Raavi"/>
+        <a:font script="Cans" typeface="Euphemia"/>
+        <a:font script="Cher" typeface="Plantagenet Cherokee"/>
+        <a:font script="Yiii" typeface="Microsoft Yi Baiti"/>
+        <a:font script="Tibt" typeface="Microsoft Himalaya"/>
+        <a:font script="Thaa" typeface="MV Boli"/>
+        <a:font script="Deva" typeface="Mangal"/>
+        <a:font script="Telu" typeface="Gautami"/>
+        <a:font script="Taml" typeface="Latha"/>
+        <a:font script="Syrc" typeface="Estrangelo Edessa"/>
+        <a:font script="Orya" typeface="Kalinga"/>
+        <a:font script="Mlym" typeface="Kartika"/>
+        <a:font script="Laoo" typeface="DokChampa"/>
+        <a:font script="Sinh" typeface="Iskoola Pota"/>
+        <a:font script="Mong" typeface="Mongolian Baiti"/>
+        <a:font script="Viet" typeface="Arial"/>
+        <a:font script="Uigh" typeface="Microsoft Uighur"/>
+        <a:font script="Geor" typeface="Sylfaen"/>
+        <a:font script="Armn" typeface="Arial"/>
+        <a:font script="Bugi" typeface="Leelawadee UI"/>
+        <a:font script="Bopo" typeface="Microsoft JhengHei"/>
+        <a:font script="Java" typeface="Javanese Text"/>
+        <a:font script="Lisu" typeface="Segoe UI"/>
+        <a:font script="Mymr" typeface="Myanmar Text"/>
+        <a:font script="Nkoo" typeface="Ebrima"/>
+        <a:font script="Olck" typeface="Nirmala UI"/>
+        <a:font script="Osma" typeface="Ebrima"/>
+        <a:font script="Phag" typeface="Phagspa"/>
+        <a:font script="Syrn" typeface="Estrangelo Edessa"/>
+        <a:font script="Syrj" typeface="Estrangelo Edessa"/>
+        <a:font script="Syre" typeface="Estrangelo Edessa"/>
+        <a:font script="Sora" typeface="Nirmala UI"/>
+        <a:font script="Tale" typeface="Microsoft Tai Le"/>
+        <a:font script="Talu" typeface="Microsoft New Tai Lue"/>
+        <a:font script="Tfng" typeface="Ebrima"/>
+      </a:minorFont>
+    </a:fontScheme>
+    <a:fmtScheme name="Office">
+      <a:fillStyleLst>
+        <a:solidFill>
+          <a:schemeClr val="phClr"/>
+        </a:solidFill>
+        <a:gradFill rotWithShape="1">
+          <a:gsLst>
+            <a:gs pos="0">
+              <a:schemeClr val="phClr">
+                <a:lumMod val="110000"/>
+                <a:satMod val="105000"/>
+                <a:tint val="67000"/>
+              </a:schemeClr>
+            </a:gs>
+            <a:gs pos="50000">
+              <a:schemeClr val="phClr">
+                <a:lumMod val="105000"/>
+                <a:satMod val="103000"/>
+                <a:tint val="73000"/>
+              </a:schemeClr>
+            </a:gs>
+            <a:gs pos="100000">
+              <a:schemeClr val="phClr">
+                <a:lumMod val="105000"/>
+                <a:satMod val="109000"/>
+                <a:tint val="81000"/>
+              </a:schemeClr>
+            </a:gs>
+          </a:gsLst>
+          <a:lin ang="5400000" scaled="0"/>
+        </a:gradFill>
+        <a:gradFill rotWithShape="1">
+          <a:gsLst>
+            <a:gs pos="0">
+              <a:schemeClr val="phClr">
+                <a:satMod val="103000"/>
+                <a:lumMod val="102000"/>
+                <a:tint val="94000"/>
+              </a:schemeClr>
+            </a:gs>
+            <a:gs pos="50000">
+              <a:schemeClr val="phClr">
+                <a:satMod val="110000"/>
+                <a:lumMod val="100000"/>
+                <a:shade val="100000"/>
+              </a:schemeClr>
+            </a:gs>
+            <a:gs pos="100000">
+              <a:schemeClr val="phClr">
+                <a:lumMod val="99000"/>
+                <a:satMod val="120000"/>
+                <a:shade val="78000"/>
+              </a:schemeClr>
+            </a:gs>
+          </a:gsLst>
+          <a:lin ang="5400000" scaled="0"/>
+        </a:gradFill>
+      </a:fillStyleLst>
+      <a:lnStyleLst>
+        <a:ln w="6350" cap="flat" cmpd="sng" algn="ctr">
+          <a:solidFill>
+            <a:schemeClr val="phClr"/>
+          </a:solidFill>
+          <a:prstDash val="solid"/>
+          <a:miter lim="800000"/>
+        </a:ln>
+        <a:ln w="12700" cap="flat" cmpd="sng" algn="ctr">
+          <a:solidFill>
+            <a:schemeClr val="phClr"/>
+          </a:solidFill>
+          <a:prstDash val="solid"/>
+          <a:miter lim="800000"/>
+        </a:ln>
+        <a:ln w="19050" cap="flat" cmpd="sng" algn="ctr">
+          <a:solidFill>
+            <a:schemeClr val="phClr"/>
+          </a:solidFill>
+          <a:prstDash val="solid"/>
+          <a:miter lim="800000"/>
+        </a:ln>
+      </a:lnStyleLst>
+      <a:effectStyleLst>
+        <a:effectStyle>
+          <a:effectLst/>
+        </a:effectStyle>
+        <a:effectStyle>
+          <a:effectLst/>
+        </a:effectStyle>
+        <a:effectStyle>
+          <a:effectLst>
+            <a:outerShdw blurRad="57150" dist="19050" dir="5400000" algn="ctr" rotWithShape="0">
+              <a:srgbClr val="000000">
+                <a:alpha val="63000"/>
+              </a:srgbClr>
+            </a:outerShdw>
+          </a:effectLst>
+        </a:effectStyle>
+      </a:effectStyleLst>
+      <a:bgFillStyleLst>
+        <a:solidFill>
+          <a:schemeClr val="phClr"/>
+        </a:solidFill>
+        <a:solidFill>
+          <a:schemeClr val="phClr">
+            <a:tint val="95000"/>
+            <a:satMod val="170000"/>
+          </a:schemeClr>
+        </a:solidFill>
+        <a:gradFill rotWithShape="1">
+          <a:gsLst>
+            <a:gs pos="0">
+              <a:schemeClr val="phClr">
+                <a:tint val="93000"/>
+                <a:satMod val="150000"/>
+                <a:shade val="98000"/>
+                <a:lumMod val="102000"/>
+              </a:schemeClr>
+            </a:gs>
+            <a:gs pos="50000">
+              <a:schemeClr val="phClr">
+                <a:tint val="98000"/>
+                <a:satMod val="130000"/>
+                <a:shade val="90000"/>
+                <a:lumMod val="103000"/>
+              </a:schemeClr>
+            </a:gs>
+            <a:gs pos="100000">
+              <a:schemeClr val="phClr">
+                <a:shade val="63000"/>
+                <a:satMod val="120000"/>
+              </a:schemeClr>
+            </a:gs>
+          </a:gsLst>
+          <a:lin ang="5400000" scaled="0"/>
+        </a:gradFill>
+      </a:bgFillStyleLst>
+    </a:fmtScheme>
+  </a:themeElements>
+  <a:objectDefaults/>
+  <a:extraClrSchemeLst/>
+  <a:extLst>
+    <a:ext uri="{05A4C25C-085E-4340-85A3-A5531E510DB2}">
+      <thm15:themeFamily xmlns:thm15="http://schemas.microsoft.com/office/thememl/2012/main" name="Office Theme" id="{62F939B6-93AF-4DB8-9C6B-D6C7DFDC589F}" vid="{4A3C46E8-61CC-4603-A589-7422A47A8E4A}"/>
+    </a:ext>
+  </a:extLst>
+</a:theme>
 </file>
</xml_diff>

<commit_message>
Planificar fue pasado a Done. Identificar interesados y listar funcionalidades por interesado fueron pasados a Doing.
</commit_message>
<xml_diff>
--- a/Iteracion1/TaskBoard.pptx
+++ b/Iteracion1/TaskBoard.pptx
@@ -5,11 +5,12 @@
     <p:sldMasterId id="2147483648" r:id="rId1"/>
   </p:sldMasterIdLst>
   <p:notesMasterIdLst>
-    <p:notesMasterId r:id="rId4"/>
+    <p:notesMasterId r:id="rId5"/>
   </p:notesMasterIdLst>
   <p:sldIdLst>
     <p:sldId id="256" r:id="rId2"/>
     <p:sldId id="257" r:id="rId3"/>
+    <p:sldId id="258" r:id="rId4"/>
   </p:sldIdLst>
   <p:sldSz cx="12192000" cy="6858000"/>
   <p:notesSz cx="6858000" cy="9144000"/>
@@ -198,7 +199,7 @@
           <a:p>
             <a:fld id="{8B45D529-B2FB-4235-85C4-556325968B0B}" type="datetimeFigureOut">
               <a:rPr lang="en-US" smtClean="0"/>
-              <a:t>28-Sep-21</a:t>
+              <a:t>9/28/2021</a:t>
             </a:fld>
             <a:endParaRPr lang="en-US"/>
           </a:p>
@@ -713,7 +714,7 @@
           <a:p>
             <a:fld id="{39DCAF25-EC8E-4E4C-BCE0-6880FDA81677}" type="datetimeFigureOut">
               <a:rPr lang="en-US" smtClean="0"/>
-              <a:t>28-Sep-21</a:t>
+              <a:t>9/28/2021</a:t>
             </a:fld>
             <a:endParaRPr lang="en-US"/>
           </a:p>
@@ -911,7 +912,7 @@
           <a:p>
             <a:fld id="{39DCAF25-EC8E-4E4C-BCE0-6880FDA81677}" type="datetimeFigureOut">
               <a:rPr lang="en-US" smtClean="0"/>
-              <a:t>28-Sep-21</a:t>
+              <a:t>9/28/2021</a:t>
             </a:fld>
             <a:endParaRPr lang="en-US"/>
           </a:p>
@@ -1119,7 +1120,7 @@
           <a:p>
             <a:fld id="{39DCAF25-EC8E-4E4C-BCE0-6880FDA81677}" type="datetimeFigureOut">
               <a:rPr lang="en-US" smtClean="0"/>
-              <a:t>28-Sep-21</a:t>
+              <a:t>9/28/2021</a:t>
             </a:fld>
             <a:endParaRPr lang="en-US"/>
           </a:p>
@@ -1317,7 +1318,7 @@
           <a:p>
             <a:fld id="{39DCAF25-EC8E-4E4C-BCE0-6880FDA81677}" type="datetimeFigureOut">
               <a:rPr lang="en-US" smtClean="0"/>
-              <a:t>28-Sep-21</a:t>
+              <a:t>9/28/2021</a:t>
             </a:fld>
             <a:endParaRPr lang="en-US"/>
           </a:p>
@@ -1592,7 +1593,7 @@
           <a:p>
             <a:fld id="{39DCAF25-EC8E-4E4C-BCE0-6880FDA81677}" type="datetimeFigureOut">
               <a:rPr lang="en-US" smtClean="0"/>
-              <a:t>28-Sep-21</a:t>
+              <a:t>9/28/2021</a:t>
             </a:fld>
             <a:endParaRPr lang="en-US"/>
           </a:p>
@@ -1857,7 +1858,7 @@
           <a:p>
             <a:fld id="{39DCAF25-EC8E-4E4C-BCE0-6880FDA81677}" type="datetimeFigureOut">
               <a:rPr lang="en-US" smtClean="0"/>
-              <a:t>28-Sep-21</a:t>
+              <a:t>9/28/2021</a:t>
             </a:fld>
             <a:endParaRPr lang="en-US"/>
           </a:p>
@@ -2269,7 +2270,7 @@
           <a:p>
             <a:fld id="{39DCAF25-EC8E-4E4C-BCE0-6880FDA81677}" type="datetimeFigureOut">
               <a:rPr lang="en-US" smtClean="0"/>
-              <a:t>28-Sep-21</a:t>
+              <a:t>9/28/2021</a:t>
             </a:fld>
             <a:endParaRPr lang="en-US"/>
           </a:p>
@@ -2410,7 +2411,7 @@
           <a:p>
             <a:fld id="{39DCAF25-EC8E-4E4C-BCE0-6880FDA81677}" type="datetimeFigureOut">
               <a:rPr lang="en-US" smtClean="0"/>
-              <a:t>28-Sep-21</a:t>
+              <a:t>9/28/2021</a:t>
             </a:fld>
             <a:endParaRPr lang="en-US"/>
           </a:p>
@@ -2523,7 +2524,7 @@
           <a:p>
             <a:fld id="{39DCAF25-EC8E-4E4C-BCE0-6880FDA81677}" type="datetimeFigureOut">
               <a:rPr lang="en-US" smtClean="0"/>
-              <a:t>28-Sep-21</a:t>
+              <a:t>9/28/2021</a:t>
             </a:fld>
             <a:endParaRPr lang="en-US"/>
           </a:p>
@@ -2834,7 +2835,7 @@
           <a:p>
             <a:fld id="{39DCAF25-EC8E-4E4C-BCE0-6880FDA81677}" type="datetimeFigureOut">
               <a:rPr lang="en-US" smtClean="0"/>
-              <a:t>28-Sep-21</a:t>
+              <a:t>9/28/2021</a:t>
             </a:fld>
             <a:endParaRPr lang="en-US"/>
           </a:p>
@@ -3122,7 +3123,7 @@
           <a:p>
             <a:fld id="{39DCAF25-EC8E-4E4C-BCE0-6880FDA81677}" type="datetimeFigureOut">
               <a:rPr lang="en-US" smtClean="0"/>
-              <a:t>28-Sep-21</a:t>
+              <a:t>9/28/2021</a:t>
             </a:fld>
             <a:endParaRPr lang="en-US"/>
           </a:p>
@@ -3363,7 +3364,7 @@
           <a:p>
             <a:fld id="{39DCAF25-EC8E-4E4C-BCE0-6880FDA81677}" type="datetimeFigureOut">
               <a:rPr lang="en-US" smtClean="0"/>
-              <a:t>28-Sep-21</a:t>
+              <a:t>9/28/2021</a:t>
             </a:fld>
             <a:endParaRPr lang="en-US"/>
           </a:p>
@@ -3882,6 +3883,66 @@
     <p:extLst>
       <p:ext uri="{BB962C8B-B14F-4D97-AF65-F5344CB8AC3E}">
         <p14:creationId xmlns:p14="http://schemas.microsoft.com/office/powerpoint/2010/main" val="2879469989"/>
+      </p:ext>
+    </p:extLst>
+  </p:cSld>
+  <p:clrMapOvr>
+    <a:masterClrMapping/>
+  </p:clrMapOvr>
+</p:sld>
+</file>
+
+<file path=ppt/slides/slide3.xml><?xml version="1.0" encoding="utf-8"?>
+<p:sld xmlns:a="http://schemas.openxmlformats.org/drawingml/2006/main" xmlns:r="http://schemas.openxmlformats.org/officeDocument/2006/relationships" xmlns:p="http://schemas.openxmlformats.org/presentationml/2006/main">
+  <p:cSld>
+    <p:spTree>
+      <p:nvGrpSpPr>
+        <p:cNvPr id="1" name=""/>
+        <p:cNvGrpSpPr/>
+        <p:nvPr/>
+      </p:nvGrpSpPr>
+      <p:grpSpPr>
+        <a:xfrm>
+          <a:off x="0" y="0"/>
+          <a:ext cx="0" cy="0"/>
+          <a:chOff x="0" y="0"/>
+          <a:chExt cx="0" cy="0"/>
+        </a:xfrm>
+      </p:grpSpPr>
+      <p:pic>
+        <p:nvPicPr>
+          <p:cNvPr id="5" name="Imagen 4">
+            <a:extLst>
+              <a:ext uri="{FF2B5EF4-FFF2-40B4-BE49-F238E27FC236}">
+                <a16:creationId xmlns:a16="http://schemas.microsoft.com/office/drawing/2014/main" id="{290A1FEA-22F5-4D71-9400-5C20FD52773C}"/>
+              </a:ext>
+            </a:extLst>
+          </p:cNvPr>
+          <p:cNvPicPr>
+            <a:picLocks noChangeAspect="1"/>
+          </p:cNvPicPr>
+          <p:nvPr/>
+        </p:nvPicPr>
+        <p:blipFill>
+          <a:blip r:embed="rId2"/>
+          <a:stretch>
+            <a:fillRect/>
+          </a:stretch>
+        </p:blipFill>
+        <p:spPr>
+          <a:xfrm>
+            <a:off x="1080387" y="675891"/>
+            <a:ext cx="10031225" cy="5506218"/>
+          </a:xfrm>
+          <a:prstGeom prst="rect">
+            <a:avLst/>
+          </a:prstGeom>
+        </p:spPr>
+      </p:pic>
+    </p:spTree>
+    <p:extLst>
+      <p:ext uri="{BB962C8B-B14F-4D97-AF65-F5344CB8AC3E}">
+        <p14:creationId xmlns:p14="http://schemas.microsoft.com/office/powerpoint/2010/main" val="4112933987"/>
       </p:ext>
     </p:extLst>
   </p:cSld>

</xml_diff>

<commit_message>
Movido estudio de competidores a Doing
</commit_message>
<xml_diff>
--- a/Iteracion1/TaskBoard.pptx
+++ b/Iteracion1/TaskBoard.pptx
@@ -5,12 +5,13 @@
     <p:sldMasterId id="2147483648" r:id="rId1"/>
   </p:sldMasterIdLst>
   <p:notesMasterIdLst>
-    <p:notesMasterId r:id="rId5"/>
+    <p:notesMasterId r:id="rId6"/>
   </p:notesMasterIdLst>
   <p:sldIdLst>
     <p:sldId id="256" r:id="rId2"/>
     <p:sldId id="257" r:id="rId3"/>
     <p:sldId id="258" r:id="rId4"/>
+    <p:sldId id="259" r:id="rId5"/>
   </p:sldIdLst>
   <p:sldSz cx="12192000" cy="6858000"/>
   <p:notesSz cx="6858000" cy="9144000"/>
@@ -199,7 +200,7 @@
           <a:p>
             <a:fld id="{8B45D529-B2FB-4235-85C4-556325968B0B}" type="datetimeFigureOut">
               <a:rPr lang="en-US" smtClean="0"/>
-              <a:t>9/28/2021</a:t>
+              <a:t>03-Oct-21</a:t>
             </a:fld>
             <a:endParaRPr lang="en-US"/>
           </a:p>
@@ -358,7 +359,7 @@
           <a:p>
             <a:fld id="{90C5D989-6414-4EC9-97AC-BCF628C5D8B9}" type="slidenum">
               <a:rPr lang="en-US" smtClean="0"/>
-              <a:t>‹Nº›</a:t>
+              <a:t>‹#›</a:t>
             </a:fld>
             <a:endParaRPr lang="en-US"/>
           </a:p>
@@ -714,7 +715,7 @@
           <a:p>
             <a:fld id="{39DCAF25-EC8E-4E4C-BCE0-6880FDA81677}" type="datetimeFigureOut">
               <a:rPr lang="en-US" smtClean="0"/>
-              <a:t>9/28/2021</a:t>
+              <a:t>03-Oct-21</a:t>
             </a:fld>
             <a:endParaRPr lang="en-US"/>
           </a:p>
@@ -768,7 +769,7 @@
           <a:p>
             <a:fld id="{ACB33697-2FA8-4DC4-A426-2A40D07A47EB}" type="slidenum">
               <a:rPr lang="en-US" smtClean="0"/>
-              <a:t>‹Nº›</a:t>
+              <a:t>‹#›</a:t>
             </a:fld>
             <a:endParaRPr lang="en-US"/>
           </a:p>
@@ -912,7 +913,7 @@
           <a:p>
             <a:fld id="{39DCAF25-EC8E-4E4C-BCE0-6880FDA81677}" type="datetimeFigureOut">
               <a:rPr lang="en-US" smtClean="0"/>
-              <a:t>9/28/2021</a:t>
+              <a:t>03-Oct-21</a:t>
             </a:fld>
             <a:endParaRPr lang="en-US"/>
           </a:p>
@@ -966,7 +967,7 @@
           <a:p>
             <a:fld id="{ACB33697-2FA8-4DC4-A426-2A40D07A47EB}" type="slidenum">
               <a:rPr lang="en-US" smtClean="0"/>
-              <a:t>‹Nº›</a:t>
+              <a:t>‹#›</a:t>
             </a:fld>
             <a:endParaRPr lang="en-US"/>
           </a:p>
@@ -1120,7 +1121,7 @@
           <a:p>
             <a:fld id="{39DCAF25-EC8E-4E4C-BCE0-6880FDA81677}" type="datetimeFigureOut">
               <a:rPr lang="en-US" smtClean="0"/>
-              <a:t>9/28/2021</a:t>
+              <a:t>03-Oct-21</a:t>
             </a:fld>
             <a:endParaRPr lang="en-US"/>
           </a:p>
@@ -1174,7 +1175,7 @@
           <a:p>
             <a:fld id="{ACB33697-2FA8-4DC4-A426-2A40D07A47EB}" type="slidenum">
               <a:rPr lang="en-US" smtClean="0"/>
-              <a:t>‹Nº›</a:t>
+              <a:t>‹#›</a:t>
             </a:fld>
             <a:endParaRPr lang="en-US"/>
           </a:p>
@@ -1318,7 +1319,7 @@
           <a:p>
             <a:fld id="{39DCAF25-EC8E-4E4C-BCE0-6880FDA81677}" type="datetimeFigureOut">
               <a:rPr lang="en-US" smtClean="0"/>
-              <a:t>9/28/2021</a:t>
+              <a:t>03-Oct-21</a:t>
             </a:fld>
             <a:endParaRPr lang="en-US"/>
           </a:p>
@@ -1372,7 +1373,7 @@
           <a:p>
             <a:fld id="{ACB33697-2FA8-4DC4-A426-2A40D07A47EB}" type="slidenum">
               <a:rPr lang="en-US" smtClean="0"/>
-              <a:t>‹Nº›</a:t>
+              <a:t>‹#›</a:t>
             </a:fld>
             <a:endParaRPr lang="en-US"/>
           </a:p>
@@ -1593,7 +1594,7 @@
           <a:p>
             <a:fld id="{39DCAF25-EC8E-4E4C-BCE0-6880FDA81677}" type="datetimeFigureOut">
               <a:rPr lang="en-US" smtClean="0"/>
-              <a:t>9/28/2021</a:t>
+              <a:t>03-Oct-21</a:t>
             </a:fld>
             <a:endParaRPr lang="en-US"/>
           </a:p>
@@ -1647,7 +1648,7 @@
           <a:p>
             <a:fld id="{ACB33697-2FA8-4DC4-A426-2A40D07A47EB}" type="slidenum">
               <a:rPr lang="en-US" smtClean="0"/>
-              <a:t>‹Nº›</a:t>
+              <a:t>‹#›</a:t>
             </a:fld>
             <a:endParaRPr lang="en-US"/>
           </a:p>
@@ -1858,7 +1859,7 @@
           <a:p>
             <a:fld id="{39DCAF25-EC8E-4E4C-BCE0-6880FDA81677}" type="datetimeFigureOut">
               <a:rPr lang="en-US" smtClean="0"/>
-              <a:t>9/28/2021</a:t>
+              <a:t>03-Oct-21</a:t>
             </a:fld>
             <a:endParaRPr lang="en-US"/>
           </a:p>
@@ -1912,7 +1913,7 @@
           <a:p>
             <a:fld id="{ACB33697-2FA8-4DC4-A426-2A40D07A47EB}" type="slidenum">
               <a:rPr lang="en-US" smtClean="0"/>
-              <a:t>‹Nº›</a:t>
+              <a:t>‹#›</a:t>
             </a:fld>
             <a:endParaRPr lang="en-US"/>
           </a:p>
@@ -2270,7 +2271,7 @@
           <a:p>
             <a:fld id="{39DCAF25-EC8E-4E4C-BCE0-6880FDA81677}" type="datetimeFigureOut">
               <a:rPr lang="en-US" smtClean="0"/>
-              <a:t>9/28/2021</a:t>
+              <a:t>03-Oct-21</a:t>
             </a:fld>
             <a:endParaRPr lang="en-US"/>
           </a:p>
@@ -2324,7 +2325,7 @@
           <a:p>
             <a:fld id="{ACB33697-2FA8-4DC4-A426-2A40D07A47EB}" type="slidenum">
               <a:rPr lang="en-US" smtClean="0"/>
-              <a:t>‹Nº›</a:t>
+              <a:t>‹#›</a:t>
             </a:fld>
             <a:endParaRPr lang="en-US"/>
           </a:p>
@@ -2411,7 +2412,7 @@
           <a:p>
             <a:fld id="{39DCAF25-EC8E-4E4C-BCE0-6880FDA81677}" type="datetimeFigureOut">
               <a:rPr lang="en-US" smtClean="0"/>
-              <a:t>9/28/2021</a:t>
+              <a:t>03-Oct-21</a:t>
             </a:fld>
             <a:endParaRPr lang="en-US"/>
           </a:p>
@@ -2465,7 +2466,7 @@
           <a:p>
             <a:fld id="{ACB33697-2FA8-4DC4-A426-2A40D07A47EB}" type="slidenum">
               <a:rPr lang="en-US" smtClean="0"/>
-              <a:t>‹Nº›</a:t>
+              <a:t>‹#›</a:t>
             </a:fld>
             <a:endParaRPr lang="en-US"/>
           </a:p>
@@ -2524,7 +2525,7 @@
           <a:p>
             <a:fld id="{39DCAF25-EC8E-4E4C-BCE0-6880FDA81677}" type="datetimeFigureOut">
               <a:rPr lang="en-US" smtClean="0"/>
-              <a:t>9/28/2021</a:t>
+              <a:t>03-Oct-21</a:t>
             </a:fld>
             <a:endParaRPr lang="en-US"/>
           </a:p>
@@ -2578,7 +2579,7 @@
           <a:p>
             <a:fld id="{ACB33697-2FA8-4DC4-A426-2A40D07A47EB}" type="slidenum">
               <a:rPr lang="en-US" smtClean="0"/>
-              <a:t>‹Nº›</a:t>
+              <a:t>‹#›</a:t>
             </a:fld>
             <a:endParaRPr lang="en-US"/>
           </a:p>
@@ -2835,7 +2836,7 @@
           <a:p>
             <a:fld id="{39DCAF25-EC8E-4E4C-BCE0-6880FDA81677}" type="datetimeFigureOut">
               <a:rPr lang="en-US" smtClean="0"/>
-              <a:t>9/28/2021</a:t>
+              <a:t>03-Oct-21</a:t>
             </a:fld>
             <a:endParaRPr lang="en-US"/>
           </a:p>
@@ -2889,7 +2890,7 @@
           <a:p>
             <a:fld id="{ACB33697-2FA8-4DC4-A426-2A40D07A47EB}" type="slidenum">
               <a:rPr lang="en-US" smtClean="0"/>
-              <a:t>‹Nº›</a:t>
+              <a:t>‹#›</a:t>
             </a:fld>
             <a:endParaRPr lang="en-US"/>
           </a:p>
@@ -3123,7 +3124,7 @@
           <a:p>
             <a:fld id="{39DCAF25-EC8E-4E4C-BCE0-6880FDA81677}" type="datetimeFigureOut">
               <a:rPr lang="en-US" smtClean="0"/>
-              <a:t>9/28/2021</a:t>
+              <a:t>03-Oct-21</a:t>
             </a:fld>
             <a:endParaRPr lang="en-US"/>
           </a:p>
@@ -3177,7 +3178,7 @@
           <a:p>
             <a:fld id="{ACB33697-2FA8-4DC4-A426-2A40D07A47EB}" type="slidenum">
               <a:rPr lang="en-US" smtClean="0"/>
-              <a:t>‹Nº›</a:t>
+              <a:t>‹#›</a:t>
             </a:fld>
             <a:endParaRPr lang="en-US"/>
           </a:p>
@@ -3364,7 +3365,7 @@
           <a:p>
             <a:fld id="{39DCAF25-EC8E-4E4C-BCE0-6880FDA81677}" type="datetimeFigureOut">
               <a:rPr lang="en-US" smtClean="0"/>
-              <a:t>9/28/2021</a:t>
+              <a:t>03-Oct-21</a:t>
             </a:fld>
             <a:endParaRPr lang="en-US"/>
           </a:p>
@@ -3454,7 +3455,7 @@
           <a:p>
             <a:fld id="{ACB33697-2FA8-4DC4-A426-2A40D07A47EB}" type="slidenum">
               <a:rPr lang="en-US" smtClean="0"/>
-              <a:t>‹Nº›</a:t>
+              <a:t>‹#›</a:t>
             </a:fld>
             <a:endParaRPr lang="en-US"/>
           </a:p>
@@ -3943,6 +3944,66 @@
     <p:extLst>
       <p:ext uri="{BB962C8B-B14F-4D97-AF65-F5344CB8AC3E}">
         <p14:creationId xmlns:p14="http://schemas.microsoft.com/office/powerpoint/2010/main" val="4112933987"/>
+      </p:ext>
+    </p:extLst>
+  </p:cSld>
+  <p:clrMapOvr>
+    <a:masterClrMapping/>
+  </p:clrMapOvr>
+</p:sld>
+</file>
+
+<file path=ppt/slides/slide4.xml><?xml version="1.0" encoding="utf-8"?>
+<p:sld xmlns:a="http://schemas.openxmlformats.org/drawingml/2006/main" xmlns:r="http://schemas.openxmlformats.org/officeDocument/2006/relationships" xmlns:p="http://schemas.openxmlformats.org/presentationml/2006/main">
+  <p:cSld>
+    <p:spTree>
+      <p:nvGrpSpPr>
+        <p:cNvPr id="1" name=""/>
+        <p:cNvGrpSpPr/>
+        <p:nvPr/>
+      </p:nvGrpSpPr>
+      <p:grpSpPr>
+        <a:xfrm>
+          <a:off x="0" y="0"/>
+          <a:ext cx="0" cy="0"/>
+          <a:chOff x="0" y="0"/>
+          <a:chExt cx="0" cy="0"/>
+        </a:xfrm>
+      </p:grpSpPr>
+      <p:pic>
+        <p:nvPicPr>
+          <p:cNvPr id="7" name="Picture 6">
+            <a:extLst>
+              <a:ext uri="{FF2B5EF4-FFF2-40B4-BE49-F238E27FC236}">
+                <a16:creationId xmlns:a16="http://schemas.microsoft.com/office/drawing/2014/main" id="{62D95D31-32D0-42F8-9EE7-07F76C09B7C6}"/>
+              </a:ext>
+            </a:extLst>
+          </p:cNvPr>
+          <p:cNvPicPr>
+            <a:picLocks noChangeAspect="1"/>
+          </p:cNvPicPr>
+          <p:nvPr/>
+        </p:nvPicPr>
+        <p:blipFill>
+          <a:blip r:embed="rId2"/>
+          <a:stretch>
+            <a:fillRect/>
+          </a:stretch>
+        </p:blipFill>
+        <p:spPr>
+          <a:xfrm>
+            <a:off x="170820" y="1151706"/>
+            <a:ext cx="11850360" cy="4554587"/>
+          </a:xfrm>
+          <a:prstGeom prst="rect">
+            <a:avLst/>
+          </a:prstGeom>
+        </p:spPr>
+      </p:pic>
+    </p:spTree>
+    <p:extLst>
+      <p:ext uri="{BB962C8B-B14F-4D97-AF65-F5344CB8AC3E}">
+        <p14:creationId xmlns:p14="http://schemas.microsoft.com/office/powerpoint/2010/main" val="2223719436"/>
       </p:ext>
     </p:extLst>
   </p:cSld>

</xml_diff>

<commit_message>
Se empezo a hacer las user stories.
</commit_message>
<xml_diff>
--- a/Iteracion1/TaskBoard.pptx
+++ b/Iteracion1/TaskBoard.pptx
@@ -5,13 +5,14 @@
     <p:sldMasterId id="2147483648" r:id="rId1"/>
   </p:sldMasterIdLst>
   <p:notesMasterIdLst>
-    <p:notesMasterId r:id="rId6"/>
+    <p:notesMasterId r:id="rId7"/>
   </p:notesMasterIdLst>
   <p:sldIdLst>
     <p:sldId id="256" r:id="rId2"/>
     <p:sldId id="257" r:id="rId3"/>
     <p:sldId id="258" r:id="rId4"/>
     <p:sldId id="259" r:id="rId5"/>
+    <p:sldId id="260" r:id="rId6"/>
   </p:sldIdLst>
   <p:sldSz cx="12192000" cy="6858000"/>
   <p:notesSz cx="6858000" cy="9144000"/>
@@ -359,7 +360,7 @@
           <a:p>
             <a:fld id="{90C5D989-6414-4EC9-97AC-BCF628C5D8B9}" type="slidenum">
               <a:rPr lang="en-US" smtClean="0"/>
-              <a:t>‹#›</a:t>
+              <a:t>‹Nº›</a:t>
             </a:fld>
             <a:endParaRPr lang="en-US"/>
           </a:p>
@@ -568,6 +569,118 @@
 </p:notes>
 </file>
 
+<file path=ppt/notesSlides/notesSlide2.xml><?xml version="1.0" encoding="utf-8"?>
+<p:notes xmlns:a="http://schemas.openxmlformats.org/drawingml/2006/main" xmlns:r="http://schemas.openxmlformats.org/officeDocument/2006/relationships" xmlns:p="http://schemas.openxmlformats.org/presentationml/2006/main">
+  <p:cSld>
+    <p:spTree>
+      <p:nvGrpSpPr>
+        <p:cNvPr id="1" name=""/>
+        <p:cNvGrpSpPr/>
+        <p:nvPr/>
+      </p:nvGrpSpPr>
+      <p:grpSpPr>
+        <a:xfrm>
+          <a:off x="0" y="0"/>
+          <a:ext cx="0" cy="0"/>
+          <a:chOff x="0" y="0"/>
+          <a:chExt cx="0" cy="0"/>
+        </a:xfrm>
+      </p:grpSpPr>
+      <p:sp>
+        <p:nvSpPr>
+          <p:cNvPr id="2" name="Marcador de imagen de diapositiva 1"/>
+          <p:cNvSpPr>
+            <a:spLocks noGrp="1" noRot="1" noChangeAspect="1"/>
+          </p:cNvSpPr>
+          <p:nvPr>
+            <p:ph type="sldImg"/>
+          </p:nvPr>
+        </p:nvSpPr>
+        <p:spPr/>
+      </p:sp>
+      <p:sp>
+        <p:nvSpPr>
+          <p:cNvPr id="3" name="Marcador de notas 2"/>
+          <p:cNvSpPr>
+            <a:spLocks noGrp="1"/>
+          </p:cNvSpPr>
+          <p:nvPr>
+            <p:ph type="body" idx="1"/>
+          </p:nvPr>
+        </p:nvSpPr>
+        <p:spPr/>
+        <p:txBody>
+          <a:bodyPr/>
+          <a:lstStyle/>
+          <a:p>
+            <a:r>
+              <a:rPr lang="en-US" dirty="0" err="1"/>
+              <a:t>Empezamos</a:t>
+            </a:r>
+            <a:r>
+              <a:rPr lang="en-US" dirty="0"/>
+              <a:t> a </a:t>
+            </a:r>
+            <a:r>
+              <a:rPr lang="en-US" dirty="0" err="1"/>
+              <a:t>hacer</a:t>
+            </a:r>
+            <a:r>
+              <a:rPr lang="en-US" dirty="0"/>
+              <a:t> las </a:t>
+            </a:r>
+            <a:r>
+              <a:rPr lang="en-US" dirty="0" err="1"/>
+              <a:t>historias</a:t>
+            </a:r>
+            <a:r>
+              <a:rPr lang="en-US" dirty="0"/>
+              <a:t> de </a:t>
+            </a:r>
+            <a:r>
+              <a:rPr lang="en-US" dirty="0" err="1"/>
+              <a:t>Usuario</a:t>
+            </a:r>
+            <a:endParaRPr lang="en-US" dirty="0"/>
+          </a:p>
+        </p:txBody>
+      </p:sp>
+      <p:sp>
+        <p:nvSpPr>
+          <p:cNvPr id="4" name="Marcador de número de diapositiva 3"/>
+          <p:cNvSpPr>
+            <a:spLocks noGrp="1"/>
+          </p:cNvSpPr>
+          <p:nvPr>
+            <p:ph type="sldNum" sz="quarter" idx="5"/>
+          </p:nvPr>
+        </p:nvSpPr>
+        <p:spPr/>
+        <p:txBody>
+          <a:bodyPr/>
+          <a:lstStyle/>
+          <a:p>
+            <a:fld id="{90C5D989-6414-4EC9-97AC-BCF628C5D8B9}" type="slidenum">
+              <a:rPr lang="en-US" smtClean="0"/>
+              <a:t>5</a:t>
+            </a:fld>
+            <a:endParaRPr lang="en-US"/>
+          </a:p>
+        </p:txBody>
+      </p:sp>
+    </p:spTree>
+    <p:extLst>
+      <p:ext uri="{BB962C8B-B14F-4D97-AF65-F5344CB8AC3E}">
+        <p14:creationId xmlns:p14="http://schemas.microsoft.com/office/powerpoint/2010/main" val="878510528"/>
+      </p:ext>
+    </p:extLst>
+  </p:cSld>
+  <p:clrMapOvr>
+    <a:masterClrMapping/>
+  </p:clrMapOvr>
+</p:notes>
+</file>
+
 <file path=ppt/slideLayouts/slideLayout1.xml><?xml version="1.0" encoding="utf-8"?>
 <p:sldLayout xmlns:a="http://schemas.openxmlformats.org/drawingml/2006/main" xmlns:r="http://schemas.openxmlformats.org/officeDocument/2006/relationships" xmlns:p="http://schemas.openxmlformats.org/presentationml/2006/main" type="title" preserve="1">
   <p:cSld name="Title Slide">
@@ -769,7 +882,7 @@
           <a:p>
             <a:fld id="{ACB33697-2FA8-4DC4-A426-2A40D07A47EB}" type="slidenum">
               <a:rPr lang="en-US" smtClean="0"/>
-              <a:t>‹#›</a:t>
+              <a:t>‹Nº›</a:t>
             </a:fld>
             <a:endParaRPr lang="en-US"/>
           </a:p>
@@ -967,7 +1080,7 @@
           <a:p>
             <a:fld id="{ACB33697-2FA8-4DC4-A426-2A40D07A47EB}" type="slidenum">
               <a:rPr lang="en-US" smtClean="0"/>
-              <a:t>‹#›</a:t>
+              <a:t>‹Nº›</a:t>
             </a:fld>
             <a:endParaRPr lang="en-US"/>
           </a:p>
@@ -1175,7 +1288,7 @@
           <a:p>
             <a:fld id="{ACB33697-2FA8-4DC4-A426-2A40D07A47EB}" type="slidenum">
               <a:rPr lang="en-US" smtClean="0"/>
-              <a:t>‹#›</a:t>
+              <a:t>‹Nº›</a:t>
             </a:fld>
             <a:endParaRPr lang="en-US"/>
           </a:p>
@@ -1373,7 +1486,7 @@
           <a:p>
             <a:fld id="{ACB33697-2FA8-4DC4-A426-2A40D07A47EB}" type="slidenum">
               <a:rPr lang="en-US" smtClean="0"/>
-              <a:t>‹#›</a:t>
+              <a:t>‹Nº›</a:t>
             </a:fld>
             <a:endParaRPr lang="en-US"/>
           </a:p>
@@ -1648,7 +1761,7 @@
           <a:p>
             <a:fld id="{ACB33697-2FA8-4DC4-A426-2A40D07A47EB}" type="slidenum">
               <a:rPr lang="en-US" smtClean="0"/>
-              <a:t>‹#›</a:t>
+              <a:t>‹Nº›</a:t>
             </a:fld>
             <a:endParaRPr lang="en-US"/>
           </a:p>
@@ -1913,7 +2026,7 @@
           <a:p>
             <a:fld id="{ACB33697-2FA8-4DC4-A426-2A40D07A47EB}" type="slidenum">
               <a:rPr lang="en-US" smtClean="0"/>
-              <a:t>‹#›</a:t>
+              <a:t>‹Nº›</a:t>
             </a:fld>
             <a:endParaRPr lang="en-US"/>
           </a:p>
@@ -2325,7 +2438,7 @@
           <a:p>
             <a:fld id="{ACB33697-2FA8-4DC4-A426-2A40D07A47EB}" type="slidenum">
               <a:rPr lang="en-US" smtClean="0"/>
-              <a:t>‹#›</a:t>
+              <a:t>‹Nº›</a:t>
             </a:fld>
             <a:endParaRPr lang="en-US"/>
           </a:p>
@@ -2466,7 +2579,7 @@
           <a:p>
             <a:fld id="{ACB33697-2FA8-4DC4-A426-2A40D07A47EB}" type="slidenum">
               <a:rPr lang="en-US" smtClean="0"/>
-              <a:t>‹#›</a:t>
+              <a:t>‹Nº›</a:t>
             </a:fld>
             <a:endParaRPr lang="en-US"/>
           </a:p>
@@ -2579,7 +2692,7 @@
           <a:p>
             <a:fld id="{ACB33697-2FA8-4DC4-A426-2A40D07A47EB}" type="slidenum">
               <a:rPr lang="en-US" smtClean="0"/>
-              <a:t>‹#›</a:t>
+              <a:t>‹Nº›</a:t>
             </a:fld>
             <a:endParaRPr lang="en-US"/>
           </a:p>
@@ -2890,7 +3003,7 @@
           <a:p>
             <a:fld id="{ACB33697-2FA8-4DC4-A426-2A40D07A47EB}" type="slidenum">
               <a:rPr lang="en-US" smtClean="0"/>
-              <a:t>‹#›</a:t>
+              <a:t>‹Nº›</a:t>
             </a:fld>
             <a:endParaRPr lang="en-US"/>
           </a:p>
@@ -3178,7 +3291,7 @@
           <a:p>
             <a:fld id="{ACB33697-2FA8-4DC4-A426-2A40D07A47EB}" type="slidenum">
               <a:rPr lang="en-US" smtClean="0"/>
-              <a:t>‹#›</a:t>
+              <a:t>‹Nº›</a:t>
             </a:fld>
             <a:endParaRPr lang="en-US"/>
           </a:p>
@@ -3455,7 +3568,7 @@
           <a:p>
             <a:fld id="{ACB33697-2FA8-4DC4-A426-2A40D07A47EB}" type="slidenum">
               <a:rPr lang="en-US" smtClean="0"/>
-              <a:t>‹#›</a:t>
+              <a:t>‹Nº›</a:t>
             </a:fld>
             <a:endParaRPr lang="en-US"/>
           </a:p>
@@ -4004,6 +4117,66 @@
     <p:extLst>
       <p:ext uri="{BB962C8B-B14F-4D97-AF65-F5344CB8AC3E}">
         <p14:creationId xmlns:p14="http://schemas.microsoft.com/office/powerpoint/2010/main" val="2223719436"/>
+      </p:ext>
+    </p:extLst>
+  </p:cSld>
+  <p:clrMapOvr>
+    <a:masterClrMapping/>
+  </p:clrMapOvr>
+</p:sld>
+</file>
+
+<file path=ppt/slides/slide5.xml><?xml version="1.0" encoding="utf-8"?>
+<p:sld xmlns:a="http://schemas.openxmlformats.org/drawingml/2006/main" xmlns:r="http://schemas.openxmlformats.org/officeDocument/2006/relationships" xmlns:p="http://schemas.openxmlformats.org/presentationml/2006/main">
+  <p:cSld>
+    <p:spTree>
+      <p:nvGrpSpPr>
+        <p:cNvPr id="1" name=""/>
+        <p:cNvGrpSpPr/>
+        <p:nvPr/>
+      </p:nvGrpSpPr>
+      <p:grpSpPr>
+        <a:xfrm>
+          <a:off x="0" y="0"/>
+          <a:ext cx="0" cy="0"/>
+          <a:chOff x="0" y="0"/>
+          <a:chExt cx="0" cy="0"/>
+        </a:xfrm>
+      </p:grpSpPr>
+      <p:pic>
+        <p:nvPicPr>
+          <p:cNvPr id="5" name="Imagen 4">
+            <a:extLst>
+              <a:ext uri="{FF2B5EF4-FFF2-40B4-BE49-F238E27FC236}">
+                <a16:creationId xmlns:a16="http://schemas.microsoft.com/office/drawing/2014/main" id="{7D904D1D-04FD-4F84-B92D-821D6435798E}"/>
+              </a:ext>
+            </a:extLst>
+          </p:cNvPr>
+          <p:cNvPicPr>
+            <a:picLocks noChangeAspect="1"/>
+          </p:cNvPicPr>
+          <p:nvPr/>
+        </p:nvPicPr>
+        <p:blipFill>
+          <a:blip r:embed="rId3"/>
+          <a:stretch>
+            <a:fillRect/>
+          </a:stretch>
+        </p:blipFill>
+        <p:spPr>
+          <a:xfrm>
+            <a:off x="1199466" y="1066470"/>
+            <a:ext cx="9793067" cy="4725059"/>
+          </a:xfrm>
+          <a:prstGeom prst="rect">
+            <a:avLst/>
+          </a:prstGeom>
+        </p:spPr>
+      </p:pic>
+    </p:spTree>
+    <p:extLst>
+      <p:ext uri="{BB962C8B-B14F-4D97-AF65-F5344CB8AC3E}">
+        <p14:creationId xmlns:p14="http://schemas.microsoft.com/office/powerpoint/2010/main" val="2087786723"/>
       </p:ext>
     </p:extLst>
   </p:cSld>

</xml_diff>

<commit_message>
Pasado Identidicacion de interesados, Lista de funcionalidades por interesado e historias de Usuario a Done.
</commit_message>
<xml_diff>
--- a/Iteracion1/TaskBoard.pptx
+++ b/Iteracion1/TaskBoard.pptx
@@ -5,7 +5,7 @@
     <p:sldMasterId id="2147483648" r:id="rId1"/>
   </p:sldMasterIdLst>
   <p:notesMasterIdLst>
-    <p:notesMasterId r:id="rId7"/>
+    <p:notesMasterId r:id="rId8"/>
   </p:notesMasterIdLst>
   <p:sldIdLst>
     <p:sldId id="256" r:id="rId2"/>
@@ -13,6 +13,7 @@
     <p:sldId id="258" r:id="rId4"/>
     <p:sldId id="259" r:id="rId5"/>
     <p:sldId id="260" r:id="rId6"/>
+    <p:sldId id="261" r:id="rId7"/>
   </p:sldIdLst>
   <p:sldSz cx="12192000" cy="6858000"/>
   <p:notesSz cx="6858000" cy="9144000"/>
@@ -641,6 +642,10 @@
               <a:rPr lang="en-US" dirty="0" err="1"/>
               <a:t>Usuario</a:t>
             </a:r>
+            <a:r>
+              <a:rPr lang="en-US"/>
+              <a:t>.</a:t>
+            </a:r>
             <a:endParaRPr lang="en-US" dirty="0"/>
           </a:p>
         </p:txBody>
@@ -672,6 +677,142 @@
     <p:extLst>
       <p:ext uri="{BB962C8B-B14F-4D97-AF65-F5344CB8AC3E}">
         <p14:creationId xmlns:p14="http://schemas.microsoft.com/office/powerpoint/2010/main" val="878510528"/>
+      </p:ext>
+    </p:extLst>
+  </p:cSld>
+  <p:clrMapOvr>
+    <a:masterClrMapping/>
+  </p:clrMapOvr>
+</p:notes>
+</file>
+
+<file path=ppt/notesSlides/notesSlide3.xml><?xml version="1.0" encoding="utf-8"?>
+<p:notes xmlns:a="http://schemas.openxmlformats.org/drawingml/2006/main" xmlns:r="http://schemas.openxmlformats.org/officeDocument/2006/relationships" xmlns:p="http://schemas.openxmlformats.org/presentationml/2006/main">
+  <p:cSld>
+    <p:spTree>
+      <p:nvGrpSpPr>
+        <p:cNvPr id="1" name=""/>
+        <p:cNvGrpSpPr/>
+        <p:nvPr/>
+      </p:nvGrpSpPr>
+      <p:grpSpPr>
+        <a:xfrm>
+          <a:off x="0" y="0"/>
+          <a:ext cx="0" cy="0"/>
+          <a:chOff x="0" y="0"/>
+          <a:chExt cx="0" cy="0"/>
+        </a:xfrm>
+      </p:grpSpPr>
+      <p:sp>
+        <p:nvSpPr>
+          <p:cNvPr id="2" name="Marcador de imagen de diapositiva 1"/>
+          <p:cNvSpPr>
+            <a:spLocks noGrp="1" noRot="1" noChangeAspect="1"/>
+          </p:cNvSpPr>
+          <p:nvPr>
+            <p:ph type="sldImg"/>
+          </p:nvPr>
+        </p:nvSpPr>
+        <p:spPr/>
+      </p:sp>
+      <p:sp>
+        <p:nvSpPr>
+          <p:cNvPr id="3" name="Marcador de notas 2"/>
+          <p:cNvSpPr>
+            <a:spLocks noGrp="1"/>
+          </p:cNvSpPr>
+          <p:nvPr>
+            <p:ph type="body" idx="1"/>
+          </p:nvPr>
+        </p:nvSpPr>
+        <p:spPr/>
+        <p:txBody>
+          <a:bodyPr/>
+          <a:lstStyle/>
+          <a:p>
+            <a:r>
+              <a:rPr lang="en-US" dirty="0" err="1"/>
+              <a:t>Completada</a:t>
+            </a:r>
+            <a:r>
+              <a:rPr lang="en-US" dirty="0"/>
+              <a:t> la </a:t>
+            </a:r>
+            <a:r>
+              <a:rPr lang="en-US" dirty="0" err="1"/>
+              <a:t>identificación</a:t>
+            </a:r>
+            <a:r>
+              <a:rPr lang="en-US" dirty="0"/>
+              <a:t> de </a:t>
+            </a:r>
+            <a:r>
+              <a:rPr lang="en-US" dirty="0" err="1"/>
+              <a:t>interesados</a:t>
+            </a:r>
+            <a:r>
+              <a:rPr lang="en-US" dirty="0"/>
+              <a:t> con sus </a:t>
+            </a:r>
+            <a:r>
+              <a:rPr lang="en-US" dirty="0" err="1"/>
+              <a:t>lista</a:t>
+            </a:r>
+            <a:r>
+              <a:rPr lang="en-US" dirty="0"/>
+              <a:t> de </a:t>
+            </a:r>
+            <a:r>
+              <a:rPr lang="en-US" dirty="0" err="1"/>
+              <a:t>funcionalidades</a:t>
+            </a:r>
+            <a:r>
+              <a:rPr lang="en-US" dirty="0"/>
+              <a:t> y las </a:t>
+            </a:r>
+            <a:r>
+              <a:rPr lang="en-US" dirty="0" err="1"/>
+              <a:t>historias</a:t>
+            </a:r>
+            <a:r>
+              <a:rPr lang="en-US" dirty="0"/>
+              <a:t> de </a:t>
+            </a:r>
+            <a:r>
+              <a:rPr lang="en-US" dirty="0" err="1"/>
+              <a:t>Usuario</a:t>
+            </a:r>
+            <a:endParaRPr lang="en-US" dirty="0"/>
+          </a:p>
+        </p:txBody>
+      </p:sp>
+      <p:sp>
+        <p:nvSpPr>
+          <p:cNvPr id="4" name="Marcador de número de diapositiva 3"/>
+          <p:cNvSpPr>
+            <a:spLocks noGrp="1"/>
+          </p:cNvSpPr>
+          <p:nvPr>
+            <p:ph type="sldNum" sz="quarter" idx="5"/>
+          </p:nvPr>
+        </p:nvSpPr>
+        <p:spPr/>
+        <p:txBody>
+          <a:bodyPr/>
+          <a:lstStyle/>
+          <a:p>
+            <a:fld id="{90C5D989-6414-4EC9-97AC-BCF628C5D8B9}" type="slidenum">
+              <a:rPr lang="en-US" smtClean="0"/>
+              <a:t>6</a:t>
+            </a:fld>
+            <a:endParaRPr lang="en-US"/>
+          </a:p>
+        </p:txBody>
+      </p:sp>
+    </p:spTree>
+    <p:extLst>
+      <p:ext uri="{BB962C8B-B14F-4D97-AF65-F5344CB8AC3E}">
+        <p14:creationId xmlns:p14="http://schemas.microsoft.com/office/powerpoint/2010/main" val="4157275663"/>
       </p:ext>
     </p:extLst>
   </p:cSld>
@@ -4177,6 +4318,66 @@
     <p:extLst>
       <p:ext uri="{BB962C8B-B14F-4D97-AF65-F5344CB8AC3E}">
         <p14:creationId xmlns:p14="http://schemas.microsoft.com/office/powerpoint/2010/main" val="2087786723"/>
+      </p:ext>
+    </p:extLst>
+  </p:cSld>
+  <p:clrMapOvr>
+    <a:masterClrMapping/>
+  </p:clrMapOvr>
+</p:sld>
+</file>
+
+<file path=ppt/slides/slide6.xml><?xml version="1.0" encoding="utf-8"?>
+<p:sld xmlns:a="http://schemas.openxmlformats.org/drawingml/2006/main" xmlns:r="http://schemas.openxmlformats.org/officeDocument/2006/relationships" xmlns:p="http://schemas.openxmlformats.org/presentationml/2006/main">
+  <p:cSld>
+    <p:spTree>
+      <p:nvGrpSpPr>
+        <p:cNvPr id="1" name=""/>
+        <p:cNvGrpSpPr/>
+        <p:nvPr/>
+      </p:nvGrpSpPr>
+      <p:grpSpPr>
+        <a:xfrm>
+          <a:off x="0" y="0"/>
+          <a:ext cx="0" cy="0"/>
+          <a:chOff x="0" y="0"/>
+          <a:chExt cx="0" cy="0"/>
+        </a:xfrm>
+      </p:grpSpPr>
+      <p:pic>
+        <p:nvPicPr>
+          <p:cNvPr id="5" name="Imagen 4">
+            <a:extLst>
+              <a:ext uri="{FF2B5EF4-FFF2-40B4-BE49-F238E27FC236}">
+                <a16:creationId xmlns:a16="http://schemas.microsoft.com/office/drawing/2014/main" id="{6AA6B252-525A-4612-8972-9442646E2AEA}"/>
+              </a:ext>
+            </a:extLst>
+          </p:cNvPr>
+          <p:cNvPicPr>
+            <a:picLocks noChangeAspect="1"/>
+          </p:cNvPicPr>
+          <p:nvPr/>
+        </p:nvPicPr>
+        <p:blipFill>
+          <a:blip r:embed="rId3"/>
+          <a:stretch>
+            <a:fillRect/>
+          </a:stretch>
+        </p:blipFill>
+        <p:spPr>
+          <a:xfrm>
+            <a:off x="1213756" y="1066470"/>
+            <a:ext cx="9764488" cy="4725059"/>
+          </a:xfrm>
+          <a:prstGeom prst="rect">
+            <a:avLst/>
+          </a:prstGeom>
+        </p:spPr>
+      </p:pic>
+    </p:spTree>
+    <p:extLst>
+      <p:ext uri="{BB962C8B-B14F-4D97-AF65-F5344CB8AC3E}">
+        <p14:creationId xmlns:p14="http://schemas.microsoft.com/office/powerpoint/2010/main" val="599276603"/>
       </p:ext>
     </p:extLst>
   </p:cSld>

</xml_diff>

<commit_message>
Completado el estudio de competidores
</commit_message>
<xml_diff>
--- a/Iteracion1/TaskBoard.pptx
+++ b/Iteracion1/TaskBoard.pptx
@@ -5,7 +5,7 @@
     <p:sldMasterId id="2147483648" r:id="rId1"/>
   </p:sldMasterIdLst>
   <p:notesMasterIdLst>
-    <p:notesMasterId r:id="rId8"/>
+    <p:notesMasterId r:id="rId9"/>
   </p:notesMasterIdLst>
   <p:sldIdLst>
     <p:sldId id="256" r:id="rId2"/>
@@ -14,6 +14,7 @@
     <p:sldId id="259" r:id="rId5"/>
     <p:sldId id="260" r:id="rId6"/>
     <p:sldId id="261" r:id="rId7"/>
+    <p:sldId id="262" r:id="rId8"/>
   </p:sldIdLst>
   <p:sldSz cx="12192000" cy="6858000"/>
   <p:notesSz cx="6858000" cy="9144000"/>
@@ -361,7 +362,7 @@
           <a:p>
             <a:fld id="{90C5D989-6414-4EC9-97AC-BCF628C5D8B9}" type="slidenum">
               <a:rPr lang="en-US" smtClean="0"/>
-              <a:t>‹Nº›</a:t>
+              <a:t>‹#›</a:t>
             </a:fld>
             <a:endParaRPr lang="en-US"/>
           </a:p>
@@ -589,7 +590,7 @@
       </p:grpSpPr>
       <p:sp>
         <p:nvSpPr>
-          <p:cNvPr id="2" name="Marcador de imagen de diapositiva 1"/>
+          <p:cNvPr id="2" name="Slide Image Placeholder 1"/>
           <p:cNvSpPr>
             <a:spLocks noGrp="1" noRot="1" noChangeAspect="1"/>
           </p:cNvSpPr>
@@ -601,7 +602,7 @@
       </p:sp>
       <p:sp>
         <p:nvSpPr>
-          <p:cNvPr id="3" name="Marcador de notas 2"/>
+          <p:cNvPr id="3" name="Notes Placeholder 2"/>
           <p:cNvSpPr>
             <a:spLocks noGrp="1"/>
           </p:cNvSpPr>
@@ -616,23 +617,7 @@
           <a:p>
             <a:r>
               <a:rPr lang="en-US" dirty="0" err="1"/>
-              <a:t>Empezamos</a:t>
-            </a:r>
-            <a:r>
-              <a:rPr lang="en-US" dirty="0"/>
-              <a:t> a </a:t>
-            </a:r>
-            <a:r>
-              <a:rPr lang="en-US" dirty="0" err="1"/>
-              <a:t>hacer</a:t>
-            </a:r>
-            <a:r>
-              <a:rPr lang="en-US" dirty="0"/>
-              <a:t> las </a:t>
-            </a:r>
-            <a:r>
-              <a:rPr lang="en-US" dirty="0" err="1"/>
-              <a:t>historias</a:t>
+              <a:t>Finalización</a:t>
             </a:r>
             <a:r>
               <a:rPr lang="en-US" dirty="0"/>
@@ -640,19 +625,58 @@
             </a:r>
             <a:r>
               <a:rPr lang="en-US" dirty="0" err="1"/>
-              <a:t>Usuario</a:t>
-            </a:r>
-            <a:r>
-              <a:rPr lang="en-US"/>
+              <a:t>planificación</a:t>
+            </a:r>
+            <a:r>
+              <a:rPr lang="en-US" dirty="0"/>
+              <a:t> y </a:t>
+            </a:r>
+            <a:r>
+              <a:rPr lang="en-US" dirty="0" err="1"/>
+              <a:t>comienzo</a:t>
+            </a:r>
+            <a:r>
+              <a:rPr lang="en-US" dirty="0"/>
+              <a:t> de Lista de </a:t>
+            </a:r>
+            <a:r>
+              <a:rPr lang="en-US" dirty="0" err="1"/>
+              <a:t>funcionalidades</a:t>
+            </a:r>
+            <a:r>
+              <a:rPr lang="en-US" dirty="0"/>
+              <a:t> por </a:t>
+            </a:r>
+            <a:r>
+              <a:rPr lang="en-US" dirty="0" err="1"/>
+              <a:t>interesado</a:t>
+            </a:r>
+            <a:r>
+              <a:rPr lang="en-US" dirty="0"/>
+              <a:t> y </a:t>
+            </a:r>
+            <a:r>
+              <a:rPr lang="en-US" dirty="0" err="1"/>
+              <a:t>identificación</a:t>
+            </a:r>
+            <a:r>
+              <a:rPr lang="en-US" dirty="0"/>
+              <a:t> de </a:t>
+            </a:r>
+            <a:r>
+              <a:rPr lang="en-US" dirty="0" err="1"/>
+              <a:t>interesados</a:t>
+            </a:r>
+            <a:r>
+              <a:rPr lang="en-US" dirty="0"/>
               <a:t>.</a:t>
             </a:r>
-            <a:endParaRPr lang="en-US" dirty="0"/>
-          </a:p>
-        </p:txBody>
-      </p:sp>
-      <p:sp>
-        <p:nvSpPr>
-          <p:cNvPr id="4" name="Marcador de número de diapositiva 3"/>
+          </a:p>
+        </p:txBody>
+      </p:sp>
+      <p:sp>
+        <p:nvSpPr>
+          <p:cNvPr id="4" name="Slide Number Placeholder 3"/>
           <p:cNvSpPr>
             <a:spLocks noGrp="1"/>
           </p:cNvSpPr>
@@ -667,7 +691,7 @@
           <a:p>
             <a:fld id="{90C5D989-6414-4EC9-97AC-BCF628C5D8B9}" type="slidenum">
               <a:rPr lang="en-US" smtClean="0"/>
-              <a:t>5</a:t>
+              <a:t>3</a:t>
             </a:fld>
             <a:endParaRPr lang="en-US"/>
           </a:p>
@@ -676,7 +700,7 @@
     </p:spTree>
     <p:extLst>
       <p:ext uri="{BB962C8B-B14F-4D97-AF65-F5344CB8AC3E}">
-        <p14:creationId xmlns:p14="http://schemas.microsoft.com/office/powerpoint/2010/main" val="878510528"/>
+        <p14:creationId xmlns:p14="http://schemas.microsoft.com/office/powerpoint/2010/main" val="784669118"/>
       </p:ext>
     </p:extLst>
   </p:cSld>
@@ -705,6 +729,226 @@
       </p:grpSpPr>
       <p:sp>
         <p:nvSpPr>
+          <p:cNvPr id="2" name="Slide Image Placeholder 1"/>
+          <p:cNvSpPr>
+            <a:spLocks noGrp="1" noRot="1" noChangeAspect="1"/>
+          </p:cNvSpPr>
+          <p:nvPr>
+            <p:ph type="sldImg"/>
+          </p:nvPr>
+        </p:nvSpPr>
+        <p:spPr/>
+      </p:sp>
+      <p:sp>
+        <p:nvSpPr>
+          <p:cNvPr id="3" name="Notes Placeholder 2"/>
+          <p:cNvSpPr>
+            <a:spLocks noGrp="1"/>
+          </p:cNvSpPr>
+          <p:nvPr>
+            <p:ph type="body" idx="1"/>
+          </p:nvPr>
+        </p:nvSpPr>
+        <p:spPr/>
+        <p:txBody>
+          <a:bodyPr/>
+          <a:lstStyle/>
+          <a:p>
+            <a:r>
+              <a:rPr lang="en-US" dirty="0" err="1"/>
+              <a:t>Comienzo</a:t>
+            </a:r>
+            <a:r>
+              <a:rPr lang="en-US" dirty="0"/>
+              <a:t> de </a:t>
+            </a:r>
+            <a:r>
+              <a:rPr lang="en-US" dirty="0" err="1"/>
+              <a:t>estudio</a:t>
+            </a:r>
+            <a:r>
+              <a:rPr lang="en-US" dirty="0"/>
+              <a:t> </a:t>
+            </a:r>
+            <a:r>
+              <a:rPr lang="en-US" dirty="0" err="1"/>
+              <a:t>competidores</a:t>
+            </a:r>
+            <a:endParaRPr lang="en-US" dirty="0"/>
+          </a:p>
+        </p:txBody>
+      </p:sp>
+      <p:sp>
+        <p:nvSpPr>
+          <p:cNvPr id="4" name="Slide Number Placeholder 3"/>
+          <p:cNvSpPr>
+            <a:spLocks noGrp="1"/>
+          </p:cNvSpPr>
+          <p:nvPr>
+            <p:ph type="sldNum" sz="quarter" idx="5"/>
+          </p:nvPr>
+        </p:nvSpPr>
+        <p:spPr/>
+        <p:txBody>
+          <a:bodyPr/>
+          <a:lstStyle/>
+          <a:p>
+            <a:fld id="{90C5D989-6414-4EC9-97AC-BCF628C5D8B9}" type="slidenum">
+              <a:rPr lang="en-US" smtClean="0"/>
+              <a:t>4</a:t>
+            </a:fld>
+            <a:endParaRPr lang="en-US"/>
+          </a:p>
+        </p:txBody>
+      </p:sp>
+    </p:spTree>
+    <p:extLst>
+      <p:ext uri="{BB962C8B-B14F-4D97-AF65-F5344CB8AC3E}">
+        <p14:creationId xmlns:p14="http://schemas.microsoft.com/office/powerpoint/2010/main" val="3846615883"/>
+      </p:ext>
+    </p:extLst>
+  </p:cSld>
+  <p:clrMapOvr>
+    <a:masterClrMapping/>
+  </p:clrMapOvr>
+</p:notes>
+</file>
+
+<file path=ppt/notesSlides/notesSlide4.xml><?xml version="1.0" encoding="utf-8"?>
+<p:notes xmlns:a="http://schemas.openxmlformats.org/drawingml/2006/main" xmlns:r="http://schemas.openxmlformats.org/officeDocument/2006/relationships" xmlns:p="http://schemas.openxmlformats.org/presentationml/2006/main">
+  <p:cSld>
+    <p:spTree>
+      <p:nvGrpSpPr>
+        <p:cNvPr id="1" name=""/>
+        <p:cNvGrpSpPr/>
+        <p:nvPr/>
+      </p:nvGrpSpPr>
+      <p:grpSpPr>
+        <a:xfrm>
+          <a:off x="0" y="0"/>
+          <a:ext cx="0" cy="0"/>
+          <a:chOff x="0" y="0"/>
+          <a:chExt cx="0" cy="0"/>
+        </a:xfrm>
+      </p:grpSpPr>
+      <p:sp>
+        <p:nvSpPr>
+          <p:cNvPr id="2" name="Marcador de imagen de diapositiva 1"/>
+          <p:cNvSpPr>
+            <a:spLocks noGrp="1" noRot="1" noChangeAspect="1"/>
+          </p:cNvSpPr>
+          <p:nvPr>
+            <p:ph type="sldImg"/>
+          </p:nvPr>
+        </p:nvSpPr>
+        <p:spPr/>
+      </p:sp>
+      <p:sp>
+        <p:nvSpPr>
+          <p:cNvPr id="3" name="Marcador de notas 2"/>
+          <p:cNvSpPr>
+            <a:spLocks noGrp="1"/>
+          </p:cNvSpPr>
+          <p:nvPr>
+            <p:ph type="body" idx="1"/>
+          </p:nvPr>
+        </p:nvSpPr>
+        <p:spPr/>
+        <p:txBody>
+          <a:bodyPr/>
+          <a:lstStyle/>
+          <a:p>
+            <a:r>
+              <a:rPr lang="en-US" dirty="0" err="1"/>
+              <a:t>Empezamos</a:t>
+            </a:r>
+            <a:r>
+              <a:rPr lang="en-US" dirty="0"/>
+              <a:t> a </a:t>
+            </a:r>
+            <a:r>
+              <a:rPr lang="en-US" dirty="0" err="1"/>
+              <a:t>hacer</a:t>
+            </a:r>
+            <a:r>
+              <a:rPr lang="en-US" dirty="0"/>
+              <a:t> las </a:t>
+            </a:r>
+            <a:r>
+              <a:rPr lang="en-US" dirty="0" err="1"/>
+              <a:t>historias</a:t>
+            </a:r>
+            <a:r>
+              <a:rPr lang="en-US" dirty="0"/>
+              <a:t> de </a:t>
+            </a:r>
+            <a:r>
+              <a:rPr lang="en-US" dirty="0" err="1"/>
+              <a:t>Usuario</a:t>
+            </a:r>
+            <a:r>
+              <a:rPr lang="en-US"/>
+              <a:t>.</a:t>
+            </a:r>
+            <a:endParaRPr lang="en-US" dirty="0"/>
+          </a:p>
+        </p:txBody>
+      </p:sp>
+      <p:sp>
+        <p:nvSpPr>
+          <p:cNvPr id="4" name="Marcador de número de diapositiva 3"/>
+          <p:cNvSpPr>
+            <a:spLocks noGrp="1"/>
+          </p:cNvSpPr>
+          <p:nvPr>
+            <p:ph type="sldNum" sz="quarter" idx="5"/>
+          </p:nvPr>
+        </p:nvSpPr>
+        <p:spPr/>
+        <p:txBody>
+          <a:bodyPr/>
+          <a:lstStyle/>
+          <a:p>
+            <a:fld id="{90C5D989-6414-4EC9-97AC-BCF628C5D8B9}" type="slidenum">
+              <a:rPr lang="en-US" smtClean="0"/>
+              <a:t>5</a:t>
+            </a:fld>
+            <a:endParaRPr lang="en-US"/>
+          </a:p>
+        </p:txBody>
+      </p:sp>
+    </p:spTree>
+    <p:extLst>
+      <p:ext uri="{BB962C8B-B14F-4D97-AF65-F5344CB8AC3E}">
+        <p14:creationId xmlns:p14="http://schemas.microsoft.com/office/powerpoint/2010/main" val="878510528"/>
+      </p:ext>
+    </p:extLst>
+  </p:cSld>
+  <p:clrMapOvr>
+    <a:masterClrMapping/>
+  </p:clrMapOvr>
+</p:notes>
+</file>
+
+<file path=ppt/notesSlides/notesSlide5.xml><?xml version="1.0" encoding="utf-8"?>
+<p:notes xmlns:a="http://schemas.openxmlformats.org/drawingml/2006/main" xmlns:r="http://schemas.openxmlformats.org/officeDocument/2006/relationships" xmlns:p="http://schemas.openxmlformats.org/presentationml/2006/main">
+  <p:cSld>
+    <p:spTree>
+      <p:nvGrpSpPr>
+        <p:cNvPr id="1" name=""/>
+        <p:cNvGrpSpPr/>
+        <p:nvPr/>
+      </p:nvGrpSpPr>
+      <p:grpSpPr>
+        <a:xfrm>
+          <a:off x="0" y="0"/>
+          <a:ext cx="0" cy="0"/>
+          <a:chOff x="0" y="0"/>
+          <a:chExt cx="0" cy="0"/>
+        </a:xfrm>
+      </p:grpSpPr>
+      <p:sp>
+        <p:nvSpPr>
           <p:cNvPr id="2" name="Marcador de imagen de diapositiva 1"/>
           <p:cNvSpPr>
             <a:spLocks noGrp="1" noRot="1" noChangeAspect="1"/>
@@ -813,6 +1057,102 @@
     <p:extLst>
       <p:ext uri="{BB962C8B-B14F-4D97-AF65-F5344CB8AC3E}">
         <p14:creationId xmlns:p14="http://schemas.microsoft.com/office/powerpoint/2010/main" val="4157275663"/>
+      </p:ext>
+    </p:extLst>
+  </p:cSld>
+  <p:clrMapOvr>
+    <a:masterClrMapping/>
+  </p:clrMapOvr>
+</p:notes>
+</file>
+
+<file path=ppt/notesSlides/notesSlide6.xml><?xml version="1.0" encoding="utf-8"?>
+<p:notes xmlns:a="http://schemas.openxmlformats.org/drawingml/2006/main" xmlns:r="http://schemas.openxmlformats.org/officeDocument/2006/relationships" xmlns:p="http://schemas.openxmlformats.org/presentationml/2006/main">
+  <p:cSld>
+    <p:spTree>
+      <p:nvGrpSpPr>
+        <p:cNvPr id="1" name=""/>
+        <p:cNvGrpSpPr/>
+        <p:nvPr/>
+      </p:nvGrpSpPr>
+      <p:grpSpPr>
+        <a:xfrm>
+          <a:off x="0" y="0"/>
+          <a:ext cx="0" cy="0"/>
+          <a:chOff x="0" y="0"/>
+          <a:chExt cx="0" cy="0"/>
+        </a:xfrm>
+      </p:grpSpPr>
+      <p:sp>
+        <p:nvSpPr>
+          <p:cNvPr id="2" name="Slide Image Placeholder 1"/>
+          <p:cNvSpPr>
+            <a:spLocks noGrp="1" noRot="1" noChangeAspect="1"/>
+          </p:cNvSpPr>
+          <p:nvPr>
+            <p:ph type="sldImg"/>
+          </p:nvPr>
+        </p:nvSpPr>
+        <p:spPr/>
+      </p:sp>
+      <p:sp>
+        <p:nvSpPr>
+          <p:cNvPr id="3" name="Notes Placeholder 2"/>
+          <p:cNvSpPr>
+            <a:spLocks noGrp="1"/>
+          </p:cNvSpPr>
+          <p:nvPr>
+            <p:ph type="body" idx="1"/>
+          </p:nvPr>
+        </p:nvSpPr>
+        <p:spPr/>
+        <p:txBody>
+          <a:bodyPr/>
+          <a:lstStyle/>
+          <a:p>
+            <a:r>
+              <a:rPr lang="en-US" dirty="0" err="1"/>
+              <a:t>Terminado</a:t>
+            </a:r>
+            <a:r>
+              <a:rPr lang="en-US" dirty="0"/>
+              <a:t> studio de </a:t>
+            </a:r>
+            <a:r>
+              <a:rPr lang="en-US"/>
+              <a:t>competidores</a:t>
+            </a:r>
+            <a:endParaRPr lang="en-US" dirty="0"/>
+          </a:p>
+        </p:txBody>
+      </p:sp>
+      <p:sp>
+        <p:nvSpPr>
+          <p:cNvPr id="4" name="Slide Number Placeholder 3"/>
+          <p:cNvSpPr>
+            <a:spLocks noGrp="1"/>
+          </p:cNvSpPr>
+          <p:nvPr>
+            <p:ph type="sldNum" sz="quarter" idx="5"/>
+          </p:nvPr>
+        </p:nvSpPr>
+        <p:spPr/>
+        <p:txBody>
+          <a:bodyPr/>
+          <a:lstStyle/>
+          <a:p>
+            <a:fld id="{90C5D989-6414-4EC9-97AC-BCF628C5D8B9}" type="slidenum">
+              <a:rPr lang="en-US" smtClean="0"/>
+              <a:t>7</a:t>
+            </a:fld>
+            <a:endParaRPr lang="en-US"/>
+          </a:p>
+        </p:txBody>
+      </p:sp>
+    </p:spTree>
+    <p:extLst>
+      <p:ext uri="{BB962C8B-B14F-4D97-AF65-F5344CB8AC3E}">
+        <p14:creationId xmlns:p14="http://schemas.microsoft.com/office/powerpoint/2010/main" val="2564619646"/>
       </p:ext>
     </p:extLst>
   </p:cSld>
@@ -1023,7 +1363,7 @@
           <a:p>
             <a:fld id="{ACB33697-2FA8-4DC4-A426-2A40D07A47EB}" type="slidenum">
               <a:rPr lang="en-US" smtClean="0"/>
-              <a:t>‹Nº›</a:t>
+              <a:t>‹#›</a:t>
             </a:fld>
             <a:endParaRPr lang="en-US"/>
           </a:p>
@@ -1221,7 +1561,7 @@
           <a:p>
             <a:fld id="{ACB33697-2FA8-4DC4-A426-2A40D07A47EB}" type="slidenum">
               <a:rPr lang="en-US" smtClean="0"/>
-              <a:t>‹Nº›</a:t>
+              <a:t>‹#›</a:t>
             </a:fld>
             <a:endParaRPr lang="en-US"/>
           </a:p>
@@ -1429,7 +1769,7 @@
           <a:p>
             <a:fld id="{ACB33697-2FA8-4DC4-A426-2A40D07A47EB}" type="slidenum">
               <a:rPr lang="en-US" smtClean="0"/>
-              <a:t>‹Nº›</a:t>
+              <a:t>‹#›</a:t>
             </a:fld>
             <a:endParaRPr lang="en-US"/>
           </a:p>
@@ -1627,7 +1967,7 @@
           <a:p>
             <a:fld id="{ACB33697-2FA8-4DC4-A426-2A40D07A47EB}" type="slidenum">
               <a:rPr lang="en-US" smtClean="0"/>
-              <a:t>‹Nº›</a:t>
+              <a:t>‹#›</a:t>
             </a:fld>
             <a:endParaRPr lang="en-US"/>
           </a:p>
@@ -1902,7 +2242,7 @@
           <a:p>
             <a:fld id="{ACB33697-2FA8-4DC4-A426-2A40D07A47EB}" type="slidenum">
               <a:rPr lang="en-US" smtClean="0"/>
-              <a:t>‹Nº›</a:t>
+              <a:t>‹#›</a:t>
             </a:fld>
             <a:endParaRPr lang="en-US"/>
           </a:p>
@@ -2167,7 +2507,7 @@
           <a:p>
             <a:fld id="{ACB33697-2FA8-4DC4-A426-2A40D07A47EB}" type="slidenum">
               <a:rPr lang="en-US" smtClean="0"/>
-              <a:t>‹Nº›</a:t>
+              <a:t>‹#›</a:t>
             </a:fld>
             <a:endParaRPr lang="en-US"/>
           </a:p>
@@ -2579,7 +2919,7 @@
           <a:p>
             <a:fld id="{ACB33697-2FA8-4DC4-A426-2A40D07A47EB}" type="slidenum">
               <a:rPr lang="en-US" smtClean="0"/>
-              <a:t>‹Nº›</a:t>
+              <a:t>‹#›</a:t>
             </a:fld>
             <a:endParaRPr lang="en-US"/>
           </a:p>
@@ -2720,7 +3060,7 @@
           <a:p>
             <a:fld id="{ACB33697-2FA8-4DC4-A426-2A40D07A47EB}" type="slidenum">
               <a:rPr lang="en-US" smtClean="0"/>
-              <a:t>‹Nº›</a:t>
+              <a:t>‹#›</a:t>
             </a:fld>
             <a:endParaRPr lang="en-US"/>
           </a:p>
@@ -2833,7 +3173,7 @@
           <a:p>
             <a:fld id="{ACB33697-2FA8-4DC4-A426-2A40D07A47EB}" type="slidenum">
               <a:rPr lang="en-US" smtClean="0"/>
-              <a:t>‹Nº›</a:t>
+              <a:t>‹#›</a:t>
             </a:fld>
             <a:endParaRPr lang="en-US"/>
           </a:p>
@@ -3144,7 +3484,7 @@
           <a:p>
             <a:fld id="{ACB33697-2FA8-4DC4-A426-2A40D07A47EB}" type="slidenum">
               <a:rPr lang="en-US" smtClean="0"/>
-              <a:t>‹Nº›</a:t>
+              <a:t>‹#›</a:t>
             </a:fld>
             <a:endParaRPr lang="en-US"/>
           </a:p>
@@ -3432,7 +3772,7 @@
           <a:p>
             <a:fld id="{ACB33697-2FA8-4DC4-A426-2A40D07A47EB}" type="slidenum">
               <a:rPr lang="en-US" smtClean="0"/>
-              <a:t>‹Nº›</a:t>
+              <a:t>‹#›</a:t>
             </a:fld>
             <a:endParaRPr lang="en-US"/>
           </a:p>
@@ -3709,7 +4049,7 @@
           <a:p>
             <a:fld id="{ACB33697-2FA8-4DC4-A426-2A40D07A47EB}" type="slidenum">
               <a:rPr lang="en-US" smtClean="0"/>
-              <a:t>‹Nº›</a:t>
+              <a:t>‹#›</a:t>
             </a:fld>
             <a:endParaRPr lang="en-US"/>
           </a:p>
@@ -4179,7 +4519,7 @@
           <p:nvPr/>
         </p:nvPicPr>
         <p:blipFill>
-          <a:blip r:embed="rId2"/>
+          <a:blip r:embed="rId3"/>
           <a:stretch>
             <a:fillRect/>
           </a:stretch>
@@ -4239,7 +4579,7 @@
           <p:nvPr/>
         </p:nvPicPr>
         <p:blipFill>
-          <a:blip r:embed="rId2"/>
+          <a:blip r:embed="rId3"/>
           <a:stretch>
             <a:fillRect/>
           </a:stretch>
@@ -4378,6 +4718,207 @@
     <p:extLst>
       <p:ext uri="{BB962C8B-B14F-4D97-AF65-F5344CB8AC3E}">
         <p14:creationId xmlns:p14="http://schemas.microsoft.com/office/powerpoint/2010/main" val="599276603"/>
+      </p:ext>
+    </p:extLst>
+  </p:cSld>
+  <p:clrMapOvr>
+    <a:masterClrMapping/>
+  </p:clrMapOvr>
+</p:sld>
+</file>
+
+<file path=ppt/slides/slide7.xml><?xml version="1.0" encoding="utf-8"?>
+<p:sld xmlns:a="http://schemas.openxmlformats.org/drawingml/2006/main" xmlns:r="http://schemas.openxmlformats.org/officeDocument/2006/relationships" xmlns:p="http://schemas.openxmlformats.org/presentationml/2006/main">
+  <p:cSld>
+    <p:bg>
+      <p:bgPr>
+        <a:solidFill>
+          <a:schemeClr val="bg1"/>
+        </a:solidFill>
+        <a:effectLst/>
+      </p:bgPr>
+    </p:bg>
+    <p:spTree>
+      <p:nvGrpSpPr>
+        <p:cNvPr id="1" name=""/>
+        <p:cNvGrpSpPr/>
+        <p:nvPr/>
+      </p:nvGrpSpPr>
+      <p:grpSpPr>
+        <a:xfrm>
+          <a:off x="0" y="0"/>
+          <a:ext cx="0" cy="0"/>
+          <a:chOff x="0" y="0"/>
+          <a:chExt cx="0" cy="0"/>
+        </a:xfrm>
+      </p:grpSpPr>
+      <p:sp>
+        <p:nvSpPr>
+          <p:cNvPr id="10" name="Rectangle 9">
+            <a:extLst>
+              <a:ext uri="{FF2B5EF4-FFF2-40B4-BE49-F238E27FC236}">
+                <a16:creationId xmlns:a16="http://schemas.microsoft.com/office/drawing/2014/main" id="{01D0AF59-99C3-4251-AB9A-C966C6AD4400}"/>
+              </a:ext>
+              <a:ext uri="{C183D7F6-B498-43B3-948B-1728B52AA6E4}">
+                <adec:decorative xmlns:adec="http://schemas.microsoft.com/office/drawing/2017/decorative" val="1"/>
+              </a:ext>
+            </a:extLst>
+          </p:cNvPr>
+          <p:cNvSpPr>
+            <a:spLocks noGrp="1" noRot="1" noChangeAspect="1" noMove="1" noResize="1" noEditPoints="1" noAdjustHandles="1" noChangeArrowheads="1" noChangeShapeType="1" noTextEdit="1"/>
+          </p:cNvSpPr>
+          <p:nvPr>
+            <p:extLst>
+              <p:ext uri="{386F3935-93C4-4BCD-93E2-E3B085C9AB24}">
+                <p16:designElem xmlns:p16="http://schemas.microsoft.com/office/powerpoint/2015/main" val="1"/>
+              </p:ext>
+            </p:extLst>
+          </p:nvPr>
+        </p:nvSpPr>
+        <p:spPr>
+          <a:xfrm>
+            <a:off x="0" y="0"/>
+            <a:ext cx="12192000" cy="6858000"/>
+          </a:xfrm>
+          <a:prstGeom prst="rect">
+            <a:avLst/>
+          </a:prstGeom>
+          <a:solidFill>
+            <a:schemeClr val="bg2"/>
+          </a:solidFill>
+          <a:ln>
+            <a:noFill/>
+          </a:ln>
+        </p:spPr>
+        <p:style>
+          <a:lnRef idx="2">
+            <a:schemeClr val="accent1">
+              <a:shade val="50000"/>
+            </a:schemeClr>
+          </a:lnRef>
+          <a:fillRef idx="1">
+            <a:schemeClr val="accent1"/>
+          </a:fillRef>
+          <a:effectRef idx="0">
+            <a:schemeClr val="accent1"/>
+          </a:effectRef>
+          <a:fontRef idx="minor">
+            <a:schemeClr val="lt1"/>
+          </a:fontRef>
+        </p:style>
+        <p:txBody>
+          <a:bodyPr rtlCol="0" anchor="ctr"/>
+          <a:lstStyle/>
+          <a:p>
+            <a:pPr algn="ctr"/>
+            <a:endParaRPr lang="en-US"/>
+          </a:p>
+        </p:txBody>
+      </p:sp>
+      <p:sp>
+        <p:nvSpPr>
+          <p:cNvPr id="12" name="Rectangle 11">
+            <a:extLst>
+              <a:ext uri="{FF2B5EF4-FFF2-40B4-BE49-F238E27FC236}">
+                <a16:creationId xmlns:a16="http://schemas.microsoft.com/office/drawing/2014/main" id="{1855405F-37A2-4869-9154-F8BE3BECE6C3}"/>
+              </a:ext>
+              <a:ext uri="{C183D7F6-B498-43B3-948B-1728B52AA6E4}">
+                <adec:decorative xmlns:adec="http://schemas.microsoft.com/office/drawing/2017/decorative" val="1"/>
+              </a:ext>
+            </a:extLst>
+          </p:cNvPr>
+          <p:cNvSpPr>
+            <a:spLocks noGrp="1" noRot="1" noChangeAspect="1" noMove="1" noResize="1" noEditPoints="1" noAdjustHandles="1" noChangeArrowheads="1" noChangeShapeType="1" noTextEdit="1"/>
+          </p:cNvSpPr>
+          <p:nvPr>
+            <p:extLst>
+              <p:ext uri="{386F3935-93C4-4BCD-93E2-E3B085C9AB24}">
+                <p16:designElem xmlns:p16="http://schemas.microsoft.com/office/powerpoint/2015/main" val="1"/>
+              </p:ext>
+            </p:extLst>
+          </p:nvPr>
+        </p:nvSpPr>
+        <p:spPr>
+          <a:xfrm>
+            <a:off x="477012" y="480060"/>
+            <a:ext cx="11237976" cy="5897880"/>
+          </a:xfrm>
+          <a:prstGeom prst="rect">
+            <a:avLst/>
+          </a:prstGeom>
+          <a:solidFill>
+            <a:srgbClr val="FFFFFF"/>
+          </a:solidFill>
+          <a:ln w="9525">
+            <a:noFill/>
+          </a:ln>
+          <a:effectLst>
+            <a:outerShdw blurRad="63500" dist="17780" dir="5400000" algn="t" rotWithShape="0">
+              <a:prstClr val="black">
+                <a:alpha val="43000"/>
+              </a:prstClr>
+            </a:outerShdw>
+          </a:effectLst>
+        </p:spPr>
+        <p:style>
+          <a:lnRef idx="2">
+            <a:schemeClr val="accent1">
+              <a:shade val="50000"/>
+            </a:schemeClr>
+          </a:lnRef>
+          <a:fillRef idx="1">
+            <a:schemeClr val="accent1"/>
+          </a:fillRef>
+          <a:effectRef idx="0">
+            <a:schemeClr val="accent1"/>
+          </a:effectRef>
+          <a:fontRef idx="minor">
+            <a:schemeClr val="lt1"/>
+          </a:fontRef>
+        </p:style>
+        <p:txBody>
+          <a:bodyPr rtlCol="0" anchor="ctr"/>
+          <a:lstStyle/>
+          <a:p>
+            <a:pPr algn="ctr"/>
+            <a:endParaRPr lang="en-US"/>
+          </a:p>
+        </p:txBody>
+      </p:sp>
+      <p:pic>
+        <p:nvPicPr>
+          <p:cNvPr id="5" name="Picture 4">
+            <a:extLst>
+              <a:ext uri="{FF2B5EF4-FFF2-40B4-BE49-F238E27FC236}">
+                <a16:creationId xmlns:a16="http://schemas.microsoft.com/office/drawing/2014/main" id="{12A0EB7B-F21F-441D-8004-95D2A699BF17}"/>
+              </a:ext>
+            </a:extLst>
+          </p:cNvPr>
+          <p:cNvPicPr>
+            <a:picLocks noChangeAspect="1"/>
+          </p:cNvPicPr>
+          <p:nvPr/>
+        </p:nvPicPr>
+        <p:blipFill>
+          <a:blip r:embed="rId3"/>
+          <a:stretch>
+            <a:fillRect/>
+          </a:stretch>
+        </p:blipFill>
+        <p:spPr>
+          <a:xfrm>
+            <a:off x="1121834" y="643467"/>
+            <a:ext cx="9948331" cy="5571066"/>
+          </a:xfrm>
+          <a:prstGeom prst="rect">
+            <a:avLst/>
+          </a:prstGeom>
+        </p:spPr>
+      </p:pic>
+    </p:spTree>
+    <p:extLst>
+      <p:ext uri="{BB962C8B-B14F-4D97-AF65-F5344CB8AC3E}">
+        <p14:creationId xmlns:p14="http://schemas.microsoft.com/office/powerpoint/2010/main" val="1830856166"/>
       </p:ext>
     </p:extLst>
   </p:cSld>

</xml_diff>

<commit_message>
Movido Control a Doing en la taskboard
</commit_message>
<xml_diff>
--- a/Iteracion1/TaskBoard.pptx
+++ b/Iteracion1/TaskBoard.pptx
@@ -5,7 +5,7 @@
     <p:sldMasterId id="2147483648" r:id="rId1"/>
   </p:sldMasterIdLst>
   <p:notesMasterIdLst>
-    <p:notesMasterId r:id="rId9"/>
+    <p:notesMasterId r:id="rId10"/>
   </p:notesMasterIdLst>
   <p:sldIdLst>
     <p:sldId id="256" r:id="rId2"/>
@@ -15,6 +15,7 @@
     <p:sldId id="260" r:id="rId6"/>
     <p:sldId id="261" r:id="rId7"/>
     <p:sldId id="262" r:id="rId8"/>
+    <p:sldId id="263" r:id="rId9"/>
   </p:sldIdLst>
   <p:sldSz cx="12192000" cy="6858000"/>
   <p:notesSz cx="6858000" cy="9144000"/>
@@ -203,7 +204,7 @@
           <a:p>
             <a:fld id="{8B45D529-B2FB-4235-85C4-556325968B0B}" type="datetimeFigureOut">
               <a:rPr lang="en-US" smtClean="0"/>
-              <a:t>03-Oct-21</a:t>
+              <a:t>10/4/2021</a:t>
             </a:fld>
             <a:endParaRPr lang="en-US"/>
           </a:p>
@@ -362,7 +363,7 @@
           <a:p>
             <a:fld id="{90C5D989-6414-4EC9-97AC-BCF628C5D8B9}" type="slidenum">
               <a:rPr lang="en-US" smtClean="0"/>
-              <a:t>‹#›</a:t>
+              <a:t>‹Nº›</a:t>
             </a:fld>
             <a:endParaRPr lang="en-US"/>
           </a:p>
@@ -1309,7 +1310,7 @@
           <a:p>
             <a:fld id="{39DCAF25-EC8E-4E4C-BCE0-6880FDA81677}" type="datetimeFigureOut">
               <a:rPr lang="en-US" smtClean="0"/>
-              <a:t>03-Oct-21</a:t>
+              <a:t>10/4/2021</a:t>
             </a:fld>
             <a:endParaRPr lang="en-US"/>
           </a:p>
@@ -1363,7 +1364,7 @@
           <a:p>
             <a:fld id="{ACB33697-2FA8-4DC4-A426-2A40D07A47EB}" type="slidenum">
               <a:rPr lang="en-US" smtClean="0"/>
-              <a:t>‹#›</a:t>
+              <a:t>‹Nº›</a:t>
             </a:fld>
             <a:endParaRPr lang="en-US"/>
           </a:p>
@@ -1507,7 +1508,7 @@
           <a:p>
             <a:fld id="{39DCAF25-EC8E-4E4C-BCE0-6880FDA81677}" type="datetimeFigureOut">
               <a:rPr lang="en-US" smtClean="0"/>
-              <a:t>03-Oct-21</a:t>
+              <a:t>10/4/2021</a:t>
             </a:fld>
             <a:endParaRPr lang="en-US"/>
           </a:p>
@@ -1561,7 +1562,7 @@
           <a:p>
             <a:fld id="{ACB33697-2FA8-4DC4-A426-2A40D07A47EB}" type="slidenum">
               <a:rPr lang="en-US" smtClean="0"/>
-              <a:t>‹#›</a:t>
+              <a:t>‹Nº›</a:t>
             </a:fld>
             <a:endParaRPr lang="en-US"/>
           </a:p>
@@ -1715,7 +1716,7 @@
           <a:p>
             <a:fld id="{39DCAF25-EC8E-4E4C-BCE0-6880FDA81677}" type="datetimeFigureOut">
               <a:rPr lang="en-US" smtClean="0"/>
-              <a:t>03-Oct-21</a:t>
+              <a:t>10/4/2021</a:t>
             </a:fld>
             <a:endParaRPr lang="en-US"/>
           </a:p>
@@ -1769,7 +1770,7 @@
           <a:p>
             <a:fld id="{ACB33697-2FA8-4DC4-A426-2A40D07A47EB}" type="slidenum">
               <a:rPr lang="en-US" smtClean="0"/>
-              <a:t>‹#›</a:t>
+              <a:t>‹Nº›</a:t>
             </a:fld>
             <a:endParaRPr lang="en-US"/>
           </a:p>
@@ -1913,7 +1914,7 @@
           <a:p>
             <a:fld id="{39DCAF25-EC8E-4E4C-BCE0-6880FDA81677}" type="datetimeFigureOut">
               <a:rPr lang="en-US" smtClean="0"/>
-              <a:t>03-Oct-21</a:t>
+              <a:t>10/4/2021</a:t>
             </a:fld>
             <a:endParaRPr lang="en-US"/>
           </a:p>
@@ -1967,7 +1968,7 @@
           <a:p>
             <a:fld id="{ACB33697-2FA8-4DC4-A426-2A40D07A47EB}" type="slidenum">
               <a:rPr lang="en-US" smtClean="0"/>
-              <a:t>‹#›</a:t>
+              <a:t>‹Nº›</a:t>
             </a:fld>
             <a:endParaRPr lang="en-US"/>
           </a:p>
@@ -2188,7 +2189,7 @@
           <a:p>
             <a:fld id="{39DCAF25-EC8E-4E4C-BCE0-6880FDA81677}" type="datetimeFigureOut">
               <a:rPr lang="en-US" smtClean="0"/>
-              <a:t>03-Oct-21</a:t>
+              <a:t>10/4/2021</a:t>
             </a:fld>
             <a:endParaRPr lang="en-US"/>
           </a:p>
@@ -2242,7 +2243,7 @@
           <a:p>
             <a:fld id="{ACB33697-2FA8-4DC4-A426-2A40D07A47EB}" type="slidenum">
               <a:rPr lang="en-US" smtClean="0"/>
-              <a:t>‹#›</a:t>
+              <a:t>‹Nº›</a:t>
             </a:fld>
             <a:endParaRPr lang="en-US"/>
           </a:p>
@@ -2453,7 +2454,7 @@
           <a:p>
             <a:fld id="{39DCAF25-EC8E-4E4C-BCE0-6880FDA81677}" type="datetimeFigureOut">
               <a:rPr lang="en-US" smtClean="0"/>
-              <a:t>03-Oct-21</a:t>
+              <a:t>10/4/2021</a:t>
             </a:fld>
             <a:endParaRPr lang="en-US"/>
           </a:p>
@@ -2507,7 +2508,7 @@
           <a:p>
             <a:fld id="{ACB33697-2FA8-4DC4-A426-2A40D07A47EB}" type="slidenum">
               <a:rPr lang="en-US" smtClean="0"/>
-              <a:t>‹#›</a:t>
+              <a:t>‹Nº›</a:t>
             </a:fld>
             <a:endParaRPr lang="en-US"/>
           </a:p>
@@ -2865,7 +2866,7 @@
           <a:p>
             <a:fld id="{39DCAF25-EC8E-4E4C-BCE0-6880FDA81677}" type="datetimeFigureOut">
               <a:rPr lang="en-US" smtClean="0"/>
-              <a:t>03-Oct-21</a:t>
+              <a:t>10/4/2021</a:t>
             </a:fld>
             <a:endParaRPr lang="en-US"/>
           </a:p>
@@ -2919,7 +2920,7 @@
           <a:p>
             <a:fld id="{ACB33697-2FA8-4DC4-A426-2A40D07A47EB}" type="slidenum">
               <a:rPr lang="en-US" smtClean="0"/>
-              <a:t>‹#›</a:t>
+              <a:t>‹Nº›</a:t>
             </a:fld>
             <a:endParaRPr lang="en-US"/>
           </a:p>
@@ -3006,7 +3007,7 @@
           <a:p>
             <a:fld id="{39DCAF25-EC8E-4E4C-BCE0-6880FDA81677}" type="datetimeFigureOut">
               <a:rPr lang="en-US" smtClean="0"/>
-              <a:t>03-Oct-21</a:t>
+              <a:t>10/4/2021</a:t>
             </a:fld>
             <a:endParaRPr lang="en-US"/>
           </a:p>
@@ -3060,7 +3061,7 @@
           <a:p>
             <a:fld id="{ACB33697-2FA8-4DC4-A426-2A40D07A47EB}" type="slidenum">
               <a:rPr lang="en-US" smtClean="0"/>
-              <a:t>‹#›</a:t>
+              <a:t>‹Nº›</a:t>
             </a:fld>
             <a:endParaRPr lang="en-US"/>
           </a:p>
@@ -3119,7 +3120,7 @@
           <a:p>
             <a:fld id="{39DCAF25-EC8E-4E4C-BCE0-6880FDA81677}" type="datetimeFigureOut">
               <a:rPr lang="en-US" smtClean="0"/>
-              <a:t>03-Oct-21</a:t>
+              <a:t>10/4/2021</a:t>
             </a:fld>
             <a:endParaRPr lang="en-US"/>
           </a:p>
@@ -3173,7 +3174,7 @@
           <a:p>
             <a:fld id="{ACB33697-2FA8-4DC4-A426-2A40D07A47EB}" type="slidenum">
               <a:rPr lang="en-US" smtClean="0"/>
-              <a:t>‹#›</a:t>
+              <a:t>‹Nº›</a:t>
             </a:fld>
             <a:endParaRPr lang="en-US"/>
           </a:p>
@@ -3430,7 +3431,7 @@
           <a:p>
             <a:fld id="{39DCAF25-EC8E-4E4C-BCE0-6880FDA81677}" type="datetimeFigureOut">
               <a:rPr lang="en-US" smtClean="0"/>
-              <a:t>03-Oct-21</a:t>
+              <a:t>10/4/2021</a:t>
             </a:fld>
             <a:endParaRPr lang="en-US"/>
           </a:p>
@@ -3484,7 +3485,7 @@
           <a:p>
             <a:fld id="{ACB33697-2FA8-4DC4-A426-2A40D07A47EB}" type="slidenum">
               <a:rPr lang="en-US" smtClean="0"/>
-              <a:t>‹#›</a:t>
+              <a:t>‹Nº›</a:t>
             </a:fld>
             <a:endParaRPr lang="en-US"/>
           </a:p>
@@ -3718,7 +3719,7 @@
           <a:p>
             <a:fld id="{39DCAF25-EC8E-4E4C-BCE0-6880FDA81677}" type="datetimeFigureOut">
               <a:rPr lang="en-US" smtClean="0"/>
-              <a:t>03-Oct-21</a:t>
+              <a:t>10/4/2021</a:t>
             </a:fld>
             <a:endParaRPr lang="en-US"/>
           </a:p>
@@ -3772,7 +3773,7 @@
           <a:p>
             <a:fld id="{ACB33697-2FA8-4DC4-A426-2A40D07A47EB}" type="slidenum">
               <a:rPr lang="en-US" smtClean="0"/>
-              <a:t>‹#›</a:t>
+              <a:t>‹Nº›</a:t>
             </a:fld>
             <a:endParaRPr lang="en-US"/>
           </a:p>
@@ -3959,7 +3960,7 @@
           <a:p>
             <a:fld id="{39DCAF25-EC8E-4E4C-BCE0-6880FDA81677}" type="datetimeFigureOut">
               <a:rPr lang="en-US" smtClean="0"/>
-              <a:t>03-Oct-21</a:t>
+              <a:t>10/4/2021</a:t>
             </a:fld>
             <a:endParaRPr lang="en-US"/>
           </a:p>
@@ -4049,7 +4050,7 @@
           <a:p>
             <a:fld id="{ACB33697-2FA8-4DC4-A426-2A40D07A47EB}" type="slidenum">
               <a:rPr lang="en-US" smtClean="0"/>
-              <a:t>‹#›</a:t>
+              <a:t>‹Nº›</a:t>
             </a:fld>
             <a:endParaRPr lang="en-US"/>
           </a:p>
@@ -4919,6 +4920,66 @@
     <p:extLst>
       <p:ext uri="{BB962C8B-B14F-4D97-AF65-F5344CB8AC3E}">
         <p14:creationId xmlns:p14="http://schemas.microsoft.com/office/powerpoint/2010/main" val="1830856166"/>
+      </p:ext>
+    </p:extLst>
+  </p:cSld>
+  <p:clrMapOvr>
+    <a:masterClrMapping/>
+  </p:clrMapOvr>
+</p:sld>
+</file>
+
+<file path=ppt/slides/slide8.xml><?xml version="1.0" encoding="utf-8"?>
+<p:sld xmlns:a="http://schemas.openxmlformats.org/drawingml/2006/main" xmlns:r="http://schemas.openxmlformats.org/officeDocument/2006/relationships" xmlns:p="http://schemas.openxmlformats.org/presentationml/2006/main">
+  <p:cSld>
+    <p:spTree>
+      <p:nvGrpSpPr>
+        <p:cNvPr id="1" name=""/>
+        <p:cNvGrpSpPr/>
+        <p:nvPr/>
+      </p:nvGrpSpPr>
+      <p:grpSpPr>
+        <a:xfrm>
+          <a:off x="0" y="0"/>
+          <a:ext cx="0" cy="0"/>
+          <a:chOff x="0" y="0"/>
+          <a:chExt cx="0" cy="0"/>
+        </a:xfrm>
+      </p:grpSpPr>
+      <p:pic>
+        <p:nvPicPr>
+          <p:cNvPr id="5" name="Imagen 4">
+            <a:extLst>
+              <a:ext uri="{FF2B5EF4-FFF2-40B4-BE49-F238E27FC236}">
+                <a16:creationId xmlns:a16="http://schemas.microsoft.com/office/drawing/2014/main" id="{8213E0A6-FABD-45B3-928A-6CADFC0879F2}"/>
+              </a:ext>
+            </a:extLst>
+          </p:cNvPr>
+          <p:cNvPicPr>
+            <a:picLocks noChangeAspect="1"/>
+          </p:cNvPicPr>
+          <p:nvPr/>
+        </p:nvPicPr>
+        <p:blipFill>
+          <a:blip r:embed="rId2"/>
+          <a:stretch>
+            <a:fillRect/>
+          </a:stretch>
+        </p:blipFill>
+        <p:spPr>
+          <a:xfrm>
+            <a:off x="1027992" y="380574"/>
+            <a:ext cx="10136015" cy="6096851"/>
+          </a:xfrm>
+          <a:prstGeom prst="rect">
+            <a:avLst/>
+          </a:prstGeom>
+        </p:spPr>
+      </p:pic>
+    </p:spTree>
+    <p:extLst>
+      <p:ext uri="{BB962C8B-B14F-4D97-AF65-F5344CB8AC3E}">
+        <p14:creationId xmlns:p14="http://schemas.microsoft.com/office/powerpoint/2010/main" val="1146657534"/>
       </p:ext>
     </p:extLst>
   </p:cSld>

</xml_diff>

<commit_message>
Agregadas las notas de la iteracion 1 en trello al powerpoint
</commit_message>
<xml_diff>
--- a/Iteracion1/TaskBoard.pptx
+++ b/Iteracion1/TaskBoard.pptx
@@ -5,17 +5,18 @@
     <p:sldMasterId id="2147483648" r:id="rId1"/>
   </p:sldMasterIdLst>
   <p:notesMasterIdLst>
-    <p:notesMasterId r:id="rId10"/>
+    <p:notesMasterId r:id="rId11"/>
   </p:notesMasterIdLst>
   <p:sldIdLst>
-    <p:sldId id="256" r:id="rId2"/>
-    <p:sldId id="257" r:id="rId3"/>
-    <p:sldId id="258" r:id="rId4"/>
-    <p:sldId id="259" r:id="rId5"/>
-    <p:sldId id="260" r:id="rId6"/>
-    <p:sldId id="261" r:id="rId7"/>
-    <p:sldId id="262" r:id="rId8"/>
-    <p:sldId id="263" r:id="rId9"/>
+    <p:sldId id="264" r:id="rId2"/>
+    <p:sldId id="256" r:id="rId3"/>
+    <p:sldId id="257" r:id="rId4"/>
+    <p:sldId id="258" r:id="rId5"/>
+    <p:sldId id="259" r:id="rId6"/>
+    <p:sldId id="260" r:id="rId7"/>
+    <p:sldId id="261" r:id="rId8"/>
+    <p:sldId id="262" r:id="rId9"/>
+    <p:sldId id="263" r:id="rId10"/>
   </p:sldIdLst>
   <p:sldSz cx="12192000" cy="6858000"/>
   <p:notesSz cx="6858000" cy="9144000"/>
@@ -204,7 +205,7 @@
           <a:p>
             <a:fld id="{8B45D529-B2FB-4235-85C4-556325968B0B}" type="datetimeFigureOut">
               <a:rPr lang="en-US" smtClean="0"/>
-              <a:t>10/4/2021</a:t>
+              <a:t>04-Oct-21</a:t>
             </a:fld>
             <a:endParaRPr lang="en-US"/>
           </a:p>
@@ -363,7 +364,7 @@
           <a:p>
             <a:fld id="{90C5D989-6414-4EC9-97AC-BCF628C5D8B9}" type="slidenum">
               <a:rPr lang="en-US" smtClean="0"/>
-              <a:t>‹Nº›</a:t>
+              <a:t>‹#›</a:t>
             </a:fld>
             <a:endParaRPr lang="en-US"/>
           </a:p>
@@ -491,7 +492,7 @@
       </p:grpSpPr>
       <p:sp>
         <p:nvSpPr>
-          <p:cNvPr id="2" name="Marcador de imagen de diapositiva 1"/>
+          <p:cNvPr id="2" name="Slide Image Placeholder 1"/>
           <p:cNvSpPr>
             <a:spLocks noGrp="1" noRot="1" noChangeAspect="1"/>
           </p:cNvSpPr>
@@ -503,7 +504,7 @@
       </p:sp>
       <p:sp>
         <p:nvSpPr>
-          <p:cNvPr id="3" name="Marcador de notas 2"/>
+          <p:cNvPr id="3" name="Notes Placeholder 2"/>
           <p:cNvSpPr>
             <a:spLocks noGrp="1"/>
           </p:cNvSpPr>
@@ -518,27 +519,34 @@
           <a:p>
             <a:r>
               <a:rPr lang="en-US" dirty="0" err="1"/>
-              <a:t>Empezada</a:t>
+              <a:t>Notas</a:t>
             </a:r>
             <a:r>
               <a:rPr lang="en-US" dirty="0"/>
-              <a:t> la </a:t>
+              <a:t> de la </a:t>
             </a:r>
             <a:r>
               <a:rPr lang="en-US" dirty="0" err="1"/>
-              <a:t>planificación</a:t>
-            </a:r>
-            <a:r>
-              <a:rPr lang="en-US"/>
-              <a:t>.</a:t>
-            </a:r>
-            <a:endParaRPr lang="en-US" dirty="0"/>
-          </a:p>
-        </p:txBody>
-      </p:sp>
-      <p:sp>
-        <p:nvSpPr>
-          <p:cNvPr id="4" name="Marcador de número de diapositiva 3"/>
+              <a:t>iteración</a:t>
+            </a:r>
+            <a:r>
+              <a:rPr lang="en-US" dirty="0"/>
+              <a:t> 1 </a:t>
+            </a:r>
+            <a:r>
+              <a:rPr lang="en-US" dirty="0" err="1"/>
+              <a:t>en</a:t>
+            </a:r>
+            <a:r>
+              <a:rPr lang="en-US"/>
+              <a:t> Trello</a:t>
+            </a:r>
+          </a:p>
+        </p:txBody>
+      </p:sp>
+      <p:sp>
+        <p:nvSpPr>
+          <p:cNvPr id="4" name="Slide Number Placeholder 3"/>
           <p:cNvSpPr>
             <a:spLocks noGrp="1"/>
           </p:cNvSpPr>
@@ -553,7 +561,7 @@
           <a:p>
             <a:fld id="{90C5D989-6414-4EC9-97AC-BCF628C5D8B9}" type="slidenum">
               <a:rPr lang="en-US" smtClean="0"/>
-              <a:t>2</a:t>
+              <a:t>1</a:t>
             </a:fld>
             <a:endParaRPr lang="en-US"/>
           </a:p>
@@ -562,7 +570,7 @@
     </p:spTree>
     <p:extLst>
       <p:ext uri="{BB962C8B-B14F-4D97-AF65-F5344CB8AC3E}">
-        <p14:creationId xmlns:p14="http://schemas.microsoft.com/office/powerpoint/2010/main" val="2420125520"/>
+        <p14:creationId xmlns:p14="http://schemas.microsoft.com/office/powerpoint/2010/main" val="2321805161"/>
       </p:ext>
     </p:extLst>
   </p:cSld>
@@ -591,7 +599,7 @@
       </p:grpSpPr>
       <p:sp>
         <p:nvSpPr>
-          <p:cNvPr id="2" name="Slide Image Placeholder 1"/>
+          <p:cNvPr id="2" name="Marcador de imagen de diapositiva 1"/>
           <p:cNvSpPr>
             <a:spLocks noGrp="1" noRot="1" noChangeAspect="1"/>
           </p:cNvSpPr>
@@ -603,7 +611,7 @@
       </p:sp>
       <p:sp>
         <p:nvSpPr>
-          <p:cNvPr id="3" name="Notes Placeholder 2"/>
+          <p:cNvPr id="3" name="Marcador de notas 2"/>
           <p:cNvSpPr>
             <a:spLocks noGrp="1"/>
           </p:cNvSpPr>
@@ -618,66 +626,27 @@
           <a:p>
             <a:r>
               <a:rPr lang="en-US" dirty="0" err="1"/>
-              <a:t>Finalización</a:t>
+              <a:t>Empezada</a:t>
             </a:r>
             <a:r>
               <a:rPr lang="en-US" dirty="0"/>
-              <a:t> de </a:t>
+              <a:t> la </a:t>
             </a:r>
             <a:r>
               <a:rPr lang="en-US" dirty="0" err="1"/>
               <a:t>planificación</a:t>
             </a:r>
             <a:r>
-              <a:rPr lang="en-US" dirty="0"/>
-              <a:t> y </a:t>
-            </a:r>
-            <a:r>
-              <a:rPr lang="en-US" dirty="0" err="1"/>
-              <a:t>comienzo</a:t>
-            </a:r>
-            <a:r>
-              <a:rPr lang="en-US" dirty="0"/>
-              <a:t> de Lista de </a:t>
-            </a:r>
-            <a:r>
-              <a:rPr lang="en-US" dirty="0" err="1"/>
-              <a:t>funcionalidades</a:t>
-            </a:r>
-            <a:r>
-              <a:rPr lang="en-US" dirty="0"/>
-              <a:t> por </a:t>
-            </a:r>
-            <a:r>
-              <a:rPr lang="en-US" dirty="0" err="1"/>
-              <a:t>interesado</a:t>
-            </a:r>
-            <a:r>
-              <a:rPr lang="en-US" dirty="0"/>
-              <a:t> y </a:t>
-            </a:r>
-            <a:r>
-              <a:rPr lang="en-US" dirty="0" err="1"/>
-              <a:t>identificación</a:t>
-            </a:r>
-            <a:r>
-              <a:rPr lang="en-US" dirty="0"/>
-              <a:t> de </a:t>
-            </a:r>
-            <a:r>
-              <a:rPr lang="en-US" dirty="0" err="1"/>
-              <a:t>interesados</a:t>
-            </a:r>
-            <a:r>
-              <a:rPr lang="en-US" dirty="0"/>
+              <a:rPr lang="en-US"/>
               <a:t>.</a:t>
             </a:r>
-          </a:p>
-        </p:txBody>
-      </p:sp>
-      <p:sp>
-        <p:nvSpPr>
-          <p:cNvPr id="4" name="Slide Number Placeholder 3"/>
+            <a:endParaRPr lang="en-US" dirty="0"/>
+          </a:p>
+        </p:txBody>
+      </p:sp>
+      <p:sp>
+        <p:nvSpPr>
+          <p:cNvPr id="4" name="Marcador de número de diapositiva 3"/>
           <p:cNvSpPr>
             <a:spLocks noGrp="1"/>
           </p:cNvSpPr>
@@ -701,7 +670,7 @@
     </p:spTree>
     <p:extLst>
       <p:ext uri="{BB962C8B-B14F-4D97-AF65-F5344CB8AC3E}">
-        <p14:creationId xmlns:p14="http://schemas.microsoft.com/office/powerpoint/2010/main" val="784669118"/>
+        <p14:creationId xmlns:p14="http://schemas.microsoft.com/office/powerpoint/2010/main" val="2420125520"/>
       </p:ext>
     </p:extLst>
   </p:cSld>
@@ -757,7 +726,7 @@
           <a:p>
             <a:r>
               <a:rPr lang="en-US" dirty="0" err="1"/>
-              <a:t>Comienzo</a:t>
+              <a:t>Finalización</a:t>
             </a:r>
             <a:r>
               <a:rPr lang="en-US" dirty="0"/>
@@ -765,17 +734,52 @@
             </a:r>
             <a:r>
               <a:rPr lang="en-US" dirty="0" err="1"/>
-              <a:t>estudio</a:t>
+              <a:t>planificación</a:t>
             </a:r>
             <a:r>
               <a:rPr lang="en-US" dirty="0"/>
-              <a:t> </a:t>
+              <a:t> y </a:t>
             </a:r>
             <a:r>
               <a:rPr lang="en-US" dirty="0" err="1"/>
-              <a:t>competidores</a:t>
-            </a:r>
-            <a:endParaRPr lang="en-US" dirty="0"/>
+              <a:t>comienzo</a:t>
+            </a:r>
+            <a:r>
+              <a:rPr lang="en-US" dirty="0"/>
+              <a:t> de Lista de </a:t>
+            </a:r>
+            <a:r>
+              <a:rPr lang="en-US" dirty="0" err="1"/>
+              <a:t>funcionalidades</a:t>
+            </a:r>
+            <a:r>
+              <a:rPr lang="en-US" dirty="0"/>
+              <a:t> por </a:t>
+            </a:r>
+            <a:r>
+              <a:rPr lang="en-US" dirty="0" err="1"/>
+              <a:t>interesado</a:t>
+            </a:r>
+            <a:r>
+              <a:rPr lang="en-US" dirty="0"/>
+              <a:t> y </a:t>
+            </a:r>
+            <a:r>
+              <a:rPr lang="en-US" dirty="0" err="1"/>
+              <a:t>identificación</a:t>
+            </a:r>
+            <a:r>
+              <a:rPr lang="en-US" dirty="0"/>
+              <a:t> de </a:t>
+            </a:r>
+            <a:r>
+              <a:rPr lang="en-US" dirty="0" err="1"/>
+              <a:t>interesados</a:t>
+            </a:r>
+            <a:r>
+              <a:rPr lang="en-US" dirty="0"/>
+              <a:t>.</a:t>
+            </a:r>
           </a:p>
         </p:txBody>
       </p:sp>
@@ -805,7 +809,7 @@
     </p:spTree>
     <p:extLst>
       <p:ext uri="{BB962C8B-B14F-4D97-AF65-F5344CB8AC3E}">
-        <p14:creationId xmlns:p14="http://schemas.microsoft.com/office/powerpoint/2010/main" val="3846615883"/>
+        <p14:creationId xmlns:p14="http://schemas.microsoft.com/office/powerpoint/2010/main" val="784669118"/>
       </p:ext>
     </p:extLst>
   </p:cSld>
@@ -834,7 +838,7 @@
       </p:grpSpPr>
       <p:sp>
         <p:nvSpPr>
-          <p:cNvPr id="2" name="Marcador de imagen de diapositiva 1"/>
+          <p:cNvPr id="2" name="Slide Image Placeholder 1"/>
           <p:cNvSpPr>
             <a:spLocks noGrp="1" noRot="1" noChangeAspect="1"/>
           </p:cNvSpPr>
@@ -846,7 +850,7 @@
       </p:sp>
       <p:sp>
         <p:nvSpPr>
-          <p:cNvPr id="3" name="Marcador de notas 2"/>
+          <p:cNvPr id="3" name="Notes Placeholder 2"/>
           <p:cNvSpPr>
             <a:spLocks noGrp="1"/>
           </p:cNvSpPr>
@@ -861,23 +865,7 @@
           <a:p>
             <a:r>
               <a:rPr lang="en-US" dirty="0" err="1"/>
-              <a:t>Empezamos</a:t>
-            </a:r>
-            <a:r>
-              <a:rPr lang="en-US" dirty="0"/>
-              <a:t> a </a:t>
-            </a:r>
-            <a:r>
-              <a:rPr lang="en-US" dirty="0" err="1"/>
-              <a:t>hacer</a:t>
-            </a:r>
-            <a:r>
-              <a:rPr lang="en-US" dirty="0"/>
-              <a:t> las </a:t>
-            </a:r>
-            <a:r>
-              <a:rPr lang="en-US" dirty="0" err="1"/>
-              <a:t>historias</a:t>
+              <a:t>Comienzo</a:t>
             </a:r>
             <a:r>
               <a:rPr lang="en-US" dirty="0"/>
@@ -885,11 +873,15 @@
             </a:r>
             <a:r>
               <a:rPr lang="en-US" dirty="0" err="1"/>
-              <a:t>Usuario</a:t>
-            </a:r>
-            <a:r>
-              <a:rPr lang="en-US"/>
-              <a:t>.</a:t>
+              <a:t>estudio</a:t>
+            </a:r>
+            <a:r>
+              <a:rPr lang="en-US" dirty="0"/>
+              <a:t> </a:t>
+            </a:r>
+            <a:r>
+              <a:rPr lang="en-US" dirty="0" err="1"/>
+              <a:t>competidores</a:t>
             </a:r>
             <a:endParaRPr lang="en-US" dirty="0"/>
           </a:p>
@@ -897,7 +889,7 @@
       </p:sp>
       <p:sp>
         <p:nvSpPr>
-          <p:cNvPr id="4" name="Marcador de número de diapositiva 3"/>
+          <p:cNvPr id="4" name="Slide Number Placeholder 3"/>
           <p:cNvSpPr>
             <a:spLocks noGrp="1"/>
           </p:cNvSpPr>
@@ -921,7 +913,7 @@
     </p:spTree>
     <p:extLst>
       <p:ext uri="{BB962C8B-B14F-4D97-AF65-F5344CB8AC3E}">
-        <p14:creationId xmlns:p14="http://schemas.microsoft.com/office/powerpoint/2010/main" val="878510528"/>
+        <p14:creationId xmlns:p14="http://schemas.microsoft.com/office/powerpoint/2010/main" val="3846615883"/>
       </p:ext>
     </p:extLst>
   </p:cSld>
@@ -977,15 +969,23 @@
           <a:p>
             <a:r>
               <a:rPr lang="en-US" dirty="0" err="1"/>
-              <a:t>Completada</a:t>
+              <a:t>Empezamos</a:t>
             </a:r>
             <a:r>
               <a:rPr lang="en-US" dirty="0"/>
-              <a:t> la </a:t>
+              <a:t> a </a:t>
             </a:r>
             <a:r>
               <a:rPr lang="en-US" dirty="0" err="1"/>
-              <a:t>identificación</a:t>
+              <a:t>hacer</a:t>
+            </a:r>
+            <a:r>
+              <a:rPr lang="en-US" dirty="0"/>
+              <a:t> las </a:t>
+            </a:r>
+            <a:r>
+              <a:rPr lang="en-US" dirty="0" err="1"/>
+              <a:t>historias</a:t>
             </a:r>
             <a:r>
               <a:rPr lang="en-US" dirty="0"/>
@@ -993,39 +993,11 @@
             </a:r>
             <a:r>
               <a:rPr lang="en-US" dirty="0" err="1"/>
-              <a:t>interesados</a:t>
-            </a:r>
-            <a:r>
-              <a:rPr lang="en-US" dirty="0"/>
-              <a:t> con sus </a:t>
-            </a:r>
-            <a:r>
-              <a:rPr lang="en-US" dirty="0" err="1"/>
-              <a:t>lista</a:t>
-            </a:r>
-            <a:r>
-              <a:rPr lang="en-US" dirty="0"/>
-              <a:t> de </a:t>
-            </a:r>
-            <a:r>
-              <a:rPr lang="en-US" dirty="0" err="1"/>
-              <a:t>funcionalidades</a:t>
-            </a:r>
-            <a:r>
-              <a:rPr lang="en-US" dirty="0"/>
-              <a:t> y las </a:t>
-            </a:r>
-            <a:r>
-              <a:rPr lang="en-US" dirty="0" err="1"/>
-              <a:t>historias</a:t>
-            </a:r>
-            <a:r>
-              <a:rPr lang="en-US" dirty="0"/>
-              <a:t> de </a:t>
-            </a:r>
-            <a:r>
-              <a:rPr lang="en-US" dirty="0" err="1"/>
               <a:t>Usuario</a:t>
+            </a:r>
+            <a:r>
+              <a:rPr lang="en-US"/>
+              <a:t>.</a:t>
             </a:r>
             <a:endParaRPr lang="en-US" dirty="0"/>
           </a:p>
@@ -1057,7 +1029,7 @@
     </p:spTree>
     <p:extLst>
       <p:ext uri="{BB962C8B-B14F-4D97-AF65-F5344CB8AC3E}">
-        <p14:creationId xmlns:p14="http://schemas.microsoft.com/office/powerpoint/2010/main" val="4157275663"/>
+        <p14:creationId xmlns:p14="http://schemas.microsoft.com/office/powerpoint/2010/main" val="878510528"/>
       </p:ext>
     </p:extLst>
   </p:cSld>
@@ -1086,7 +1058,7 @@
       </p:grpSpPr>
       <p:sp>
         <p:nvSpPr>
-          <p:cNvPr id="2" name="Slide Image Placeholder 1"/>
+          <p:cNvPr id="2" name="Marcador de imagen de diapositiva 1"/>
           <p:cNvSpPr>
             <a:spLocks noGrp="1" noRot="1" noChangeAspect="1"/>
           </p:cNvSpPr>
@@ -1098,7 +1070,7 @@
       </p:sp>
       <p:sp>
         <p:nvSpPr>
-          <p:cNvPr id="3" name="Notes Placeholder 2"/>
+          <p:cNvPr id="3" name="Marcador de notas 2"/>
           <p:cNvSpPr>
             <a:spLocks noGrp="1"/>
           </p:cNvSpPr>
@@ -1113,15 +1085,55 @@
           <a:p>
             <a:r>
               <a:rPr lang="en-US" dirty="0" err="1"/>
-              <a:t>Terminado</a:t>
+              <a:t>Completada</a:t>
             </a:r>
             <a:r>
               <a:rPr lang="en-US" dirty="0"/>
-              <a:t> studio de </a:t>
-            </a:r>
-            <a:r>
-              <a:rPr lang="en-US"/>
-              <a:t>competidores</a:t>
+              <a:t> la </a:t>
+            </a:r>
+            <a:r>
+              <a:rPr lang="en-US" dirty="0" err="1"/>
+              <a:t>identificación</a:t>
+            </a:r>
+            <a:r>
+              <a:rPr lang="en-US" dirty="0"/>
+              <a:t> de </a:t>
+            </a:r>
+            <a:r>
+              <a:rPr lang="en-US" dirty="0" err="1"/>
+              <a:t>interesados</a:t>
+            </a:r>
+            <a:r>
+              <a:rPr lang="en-US" dirty="0"/>
+              <a:t> con sus </a:t>
+            </a:r>
+            <a:r>
+              <a:rPr lang="en-US" dirty="0" err="1"/>
+              <a:t>lista</a:t>
+            </a:r>
+            <a:r>
+              <a:rPr lang="en-US" dirty="0"/>
+              <a:t> de </a:t>
+            </a:r>
+            <a:r>
+              <a:rPr lang="en-US" dirty="0" err="1"/>
+              <a:t>funcionalidades</a:t>
+            </a:r>
+            <a:r>
+              <a:rPr lang="en-US" dirty="0"/>
+              <a:t> y las </a:t>
+            </a:r>
+            <a:r>
+              <a:rPr lang="en-US" dirty="0" err="1"/>
+              <a:t>historias</a:t>
+            </a:r>
+            <a:r>
+              <a:rPr lang="en-US" dirty="0"/>
+              <a:t> de </a:t>
+            </a:r>
+            <a:r>
+              <a:rPr lang="en-US" dirty="0" err="1"/>
+              <a:t>Usuario</a:t>
             </a:r>
             <a:endParaRPr lang="en-US" dirty="0"/>
           </a:p>
@@ -1129,7 +1141,7 @@
       </p:sp>
       <p:sp>
         <p:nvSpPr>
-          <p:cNvPr id="4" name="Slide Number Placeholder 3"/>
+          <p:cNvPr id="4" name="Marcador de número de diapositiva 3"/>
           <p:cNvSpPr>
             <a:spLocks noGrp="1"/>
           </p:cNvSpPr>
@@ -1145,6 +1157,102 @@
             <a:fld id="{90C5D989-6414-4EC9-97AC-BCF628C5D8B9}" type="slidenum">
               <a:rPr lang="en-US" smtClean="0"/>
               <a:t>7</a:t>
+            </a:fld>
+            <a:endParaRPr lang="en-US"/>
+          </a:p>
+        </p:txBody>
+      </p:sp>
+    </p:spTree>
+    <p:extLst>
+      <p:ext uri="{BB962C8B-B14F-4D97-AF65-F5344CB8AC3E}">
+        <p14:creationId xmlns:p14="http://schemas.microsoft.com/office/powerpoint/2010/main" val="4157275663"/>
+      </p:ext>
+    </p:extLst>
+  </p:cSld>
+  <p:clrMapOvr>
+    <a:masterClrMapping/>
+  </p:clrMapOvr>
+</p:notes>
+</file>
+
+<file path=ppt/notesSlides/notesSlide7.xml><?xml version="1.0" encoding="utf-8"?>
+<p:notes xmlns:a="http://schemas.openxmlformats.org/drawingml/2006/main" xmlns:r="http://schemas.openxmlformats.org/officeDocument/2006/relationships" xmlns:p="http://schemas.openxmlformats.org/presentationml/2006/main">
+  <p:cSld>
+    <p:spTree>
+      <p:nvGrpSpPr>
+        <p:cNvPr id="1" name=""/>
+        <p:cNvGrpSpPr/>
+        <p:nvPr/>
+      </p:nvGrpSpPr>
+      <p:grpSpPr>
+        <a:xfrm>
+          <a:off x="0" y="0"/>
+          <a:ext cx="0" cy="0"/>
+          <a:chOff x="0" y="0"/>
+          <a:chExt cx="0" cy="0"/>
+        </a:xfrm>
+      </p:grpSpPr>
+      <p:sp>
+        <p:nvSpPr>
+          <p:cNvPr id="2" name="Slide Image Placeholder 1"/>
+          <p:cNvSpPr>
+            <a:spLocks noGrp="1" noRot="1" noChangeAspect="1"/>
+          </p:cNvSpPr>
+          <p:nvPr>
+            <p:ph type="sldImg"/>
+          </p:nvPr>
+        </p:nvSpPr>
+        <p:spPr/>
+      </p:sp>
+      <p:sp>
+        <p:nvSpPr>
+          <p:cNvPr id="3" name="Notes Placeholder 2"/>
+          <p:cNvSpPr>
+            <a:spLocks noGrp="1"/>
+          </p:cNvSpPr>
+          <p:nvPr>
+            <p:ph type="body" idx="1"/>
+          </p:nvPr>
+        </p:nvSpPr>
+        <p:spPr/>
+        <p:txBody>
+          <a:bodyPr/>
+          <a:lstStyle/>
+          <a:p>
+            <a:r>
+              <a:rPr lang="en-US" dirty="0" err="1"/>
+              <a:t>Terminado</a:t>
+            </a:r>
+            <a:r>
+              <a:rPr lang="en-US" dirty="0"/>
+              <a:t> studio de </a:t>
+            </a:r>
+            <a:r>
+              <a:rPr lang="en-US"/>
+              <a:t>competidores</a:t>
+            </a:r>
+            <a:endParaRPr lang="en-US" dirty="0"/>
+          </a:p>
+        </p:txBody>
+      </p:sp>
+      <p:sp>
+        <p:nvSpPr>
+          <p:cNvPr id="4" name="Slide Number Placeholder 3"/>
+          <p:cNvSpPr>
+            <a:spLocks noGrp="1"/>
+          </p:cNvSpPr>
+          <p:nvPr>
+            <p:ph type="sldNum" sz="quarter" idx="5"/>
+          </p:nvPr>
+        </p:nvSpPr>
+        <p:spPr/>
+        <p:txBody>
+          <a:bodyPr/>
+          <a:lstStyle/>
+          <a:p>
+            <a:fld id="{90C5D989-6414-4EC9-97AC-BCF628C5D8B9}" type="slidenum">
+              <a:rPr lang="en-US" smtClean="0"/>
+              <a:t>8</a:t>
             </a:fld>
             <a:endParaRPr lang="en-US"/>
           </a:p>
@@ -1310,7 +1418,7 @@
           <a:p>
             <a:fld id="{39DCAF25-EC8E-4E4C-BCE0-6880FDA81677}" type="datetimeFigureOut">
               <a:rPr lang="en-US" smtClean="0"/>
-              <a:t>10/4/2021</a:t>
+              <a:t>04-Oct-21</a:t>
             </a:fld>
             <a:endParaRPr lang="en-US"/>
           </a:p>
@@ -1364,7 +1472,7 @@
           <a:p>
             <a:fld id="{ACB33697-2FA8-4DC4-A426-2A40D07A47EB}" type="slidenum">
               <a:rPr lang="en-US" smtClean="0"/>
-              <a:t>‹Nº›</a:t>
+              <a:t>‹#›</a:t>
             </a:fld>
             <a:endParaRPr lang="en-US"/>
           </a:p>
@@ -1508,7 +1616,7 @@
           <a:p>
             <a:fld id="{39DCAF25-EC8E-4E4C-BCE0-6880FDA81677}" type="datetimeFigureOut">
               <a:rPr lang="en-US" smtClean="0"/>
-              <a:t>10/4/2021</a:t>
+              <a:t>04-Oct-21</a:t>
             </a:fld>
             <a:endParaRPr lang="en-US"/>
           </a:p>
@@ -1562,7 +1670,7 @@
           <a:p>
             <a:fld id="{ACB33697-2FA8-4DC4-A426-2A40D07A47EB}" type="slidenum">
               <a:rPr lang="en-US" smtClean="0"/>
-              <a:t>‹Nº›</a:t>
+              <a:t>‹#›</a:t>
             </a:fld>
             <a:endParaRPr lang="en-US"/>
           </a:p>
@@ -1716,7 +1824,7 @@
           <a:p>
             <a:fld id="{39DCAF25-EC8E-4E4C-BCE0-6880FDA81677}" type="datetimeFigureOut">
               <a:rPr lang="en-US" smtClean="0"/>
-              <a:t>10/4/2021</a:t>
+              <a:t>04-Oct-21</a:t>
             </a:fld>
             <a:endParaRPr lang="en-US"/>
           </a:p>
@@ -1770,7 +1878,7 @@
           <a:p>
             <a:fld id="{ACB33697-2FA8-4DC4-A426-2A40D07A47EB}" type="slidenum">
               <a:rPr lang="en-US" smtClean="0"/>
-              <a:t>‹Nº›</a:t>
+              <a:t>‹#›</a:t>
             </a:fld>
             <a:endParaRPr lang="en-US"/>
           </a:p>
@@ -1914,7 +2022,7 @@
           <a:p>
             <a:fld id="{39DCAF25-EC8E-4E4C-BCE0-6880FDA81677}" type="datetimeFigureOut">
               <a:rPr lang="en-US" smtClean="0"/>
-              <a:t>10/4/2021</a:t>
+              <a:t>04-Oct-21</a:t>
             </a:fld>
             <a:endParaRPr lang="en-US"/>
           </a:p>
@@ -1968,7 +2076,7 @@
           <a:p>
             <a:fld id="{ACB33697-2FA8-4DC4-A426-2A40D07A47EB}" type="slidenum">
               <a:rPr lang="en-US" smtClean="0"/>
-              <a:t>‹Nº›</a:t>
+              <a:t>‹#›</a:t>
             </a:fld>
             <a:endParaRPr lang="en-US"/>
           </a:p>
@@ -2189,7 +2297,7 @@
           <a:p>
             <a:fld id="{39DCAF25-EC8E-4E4C-BCE0-6880FDA81677}" type="datetimeFigureOut">
               <a:rPr lang="en-US" smtClean="0"/>
-              <a:t>10/4/2021</a:t>
+              <a:t>04-Oct-21</a:t>
             </a:fld>
             <a:endParaRPr lang="en-US"/>
           </a:p>
@@ -2243,7 +2351,7 @@
           <a:p>
             <a:fld id="{ACB33697-2FA8-4DC4-A426-2A40D07A47EB}" type="slidenum">
               <a:rPr lang="en-US" smtClean="0"/>
-              <a:t>‹Nº›</a:t>
+              <a:t>‹#›</a:t>
             </a:fld>
             <a:endParaRPr lang="en-US"/>
           </a:p>
@@ -2454,7 +2562,7 @@
           <a:p>
             <a:fld id="{39DCAF25-EC8E-4E4C-BCE0-6880FDA81677}" type="datetimeFigureOut">
               <a:rPr lang="en-US" smtClean="0"/>
-              <a:t>10/4/2021</a:t>
+              <a:t>04-Oct-21</a:t>
             </a:fld>
             <a:endParaRPr lang="en-US"/>
           </a:p>
@@ -2508,7 +2616,7 @@
           <a:p>
             <a:fld id="{ACB33697-2FA8-4DC4-A426-2A40D07A47EB}" type="slidenum">
               <a:rPr lang="en-US" smtClean="0"/>
-              <a:t>‹Nº›</a:t>
+              <a:t>‹#›</a:t>
             </a:fld>
             <a:endParaRPr lang="en-US"/>
           </a:p>
@@ -2866,7 +2974,7 @@
           <a:p>
             <a:fld id="{39DCAF25-EC8E-4E4C-BCE0-6880FDA81677}" type="datetimeFigureOut">
               <a:rPr lang="en-US" smtClean="0"/>
-              <a:t>10/4/2021</a:t>
+              <a:t>04-Oct-21</a:t>
             </a:fld>
             <a:endParaRPr lang="en-US"/>
           </a:p>
@@ -2920,7 +3028,7 @@
           <a:p>
             <a:fld id="{ACB33697-2FA8-4DC4-A426-2A40D07A47EB}" type="slidenum">
               <a:rPr lang="en-US" smtClean="0"/>
-              <a:t>‹Nº›</a:t>
+              <a:t>‹#›</a:t>
             </a:fld>
             <a:endParaRPr lang="en-US"/>
           </a:p>
@@ -3007,7 +3115,7 @@
           <a:p>
             <a:fld id="{39DCAF25-EC8E-4E4C-BCE0-6880FDA81677}" type="datetimeFigureOut">
               <a:rPr lang="en-US" smtClean="0"/>
-              <a:t>10/4/2021</a:t>
+              <a:t>04-Oct-21</a:t>
             </a:fld>
             <a:endParaRPr lang="en-US"/>
           </a:p>
@@ -3061,7 +3169,7 @@
           <a:p>
             <a:fld id="{ACB33697-2FA8-4DC4-A426-2A40D07A47EB}" type="slidenum">
               <a:rPr lang="en-US" smtClean="0"/>
-              <a:t>‹Nº›</a:t>
+              <a:t>‹#›</a:t>
             </a:fld>
             <a:endParaRPr lang="en-US"/>
           </a:p>
@@ -3120,7 +3228,7 @@
           <a:p>
             <a:fld id="{39DCAF25-EC8E-4E4C-BCE0-6880FDA81677}" type="datetimeFigureOut">
               <a:rPr lang="en-US" smtClean="0"/>
-              <a:t>10/4/2021</a:t>
+              <a:t>04-Oct-21</a:t>
             </a:fld>
             <a:endParaRPr lang="en-US"/>
           </a:p>
@@ -3174,7 +3282,7 @@
           <a:p>
             <a:fld id="{ACB33697-2FA8-4DC4-A426-2A40D07A47EB}" type="slidenum">
               <a:rPr lang="en-US" smtClean="0"/>
-              <a:t>‹Nº›</a:t>
+              <a:t>‹#›</a:t>
             </a:fld>
             <a:endParaRPr lang="en-US"/>
           </a:p>
@@ -3431,7 +3539,7 @@
           <a:p>
             <a:fld id="{39DCAF25-EC8E-4E4C-BCE0-6880FDA81677}" type="datetimeFigureOut">
               <a:rPr lang="en-US" smtClean="0"/>
-              <a:t>10/4/2021</a:t>
+              <a:t>04-Oct-21</a:t>
             </a:fld>
             <a:endParaRPr lang="en-US"/>
           </a:p>
@@ -3485,7 +3593,7 @@
           <a:p>
             <a:fld id="{ACB33697-2FA8-4DC4-A426-2A40D07A47EB}" type="slidenum">
               <a:rPr lang="en-US" smtClean="0"/>
-              <a:t>‹Nº›</a:t>
+              <a:t>‹#›</a:t>
             </a:fld>
             <a:endParaRPr lang="en-US"/>
           </a:p>
@@ -3719,7 +3827,7 @@
           <a:p>
             <a:fld id="{39DCAF25-EC8E-4E4C-BCE0-6880FDA81677}" type="datetimeFigureOut">
               <a:rPr lang="en-US" smtClean="0"/>
-              <a:t>10/4/2021</a:t>
+              <a:t>04-Oct-21</a:t>
             </a:fld>
             <a:endParaRPr lang="en-US"/>
           </a:p>
@@ -3773,7 +3881,7 @@
           <a:p>
             <a:fld id="{ACB33697-2FA8-4DC4-A426-2A40D07A47EB}" type="slidenum">
               <a:rPr lang="en-US" smtClean="0"/>
-              <a:t>‹Nº›</a:t>
+              <a:t>‹#›</a:t>
             </a:fld>
             <a:endParaRPr lang="en-US"/>
           </a:p>
@@ -3960,7 +4068,7 @@
           <a:p>
             <a:fld id="{39DCAF25-EC8E-4E4C-BCE0-6880FDA81677}" type="datetimeFigureOut">
               <a:rPr lang="en-US" smtClean="0"/>
-              <a:t>10/4/2021</a:t>
+              <a:t>04-Oct-21</a:t>
             </a:fld>
             <a:endParaRPr lang="en-US"/>
           </a:p>
@@ -4050,7 +4158,7 @@
           <a:p>
             <a:fld id="{ACB33697-2FA8-4DC4-A426-2A40D07A47EB}" type="slidenum">
               <a:rPr lang="en-US" smtClean="0"/>
-              <a:t>‹Nº›</a:t>
+              <a:t>‹#›</a:t>
             </a:fld>
             <a:endParaRPr lang="en-US"/>
           </a:p>
@@ -4363,6 +4471,65 @@
 <file path=ppt/slides/slide1.xml><?xml version="1.0" encoding="utf-8"?>
 <p:sld xmlns:a="http://schemas.openxmlformats.org/drawingml/2006/main" xmlns:r="http://schemas.openxmlformats.org/officeDocument/2006/relationships" xmlns:p="http://schemas.openxmlformats.org/presentationml/2006/main">
   <p:cSld>
+    <p:spTree>
+      <p:nvGrpSpPr>
+        <p:cNvPr id="1" name=""/>
+        <p:cNvGrpSpPr/>
+        <p:nvPr/>
+      </p:nvGrpSpPr>
+      <p:grpSpPr>
+        <a:xfrm>
+          <a:off x="0" y="0"/>
+          <a:ext cx="0" cy="0"/>
+          <a:chOff x="0" y="0"/>
+          <a:chExt cx="0" cy="0"/>
+        </a:xfrm>
+      </p:grpSpPr>
+      <p:pic>
+        <p:nvPicPr>
+          <p:cNvPr id="5" name="Picture 4">
+            <a:extLst>
+              <a:ext uri="{FF2B5EF4-FFF2-40B4-BE49-F238E27FC236}">
+                <a16:creationId xmlns:a16="http://schemas.microsoft.com/office/drawing/2014/main" id="{E38F89F3-73A4-42C8-94FE-FE4A945AD05B}"/>
+              </a:ext>
+            </a:extLst>
+          </p:cNvPr>
+          <p:cNvPicPr>
+            <a:picLocks noChangeAspect="1"/>
+          </p:cNvPicPr>
+          <p:nvPr/>
+        </p:nvPicPr>
+        <p:blipFill rotWithShape="1">
+          <a:blip r:embed="rId3"/>
+          <a:srcRect l="1" t="769" r="1177" b="45478"/>
+          <a:stretch/>
+        </p:blipFill>
+        <p:spPr>
+          <a:xfrm>
+            <a:off x="1309368" y="30690"/>
+            <a:ext cx="9573263" cy="6796619"/>
+          </a:xfrm>
+          <a:prstGeom prst="rect">
+            <a:avLst/>
+          </a:prstGeom>
+        </p:spPr>
+      </p:pic>
+    </p:spTree>
+    <p:extLst>
+      <p:ext uri="{BB962C8B-B14F-4D97-AF65-F5344CB8AC3E}">
+        <p14:creationId xmlns:p14="http://schemas.microsoft.com/office/powerpoint/2010/main" val="2316091861"/>
+      </p:ext>
+    </p:extLst>
+  </p:cSld>
+  <p:clrMapOvr>
+    <a:masterClrMapping/>
+  </p:clrMapOvr>
+</p:sld>
+</file>
+
+<file path=ppt/slides/slide2.xml><?xml version="1.0" encoding="utf-8"?>
+<p:sld xmlns:a="http://schemas.openxmlformats.org/drawingml/2006/main" xmlns:r="http://schemas.openxmlformats.org/officeDocument/2006/relationships" xmlns:p="http://schemas.openxmlformats.org/presentationml/2006/main">
+  <p:cSld>
     <p:bg>
       <p:bgPr>
         <a:solidFill>
@@ -4428,7 +4595,7 @@
 </p:sld>
 </file>
 
-<file path=ppt/slides/slide2.xml><?xml version="1.0" encoding="utf-8"?>
+<file path=ppt/slides/slide3.xml><?xml version="1.0" encoding="utf-8"?>
 <p:sld xmlns:a="http://schemas.openxmlformats.org/drawingml/2006/main" xmlns:r="http://schemas.openxmlformats.org/officeDocument/2006/relationships" xmlns:p="http://schemas.openxmlformats.org/presentationml/2006/main">
   <p:cSld>
     <p:spTree>
@@ -4488,7 +4655,7 @@
 </p:sld>
 </file>
 
-<file path=ppt/slides/slide3.xml><?xml version="1.0" encoding="utf-8"?>
+<file path=ppt/slides/slide4.xml><?xml version="1.0" encoding="utf-8"?>
 <p:sld xmlns:a="http://schemas.openxmlformats.org/drawingml/2006/main" xmlns:r="http://schemas.openxmlformats.org/officeDocument/2006/relationships" xmlns:p="http://schemas.openxmlformats.org/presentationml/2006/main">
   <p:cSld>
     <p:spTree>
@@ -4548,7 +4715,7 @@
 </p:sld>
 </file>
 
-<file path=ppt/slides/slide4.xml><?xml version="1.0" encoding="utf-8"?>
+<file path=ppt/slides/slide5.xml><?xml version="1.0" encoding="utf-8"?>
 <p:sld xmlns:a="http://schemas.openxmlformats.org/drawingml/2006/main" xmlns:r="http://schemas.openxmlformats.org/officeDocument/2006/relationships" xmlns:p="http://schemas.openxmlformats.org/presentationml/2006/main">
   <p:cSld>
     <p:spTree>
@@ -4608,7 +4775,7 @@
 </p:sld>
 </file>
 
-<file path=ppt/slides/slide5.xml><?xml version="1.0" encoding="utf-8"?>
+<file path=ppt/slides/slide6.xml><?xml version="1.0" encoding="utf-8"?>
 <p:sld xmlns:a="http://schemas.openxmlformats.org/drawingml/2006/main" xmlns:r="http://schemas.openxmlformats.org/officeDocument/2006/relationships" xmlns:p="http://schemas.openxmlformats.org/presentationml/2006/main">
   <p:cSld>
     <p:spTree>
@@ -4668,7 +4835,7 @@
 </p:sld>
 </file>
 
-<file path=ppt/slides/slide6.xml><?xml version="1.0" encoding="utf-8"?>
+<file path=ppt/slides/slide7.xml><?xml version="1.0" encoding="utf-8"?>
 <p:sld xmlns:a="http://schemas.openxmlformats.org/drawingml/2006/main" xmlns:r="http://schemas.openxmlformats.org/officeDocument/2006/relationships" xmlns:p="http://schemas.openxmlformats.org/presentationml/2006/main">
   <p:cSld>
     <p:spTree>
@@ -4728,7 +4895,7 @@
 </p:sld>
 </file>
 
-<file path=ppt/slides/slide7.xml><?xml version="1.0" encoding="utf-8"?>
+<file path=ppt/slides/slide8.xml><?xml version="1.0" encoding="utf-8"?>
 <p:sld xmlns:a="http://schemas.openxmlformats.org/drawingml/2006/main" xmlns:r="http://schemas.openxmlformats.org/officeDocument/2006/relationships" xmlns:p="http://schemas.openxmlformats.org/presentationml/2006/main">
   <p:cSld>
     <p:bg>
@@ -4929,7 +5096,7 @@
 </p:sld>
 </file>
 
-<file path=ppt/slides/slide8.xml><?xml version="1.0" encoding="utf-8"?>
+<file path=ppt/slides/slide9.xml><?xml version="1.0" encoding="utf-8"?>
 <p:sld xmlns:a="http://schemas.openxmlformats.org/drawingml/2006/main" xmlns:r="http://schemas.openxmlformats.org/officeDocument/2006/relationships" xmlns:p="http://schemas.openxmlformats.org/presentationml/2006/main">
   <p:cSld>
     <p:spTree>

</xml_diff>

<commit_message>
Terminado el control del sprint y pasado a Done.
</commit_message>
<xml_diff>
--- a/Iteracion1/TaskBoard.pptx
+++ b/Iteracion1/TaskBoard.pptx
@@ -5,7 +5,7 @@
     <p:sldMasterId id="2147483648" r:id="rId1"/>
   </p:sldMasterIdLst>
   <p:notesMasterIdLst>
-    <p:notesMasterId r:id="rId11"/>
+    <p:notesMasterId r:id="rId12"/>
   </p:notesMasterIdLst>
   <p:sldIdLst>
     <p:sldId id="264" r:id="rId2"/>
@@ -17,6 +17,7 @@
     <p:sldId id="261" r:id="rId8"/>
     <p:sldId id="262" r:id="rId9"/>
     <p:sldId id="263" r:id="rId10"/>
+    <p:sldId id="265" r:id="rId11"/>
   </p:sldIdLst>
   <p:sldSz cx="12192000" cy="6858000"/>
   <p:notesSz cx="6858000" cy="9144000"/>
@@ -364,7 +365,7 @@
           <a:p>
             <a:fld id="{90C5D989-6414-4EC9-97AC-BCF628C5D8B9}" type="slidenum">
               <a:rPr lang="en-US" smtClean="0"/>
-              <a:t>‹#›</a:t>
+              <a:t>‹Nº›</a:t>
             </a:fld>
             <a:endParaRPr lang="en-US"/>
           </a:p>
@@ -625,20 +626,20 @@
           <a:lstStyle/>
           <a:p>
             <a:r>
+              <a:rPr lang="en-US" err="1"/>
+              <a:t>Creadas</a:t>
+            </a:r>
+            <a:r>
+              <a:rPr lang="en-US"/>
+              <a:t> tareas </a:t>
+            </a:r>
+            <a:r>
+              <a:rPr lang="en-US" dirty="0"/>
+              <a:t>para </a:t>
+            </a:r>
+            <a:r>
               <a:rPr lang="en-US" dirty="0" err="1"/>
-              <a:t>Empezada</a:t>
-            </a:r>
-            <a:r>
-              <a:rPr lang="en-US" dirty="0"/>
-              <a:t> la </a:t>
-            </a:r>
-            <a:r>
-              <a:rPr lang="en-US" dirty="0" err="1"/>
-              <a:t>planificación</a:t>
-            </a:r>
-            <a:r>
-              <a:rPr lang="en-US"/>
-              <a:t>.</a:t>
+              <a:t>hacer</a:t>
             </a:r>
             <a:endParaRPr lang="en-US" dirty="0"/>
           </a:p>
@@ -661,7 +662,7 @@
           <a:p>
             <a:fld id="{90C5D989-6414-4EC9-97AC-BCF628C5D8B9}" type="slidenum">
               <a:rPr lang="en-US" smtClean="0"/>
-              <a:t>3</a:t>
+              <a:t>2</a:t>
             </a:fld>
             <a:endParaRPr lang="en-US"/>
           </a:p>
@@ -670,7 +671,7 @@
     </p:spTree>
     <p:extLst>
       <p:ext uri="{BB962C8B-B14F-4D97-AF65-F5344CB8AC3E}">
-        <p14:creationId xmlns:p14="http://schemas.microsoft.com/office/powerpoint/2010/main" val="2420125520"/>
+        <p14:creationId xmlns:p14="http://schemas.microsoft.com/office/powerpoint/2010/main" val="577220348"/>
       </p:ext>
     </p:extLst>
   </p:cSld>
@@ -699,7 +700,7 @@
       </p:grpSpPr>
       <p:sp>
         <p:nvSpPr>
-          <p:cNvPr id="2" name="Slide Image Placeholder 1"/>
+          <p:cNvPr id="2" name="Marcador de imagen de diapositiva 1"/>
           <p:cNvSpPr>
             <a:spLocks noGrp="1" noRot="1" noChangeAspect="1"/>
           </p:cNvSpPr>
@@ -711,7 +712,7 @@
       </p:sp>
       <p:sp>
         <p:nvSpPr>
-          <p:cNvPr id="3" name="Notes Placeholder 2"/>
+          <p:cNvPr id="3" name="Marcador de notas 2"/>
           <p:cNvSpPr>
             <a:spLocks noGrp="1"/>
           </p:cNvSpPr>
@@ -726,66 +727,27 @@
           <a:p>
             <a:r>
               <a:rPr lang="en-US" dirty="0" err="1"/>
-              <a:t>Finalización</a:t>
+              <a:t>Empezada</a:t>
             </a:r>
             <a:r>
               <a:rPr lang="en-US" dirty="0"/>
-              <a:t> de </a:t>
+              <a:t> la </a:t>
             </a:r>
             <a:r>
               <a:rPr lang="en-US" dirty="0" err="1"/>
               <a:t>planificación</a:t>
             </a:r>
             <a:r>
-              <a:rPr lang="en-US" dirty="0"/>
-              <a:t> y </a:t>
-            </a:r>
-            <a:r>
-              <a:rPr lang="en-US" dirty="0" err="1"/>
-              <a:t>comienzo</a:t>
-            </a:r>
-            <a:r>
-              <a:rPr lang="en-US" dirty="0"/>
-              <a:t> de Lista de </a:t>
-            </a:r>
-            <a:r>
-              <a:rPr lang="en-US" dirty="0" err="1"/>
-              <a:t>funcionalidades</a:t>
-            </a:r>
-            <a:r>
-              <a:rPr lang="en-US" dirty="0"/>
-              <a:t> por </a:t>
-            </a:r>
-            <a:r>
-              <a:rPr lang="en-US" dirty="0" err="1"/>
-              <a:t>interesado</a:t>
-            </a:r>
-            <a:r>
-              <a:rPr lang="en-US" dirty="0"/>
-              <a:t> y </a:t>
-            </a:r>
-            <a:r>
-              <a:rPr lang="en-US" dirty="0" err="1"/>
-              <a:t>identificación</a:t>
-            </a:r>
-            <a:r>
-              <a:rPr lang="en-US" dirty="0"/>
-              <a:t> de </a:t>
-            </a:r>
-            <a:r>
-              <a:rPr lang="en-US" dirty="0" err="1"/>
-              <a:t>interesados</a:t>
-            </a:r>
-            <a:r>
-              <a:rPr lang="en-US" dirty="0"/>
+              <a:rPr lang="en-US"/>
               <a:t>.</a:t>
             </a:r>
-          </a:p>
-        </p:txBody>
-      </p:sp>
-      <p:sp>
-        <p:nvSpPr>
-          <p:cNvPr id="4" name="Slide Number Placeholder 3"/>
+            <a:endParaRPr lang="en-US" dirty="0"/>
+          </a:p>
+        </p:txBody>
+      </p:sp>
+      <p:sp>
+        <p:nvSpPr>
+          <p:cNvPr id="4" name="Marcador de número de diapositiva 3"/>
           <p:cNvSpPr>
             <a:spLocks noGrp="1"/>
           </p:cNvSpPr>
@@ -800,7 +762,7 @@
           <a:p>
             <a:fld id="{90C5D989-6414-4EC9-97AC-BCF628C5D8B9}" type="slidenum">
               <a:rPr lang="en-US" smtClean="0"/>
-              <a:t>4</a:t>
+              <a:t>3</a:t>
             </a:fld>
             <a:endParaRPr lang="en-US"/>
           </a:p>
@@ -809,7 +771,7 @@
     </p:spTree>
     <p:extLst>
       <p:ext uri="{BB962C8B-B14F-4D97-AF65-F5344CB8AC3E}">
-        <p14:creationId xmlns:p14="http://schemas.microsoft.com/office/powerpoint/2010/main" val="784669118"/>
+        <p14:creationId xmlns:p14="http://schemas.microsoft.com/office/powerpoint/2010/main" val="2420125520"/>
       </p:ext>
     </p:extLst>
   </p:cSld>
@@ -865,7 +827,47 @@
           <a:p>
             <a:r>
               <a:rPr lang="en-US" dirty="0" err="1"/>
-              <a:t>Comienzo</a:t>
+              <a:t>Terminada</a:t>
+            </a:r>
+            <a:r>
+              <a:rPr lang="en-US" dirty="0"/>
+              <a:t> la </a:t>
+            </a:r>
+            <a:r>
+              <a:rPr lang="en-US" dirty="0" err="1"/>
+              <a:t>planificación</a:t>
+            </a:r>
+            <a:r>
+              <a:rPr lang="en-US" dirty="0"/>
+              <a:t> y </a:t>
+            </a:r>
+            <a:r>
+              <a:rPr lang="en-US" dirty="0" err="1"/>
+              <a:t>comienzo</a:t>
+            </a:r>
+            <a:r>
+              <a:rPr lang="en-US" dirty="0"/>
+              <a:t> de Lista de </a:t>
+            </a:r>
+            <a:r>
+              <a:rPr lang="en-US" dirty="0" err="1"/>
+              <a:t>funcionalidades</a:t>
+            </a:r>
+            <a:r>
+              <a:rPr lang="en-US" dirty="0"/>
+              <a:t> por </a:t>
+            </a:r>
+            <a:r>
+              <a:rPr lang="en-US" dirty="0" err="1"/>
+              <a:t>interesado</a:t>
+            </a:r>
+            <a:r>
+              <a:rPr lang="en-US" dirty="0"/>
+              <a:t> y </a:t>
+            </a:r>
+            <a:r>
+              <a:rPr lang="en-US" dirty="0" err="1"/>
+              <a:t>identificación</a:t>
             </a:r>
             <a:r>
               <a:rPr lang="en-US" dirty="0"/>
@@ -873,17 +875,12 @@
             </a:r>
             <a:r>
               <a:rPr lang="en-US" dirty="0" err="1"/>
-              <a:t>estudio</a:t>
+              <a:t>interesados</a:t>
             </a:r>
             <a:r>
               <a:rPr lang="en-US" dirty="0"/>
-              <a:t> </a:t>
-            </a:r>
-            <a:r>
-              <a:rPr lang="en-US" dirty="0" err="1"/>
-              <a:t>competidores</a:t>
-            </a:r>
-            <a:endParaRPr lang="en-US" dirty="0"/>
+              <a:t>.</a:t>
+            </a:r>
           </a:p>
         </p:txBody>
       </p:sp>
@@ -904,7 +901,7 @@
           <a:p>
             <a:fld id="{90C5D989-6414-4EC9-97AC-BCF628C5D8B9}" type="slidenum">
               <a:rPr lang="en-US" smtClean="0"/>
-              <a:t>5</a:t>
+              <a:t>4</a:t>
             </a:fld>
             <a:endParaRPr lang="en-US"/>
           </a:p>
@@ -913,7 +910,7 @@
     </p:spTree>
     <p:extLst>
       <p:ext uri="{BB962C8B-B14F-4D97-AF65-F5344CB8AC3E}">
-        <p14:creationId xmlns:p14="http://schemas.microsoft.com/office/powerpoint/2010/main" val="3846615883"/>
+        <p14:creationId xmlns:p14="http://schemas.microsoft.com/office/powerpoint/2010/main" val="784669118"/>
       </p:ext>
     </p:extLst>
   </p:cSld>
@@ -942,7 +939,7 @@
       </p:grpSpPr>
       <p:sp>
         <p:nvSpPr>
-          <p:cNvPr id="2" name="Marcador de imagen de diapositiva 1"/>
+          <p:cNvPr id="2" name="Slide Image Placeholder 1"/>
           <p:cNvSpPr>
             <a:spLocks noGrp="1" noRot="1" noChangeAspect="1"/>
           </p:cNvSpPr>
@@ -954,7 +951,7 @@
       </p:sp>
       <p:sp>
         <p:nvSpPr>
-          <p:cNvPr id="3" name="Marcador de notas 2"/>
+          <p:cNvPr id="3" name="Notes Placeholder 2"/>
           <p:cNvSpPr>
             <a:spLocks noGrp="1"/>
           </p:cNvSpPr>
@@ -969,23 +966,15 @@
           <a:p>
             <a:r>
               <a:rPr lang="en-US" dirty="0" err="1"/>
-              <a:t>Empezamos</a:t>
+              <a:t>Empezado</a:t>
             </a:r>
             <a:r>
               <a:rPr lang="en-US" dirty="0"/>
-              <a:t> a </a:t>
+              <a:t> </a:t>
             </a:r>
             <a:r>
               <a:rPr lang="en-US" dirty="0" err="1"/>
-              <a:t>hacer</a:t>
-            </a:r>
-            <a:r>
-              <a:rPr lang="en-US" dirty="0"/>
-              <a:t> las </a:t>
-            </a:r>
-            <a:r>
-              <a:rPr lang="en-US" dirty="0" err="1"/>
-              <a:t>historias</a:t>
+              <a:t>estudio</a:t>
             </a:r>
             <a:r>
               <a:rPr lang="en-US" dirty="0"/>
@@ -993,11 +982,7 @@
             </a:r>
             <a:r>
               <a:rPr lang="en-US" dirty="0" err="1"/>
-              <a:t>Usuario</a:t>
-            </a:r>
-            <a:r>
-              <a:rPr lang="en-US"/>
-              <a:t>.</a:t>
+              <a:t>competidores</a:t>
             </a:r>
             <a:endParaRPr lang="en-US" dirty="0"/>
           </a:p>
@@ -1005,7 +990,7 @@
       </p:sp>
       <p:sp>
         <p:nvSpPr>
-          <p:cNvPr id="4" name="Marcador de número de diapositiva 3"/>
+          <p:cNvPr id="4" name="Slide Number Placeholder 3"/>
           <p:cNvSpPr>
             <a:spLocks noGrp="1"/>
           </p:cNvSpPr>
@@ -1020,7 +1005,7 @@
           <a:p>
             <a:fld id="{90C5D989-6414-4EC9-97AC-BCF628C5D8B9}" type="slidenum">
               <a:rPr lang="en-US" smtClean="0"/>
-              <a:t>6</a:t>
+              <a:t>5</a:t>
             </a:fld>
             <a:endParaRPr lang="en-US"/>
           </a:p>
@@ -1029,7 +1014,7 @@
     </p:spTree>
     <p:extLst>
       <p:ext uri="{BB962C8B-B14F-4D97-AF65-F5344CB8AC3E}">
-        <p14:creationId xmlns:p14="http://schemas.microsoft.com/office/powerpoint/2010/main" val="878510528"/>
+        <p14:creationId xmlns:p14="http://schemas.microsoft.com/office/powerpoint/2010/main" val="3846615883"/>
       </p:ext>
     </p:extLst>
   </p:cSld>
@@ -1085,15 +1070,23 @@
           <a:p>
             <a:r>
               <a:rPr lang="en-US" dirty="0" err="1"/>
-              <a:t>Completada</a:t>
+              <a:t>Empezamos</a:t>
             </a:r>
             <a:r>
               <a:rPr lang="en-US" dirty="0"/>
-              <a:t> la </a:t>
+              <a:t> a </a:t>
             </a:r>
             <a:r>
               <a:rPr lang="en-US" dirty="0" err="1"/>
-              <a:t>identificación</a:t>
+              <a:t>hacer</a:t>
+            </a:r>
+            <a:r>
+              <a:rPr lang="en-US" dirty="0"/>
+              <a:t> las </a:t>
+            </a:r>
+            <a:r>
+              <a:rPr lang="en-US" dirty="0" err="1"/>
+              <a:t>historias</a:t>
             </a:r>
             <a:r>
               <a:rPr lang="en-US" dirty="0"/>
@@ -1101,41 +1094,12 @@
             </a:r>
             <a:r>
               <a:rPr lang="en-US" dirty="0" err="1"/>
-              <a:t>interesados</a:t>
+              <a:t>Usuario</a:t>
             </a:r>
             <a:r>
               <a:rPr lang="en-US" dirty="0"/>
-              <a:t> con sus </a:t>
-            </a:r>
-            <a:r>
-              <a:rPr lang="en-US" dirty="0" err="1"/>
-              <a:t>lista</a:t>
-            </a:r>
-            <a:r>
-              <a:rPr lang="en-US" dirty="0"/>
-              <a:t> de </a:t>
-            </a:r>
-            <a:r>
-              <a:rPr lang="en-US" dirty="0" err="1"/>
-              <a:t>funcionalidades</a:t>
-            </a:r>
-            <a:r>
-              <a:rPr lang="en-US" dirty="0"/>
-              <a:t> y las </a:t>
-            </a:r>
-            <a:r>
-              <a:rPr lang="en-US" dirty="0" err="1"/>
-              <a:t>historias</a:t>
-            </a:r>
-            <a:r>
-              <a:rPr lang="en-US" dirty="0"/>
-              <a:t> de </a:t>
-            </a:r>
-            <a:r>
-              <a:rPr lang="en-US" dirty="0" err="1"/>
-              <a:t>Usuario</a:t>
-            </a:r>
-            <a:endParaRPr lang="en-US" dirty="0"/>
+              <a:t>.</a:t>
+            </a:r>
           </a:p>
         </p:txBody>
       </p:sp>
@@ -1156,7 +1120,7 @@
           <a:p>
             <a:fld id="{90C5D989-6414-4EC9-97AC-BCF628C5D8B9}" type="slidenum">
               <a:rPr lang="en-US" smtClean="0"/>
-              <a:t>7</a:t>
+              <a:t>6</a:t>
             </a:fld>
             <a:endParaRPr lang="en-US"/>
           </a:p>
@@ -1165,7 +1129,7 @@
     </p:spTree>
     <p:extLst>
       <p:ext uri="{BB962C8B-B14F-4D97-AF65-F5344CB8AC3E}">
-        <p14:creationId xmlns:p14="http://schemas.microsoft.com/office/powerpoint/2010/main" val="4157275663"/>
+        <p14:creationId xmlns:p14="http://schemas.microsoft.com/office/powerpoint/2010/main" val="878510528"/>
       </p:ext>
     </p:extLst>
   </p:cSld>
@@ -1194,6 +1158,142 @@
       </p:grpSpPr>
       <p:sp>
         <p:nvSpPr>
+          <p:cNvPr id="2" name="Marcador de imagen de diapositiva 1"/>
+          <p:cNvSpPr>
+            <a:spLocks noGrp="1" noRot="1" noChangeAspect="1"/>
+          </p:cNvSpPr>
+          <p:nvPr>
+            <p:ph type="sldImg"/>
+          </p:nvPr>
+        </p:nvSpPr>
+        <p:spPr/>
+      </p:sp>
+      <p:sp>
+        <p:nvSpPr>
+          <p:cNvPr id="3" name="Marcador de notas 2"/>
+          <p:cNvSpPr>
+            <a:spLocks noGrp="1"/>
+          </p:cNvSpPr>
+          <p:nvPr>
+            <p:ph type="body" idx="1"/>
+          </p:nvPr>
+        </p:nvSpPr>
+        <p:spPr/>
+        <p:txBody>
+          <a:bodyPr/>
+          <a:lstStyle/>
+          <a:p>
+            <a:r>
+              <a:rPr lang="en-US" dirty="0" err="1"/>
+              <a:t>Terminada</a:t>
+            </a:r>
+            <a:r>
+              <a:rPr lang="en-US" dirty="0"/>
+              <a:t> la </a:t>
+            </a:r>
+            <a:r>
+              <a:rPr lang="en-US" dirty="0" err="1"/>
+              <a:t>identificación</a:t>
+            </a:r>
+            <a:r>
+              <a:rPr lang="en-US" dirty="0"/>
+              <a:t> de </a:t>
+            </a:r>
+            <a:r>
+              <a:rPr lang="en-US" dirty="0" err="1"/>
+              <a:t>interesados</a:t>
+            </a:r>
+            <a:r>
+              <a:rPr lang="en-US" dirty="0"/>
+              <a:t> con sus </a:t>
+            </a:r>
+            <a:r>
+              <a:rPr lang="en-US" dirty="0" err="1"/>
+              <a:t>lista</a:t>
+            </a:r>
+            <a:r>
+              <a:rPr lang="en-US" dirty="0"/>
+              <a:t> de </a:t>
+            </a:r>
+            <a:r>
+              <a:rPr lang="en-US" dirty="0" err="1"/>
+              <a:t>funcionalidades</a:t>
+            </a:r>
+            <a:r>
+              <a:rPr lang="en-US" dirty="0"/>
+              <a:t> y las </a:t>
+            </a:r>
+            <a:r>
+              <a:rPr lang="en-US" dirty="0" err="1"/>
+              <a:t>historias</a:t>
+            </a:r>
+            <a:r>
+              <a:rPr lang="en-US" dirty="0"/>
+              <a:t> de </a:t>
+            </a:r>
+            <a:r>
+              <a:rPr lang="en-US" dirty="0" err="1"/>
+              <a:t>Usuario</a:t>
+            </a:r>
+            <a:endParaRPr lang="en-US" dirty="0"/>
+          </a:p>
+        </p:txBody>
+      </p:sp>
+      <p:sp>
+        <p:nvSpPr>
+          <p:cNvPr id="4" name="Marcador de número de diapositiva 3"/>
+          <p:cNvSpPr>
+            <a:spLocks noGrp="1"/>
+          </p:cNvSpPr>
+          <p:nvPr>
+            <p:ph type="sldNum" sz="quarter" idx="5"/>
+          </p:nvPr>
+        </p:nvSpPr>
+        <p:spPr/>
+        <p:txBody>
+          <a:bodyPr/>
+          <a:lstStyle/>
+          <a:p>
+            <a:fld id="{90C5D989-6414-4EC9-97AC-BCF628C5D8B9}" type="slidenum">
+              <a:rPr lang="en-US" smtClean="0"/>
+              <a:t>7</a:t>
+            </a:fld>
+            <a:endParaRPr lang="en-US"/>
+          </a:p>
+        </p:txBody>
+      </p:sp>
+    </p:spTree>
+    <p:extLst>
+      <p:ext uri="{BB962C8B-B14F-4D97-AF65-F5344CB8AC3E}">
+        <p14:creationId xmlns:p14="http://schemas.microsoft.com/office/powerpoint/2010/main" val="4157275663"/>
+      </p:ext>
+    </p:extLst>
+  </p:cSld>
+  <p:clrMapOvr>
+    <a:masterClrMapping/>
+  </p:clrMapOvr>
+</p:notes>
+</file>
+
+<file path=ppt/notesSlides/notesSlide8.xml><?xml version="1.0" encoding="utf-8"?>
+<p:notes xmlns:a="http://schemas.openxmlformats.org/drawingml/2006/main" xmlns:r="http://schemas.openxmlformats.org/officeDocument/2006/relationships" xmlns:p="http://schemas.openxmlformats.org/presentationml/2006/main">
+  <p:cSld>
+    <p:spTree>
+      <p:nvGrpSpPr>
+        <p:cNvPr id="1" name=""/>
+        <p:cNvGrpSpPr/>
+        <p:nvPr/>
+      </p:nvGrpSpPr>
+      <p:grpSpPr>
+        <a:xfrm>
+          <a:off x="0" y="0"/>
+          <a:ext cx="0" cy="0"/>
+          <a:chOff x="0" y="0"/>
+          <a:chExt cx="0" cy="0"/>
+        </a:xfrm>
+      </p:grpSpPr>
+      <p:sp>
+        <p:nvSpPr>
           <p:cNvPr id="2" name="Slide Image Placeholder 1"/>
           <p:cNvSpPr>
             <a:spLocks noGrp="1" noRot="1" noChangeAspect="1"/>
@@ -1262,6 +1362,97 @@
     <p:extLst>
       <p:ext uri="{BB962C8B-B14F-4D97-AF65-F5344CB8AC3E}">
         <p14:creationId xmlns:p14="http://schemas.microsoft.com/office/powerpoint/2010/main" val="2564619646"/>
+      </p:ext>
+    </p:extLst>
+  </p:cSld>
+  <p:clrMapOvr>
+    <a:masterClrMapping/>
+  </p:clrMapOvr>
+</p:notes>
+</file>
+
+<file path=ppt/notesSlides/notesSlide9.xml><?xml version="1.0" encoding="utf-8"?>
+<p:notes xmlns:a="http://schemas.openxmlformats.org/drawingml/2006/main" xmlns:r="http://schemas.openxmlformats.org/officeDocument/2006/relationships" xmlns:p="http://schemas.openxmlformats.org/presentationml/2006/main">
+  <p:cSld>
+    <p:spTree>
+      <p:nvGrpSpPr>
+        <p:cNvPr id="1" name=""/>
+        <p:cNvGrpSpPr/>
+        <p:nvPr/>
+      </p:nvGrpSpPr>
+      <p:grpSpPr>
+        <a:xfrm>
+          <a:off x="0" y="0"/>
+          <a:ext cx="0" cy="0"/>
+          <a:chOff x="0" y="0"/>
+          <a:chExt cx="0" cy="0"/>
+        </a:xfrm>
+      </p:grpSpPr>
+      <p:sp>
+        <p:nvSpPr>
+          <p:cNvPr id="2" name="Marcador de imagen de diapositiva 1"/>
+          <p:cNvSpPr>
+            <a:spLocks noGrp="1" noRot="1" noChangeAspect="1"/>
+          </p:cNvSpPr>
+          <p:nvPr>
+            <p:ph type="sldImg"/>
+          </p:nvPr>
+        </p:nvSpPr>
+        <p:spPr/>
+      </p:sp>
+      <p:sp>
+        <p:nvSpPr>
+          <p:cNvPr id="3" name="Marcador de notas 2"/>
+          <p:cNvSpPr>
+            <a:spLocks noGrp="1"/>
+          </p:cNvSpPr>
+          <p:nvPr>
+            <p:ph type="body" idx="1"/>
+          </p:nvPr>
+        </p:nvSpPr>
+        <p:spPr/>
+        <p:txBody>
+          <a:bodyPr/>
+          <a:lstStyle/>
+          <a:p>
+            <a:r>
+              <a:rPr lang="en-US" dirty="0" err="1"/>
+              <a:t>Terminado</a:t>
+            </a:r>
+            <a:r>
+              <a:rPr lang="en-US" dirty="0"/>
+              <a:t> control de sprint.</a:t>
+            </a:r>
+          </a:p>
+        </p:txBody>
+      </p:sp>
+      <p:sp>
+        <p:nvSpPr>
+          <p:cNvPr id="4" name="Marcador de número de diapositiva 3"/>
+          <p:cNvSpPr>
+            <a:spLocks noGrp="1"/>
+          </p:cNvSpPr>
+          <p:nvPr>
+            <p:ph type="sldNum" sz="quarter" idx="5"/>
+          </p:nvPr>
+        </p:nvSpPr>
+        <p:spPr/>
+        <p:txBody>
+          <a:bodyPr/>
+          <a:lstStyle/>
+          <a:p>
+            <a:fld id="{90C5D989-6414-4EC9-97AC-BCF628C5D8B9}" type="slidenum">
+              <a:rPr lang="en-US" smtClean="0"/>
+              <a:t>10</a:t>
+            </a:fld>
+            <a:endParaRPr lang="en-US"/>
+          </a:p>
+        </p:txBody>
+      </p:sp>
+    </p:spTree>
+    <p:extLst>
+      <p:ext uri="{BB962C8B-B14F-4D97-AF65-F5344CB8AC3E}">
+        <p14:creationId xmlns:p14="http://schemas.microsoft.com/office/powerpoint/2010/main" val="1403386285"/>
       </p:ext>
     </p:extLst>
   </p:cSld>
@@ -1472,7 +1663,7 @@
           <a:p>
             <a:fld id="{ACB33697-2FA8-4DC4-A426-2A40D07A47EB}" type="slidenum">
               <a:rPr lang="en-US" smtClean="0"/>
-              <a:t>‹#›</a:t>
+              <a:t>‹Nº›</a:t>
             </a:fld>
             <a:endParaRPr lang="en-US"/>
           </a:p>
@@ -1670,7 +1861,7 @@
           <a:p>
             <a:fld id="{ACB33697-2FA8-4DC4-A426-2A40D07A47EB}" type="slidenum">
               <a:rPr lang="en-US" smtClean="0"/>
-              <a:t>‹#›</a:t>
+              <a:t>‹Nº›</a:t>
             </a:fld>
             <a:endParaRPr lang="en-US"/>
           </a:p>
@@ -1878,7 +2069,7 @@
           <a:p>
             <a:fld id="{ACB33697-2FA8-4DC4-A426-2A40D07A47EB}" type="slidenum">
               <a:rPr lang="en-US" smtClean="0"/>
-              <a:t>‹#›</a:t>
+              <a:t>‹Nº›</a:t>
             </a:fld>
             <a:endParaRPr lang="en-US"/>
           </a:p>
@@ -2076,7 +2267,7 @@
           <a:p>
             <a:fld id="{ACB33697-2FA8-4DC4-A426-2A40D07A47EB}" type="slidenum">
               <a:rPr lang="en-US" smtClean="0"/>
-              <a:t>‹#›</a:t>
+              <a:t>‹Nº›</a:t>
             </a:fld>
             <a:endParaRPr lang="en-US"/>
           </a:p>
@@ -2351,7 +2542,7 @@
           <a:p>
             <a:fld id="{ACB33697-2FA8-4DC4-A426-2A40D07A47EB}" type="slidenum">
               <a:rPr lang="en-US" smtClean="0"/>
-              <a:t>‹#›</a:t>
+              <a:t>‹Nº›</a:t>
             </a:fld>
             <a:endParaRPr lang="en-US"/>
           </a:p>
@@ -2616,7 +2807,7 @@
           <a:p>
             <a:fld id="{ACB33697-2FA8-4DC4-A426-2A40D07A47EB}" type="slidenum">
               <a:rPr lang="en-US" smtClean="0"/>
-              <a:t>‹#›</a:t>
+              <a:t>‹Nº›</a:t>
             </a:fld>
             <a:endParaRPr lang="en-US"/>
           </a:p>
@@ -3028,7 +3219,7 @@
           <a:p>
             <a:fld id="{ACB33697-2FA8-4DC4-A426-2A40D07A47EB}" type="slidenum">
               <a:rPr lang="en-US" smtClean="0"/>
-              <a:t>‹#›</a:t>
+              <a:t>‹Nº›</a:t>
             </a:fld>
             <a:endParaRPr lang="en-US"/>
           </a:p>
@@ -3169,7 +3360,7 @@
           <a:p>
             <a:fld id="{ACB33697-2FA8-4DC4-A426-2A40D07A47EB}" type="slidenum">
               <a:rPr lang="en-US" smtClean="0"/>
-              <a:t>‹#›</a:t>
+              <a:t>‹Nº›</a:t>
             </a:fld>
             <a:endParaRPr lang="en-US"/>
           </a:p>
@@ -3282,7 +3473,7 @@
           <a:p>
             <a:fld id="{ACB33697-2FA8-4DC4-A426-2A40D07A47EB}" type="slidenum">
               <a:rPr lang="en-US" smtClean="0"/>
-              <a:t>‹#›</a:t>
+              <a:t>‹Nº›</a:t>
             </a:fld>
             <a:endParaRPr lang="en-US"/>
           </a:p>
@@ -3593,7 +3784,7 @@
           <a:p>
             <a:fld id="{ACB33697-2FA8-4DC4-A426-2A40D07A47EB}" type="slidenum">
               <a:rPr lang="en-US" smtClean="0"/>
-              <a:t>‹#›</a:t>
+              <a:t>‹Nº›</a:t>
             </a:fld>
             <a:endParaRPr lang="en-US"/>
           </a:p>
@@ -3881,7 +4072,7 @@
           <a:p>
             <a:fld id="{ACB33697-2FA8-4DC4-A426-2A40D07A47EB}" type="slidenum">
               <a:rPr lang="en-US" smtClean="0"/>
-              <a:t>‹#›</a:t>
+              <a:t>‹Nº›</a:t>
             </a:fld>
             <a:endParaRPr lang="en-US"/>
           </a:p>
@@ -4158,7 +4349,7 @@
           <a:p>
             <a:fld id="{ACB33697-2FA8-4DC4-A426-2A40D07A47EB}" type="slidenum">
               <a:rPr lang="en-US" smtClean="0"/>
-              <a:t>‹#›</a:t>
+              <a:t>‹Nº›</a:t>
             </a:fld>
             <a:endParaRPr lang="en-US"/>
           </a:p>
@@ -4527,6 +4718,66 @@
 </p:sld>
 </file>
 
+<file path=ppt/slides/slide10.xml><?xml version="1.0" encoding="utf-8"?>
+<p:sld xmlns:a="http://schemas.openxmlformats.org/drawingml/2006/main" xmlns:r="http://schemas.openxmlformats.org/officeDocument/2006/relationships" xmlns:p="http://schemas.openxmlformats.org/presentationml/2006/main">
+  <p:cSld>
+    <p:spTree>
+      <p:nvGrpSpPr>
+        <p:cNvPr id="1" name=""/>
+        <p:cNvGrpSpPr/>
+        <p:nvPr/>
+      </p:nvGrpSpPr>
+      <p:grpSpPr>
+        <a:xfrm>
+          <a:off x="0" y="0"/>
+          <a:ext cx="0" cy="0"/>
+          <a:chOff x="0" y="0"/>
+          <a:chExt cx="0" cy="0"/>
+        </a:xfrm>
+      </p:grpSpPr>
+      <p:pic>
+        <p:nvPicPr>
+          <p:cNvPr id="5" name="Imagen 4">
+            <a:extLst>
+              <a:ext uri="{FF2B5EF4-FFF2-40B4-BE49-F238E27FC236}">
+                <a16:creationId xmlns:a16="http://schemas.microsoft.com/office/drawing/2014/main" id="{843D6288-85C8-48E6-AD62-E9908017366E}"/>
+              </a:ext>
+            </a:extLst>
+          </p:cNvPr>
+          <p:cNvPicPr>
+            <a:picLocks noChangeAspect="1"/>
+          </p:cNvPicPr>
+          <p:nvPr/>
+        </p:nvPicPr>
+        <p:blipFill>
+          <a:blip r:embed="rId3"/>
+          <a:stretch>
+            <a:fillRect/>
+          </a:stretch>
+        </p:blipFill>
+        <p:spPr>
+          <a:xfrm>
+            <a:off x="1223282" y="275785"/>
+            <a:ext cx="9745435" cy="6306430"/>
+          </a:xfrm>
+          <a:prstGeom prst="rect">
+            <a:avLst/>
+          </a:prstGeom>
+        </p:spPr>
+      </p:pic>
+    </p:spTree>
+    <p:extLst>
+      <p:ext uri="{BB962C8B-B14F-4D97-AF65-F5344CB8AC3E}">
+        <p14:creationId xmlns:p14="http://schemas.microsoft.com/office/powerpoint/2010/main" val="4136545978"/>
+      </p:ext>
+    </p:extLst>
+  </p:cSld>
+  <p:clrMapOvr>
+    <a:masterClrMapping/>
+  </p:clrMapOvr>
+</p:sld>
+</file>
+
 <file path=ppt/slides/slide2.xml><?xml version="1.0" encoding="utf-8"?>
 <p:sld xmlns:a="http://schemas.openxmlformats.org/drawingml/2006/main" xmlns:r="http://schemas.openxmlformats.org/officeDocument/2006/relationships" xmlns:p="http://schemas.openxmlformats.org/presentationml/2006/main">
   <p:cSld>
@@ -4567,7 +4818,7 @@
           <p:nvPr/>
         </p:nvPicPr>
         <p:blipFill>
-          <a:blip r:embed="rId2"/>
+          <a:blip r:embed="rId3"/>
           <a:stretch>
             <a:fillRect/>
           </a:stretch>

</xml_diff>

<commit_message>
Modificado Powerpoint de TaskBoard para que incluya la fecha de las modificaciones y agregado pdf de la iteración y powerpoint del product backlog de trello. Los archivos agregados fueron escritos previamante
</commit_message>
<xml_diff>
--- a/Iteracion1/TaskBoard.pptx
+++ b/Iteracion1/TaskBoard.pptx
@@ -5,19 +5,25 @@
     <p:sldMasterId id="2147483648" r:id="rId1"/>
   </p:sldMasterIdLst>
   <p:notesMasterIdLst>
-    <p:notesMasterId r:id="rId12"/>
+    <p:notesMasterId r:id="rId18"/>
   </p:notesMasterIdLst>
   <p:sldIdLst>
     <p:sldId id="264" r:id="rId2"/>
     <p:sldId id="256" r:id="rId3"/>
-    <p:sldId id="257" r:id="rId4"/>
-    <p:sldId id="258" r:id="rId5"/>
-    <p:sldId id="259" r:id="rId6"/>
-    <p:sldId id="260" r:id="rId7"/>
-    <p:sldId id="261" r:id="rId8"/>
-    <p:sldId id="262" r:id="rId9"/>
-    <p:sldId id="263" r:id="rId10"/>
-    <p:sldId id="265" r:id="rId11"/>
+    <p:sldId id="266" r:id="rId4"/>
+    <p:sldId id="267" r:id="rId5"/>
+    <p:sldId id="268" r:id="rId6"/>
+    <p:sldId id="269" r:id="rId7"/>
+    <p:sldId id="270" r:id="rId8"/>
+    <p:sldId id="271" r:id="rId9"/>
+    <p:sldId id="257" r:id="rId10"/>
+    <p:sldId id="258" r:id="rId11"/>
+    <p:sldId id="259" r:id="rId12"/>
+    <p:sldId id="260" r:id="rId13"/>
+    <p:sldId id="261" r:id="rId14"/>
+    <p:sldId id="262" r:id="rId15"/>
+    <p:sldId id="263" r:id="rId16"/>
+    <p:sldId id="265" r:id="rId17"/>
   </p:sldIdLst>
   <p:sldSz cx="12192000" cy="6858000"/>
   <p:notesSz cx="6858000" cy="9144000"/>
@@ -206,7 +212,7 @@
           <a:p>
             <a:fld id="{8B45D529-B2FB-4235-85C4-556325968B0B}" type="datetimeFigureOut">
               <a:rPr lang="en-US" smtClean="0"/>
-              <a:t>04-Oct-21</a:t>
+              <a:t>08-Oct-21</a:t>
             </a:fld>
             <a:endParaRPr lang="en-US"/>
           </a:p>
@@ -365,7 +371,7 @@
           <a:p>
             <a:fld id="{90C5D989-6414-4EC9-97AC-BCF628C5D8B9}" type="slidenum">
               <a:rPr lang="en-US" smtClean="0"/>
-              <a:t>‹Nº›</a:t>
+              <a:t>‹#›</a:t>
             </a:fld>
             <a:endParaRPr lang="en-US"/>
           </a:p>
@@ -626,16 +632,20 @@
           <a:lstStyle/>
           <a:p>
             <a:r>
-              <a:rPr lang="en-US" err="1"/>
+              <a:rPr lang="en-US" dirty="0" err="1"/>
               <a:t>Creadas</a:t>
             </a:r>
             <a:r>
-              <a:rPr lang="en-US"/>
-              <a:t> tareas </a:t>
-            </a:r>
-            <a:r>
               <a:rPr lang="en-US" dirty="0"/>
-              <a:t>para </a:t>
+              <a:t> </a:t>
+            </a:r>
+            <a:r>
+              <a:rPr lang="en-US" dirty="0" err="1"/>
+              <a:t>tareas</a:t>
+            </a:r>
+            <a:r>
+              <a:rPr lang="en-US" dirty="0"/>
+              <a:t> para </a:t>
             </a:r>
             <a:r>
               <a:rPr lang="en-US" dirty="0" err="1"/>
@@ -762,7 +772,7 @@
           <a:p>
             <a:fld id="{90C5D989-6414-4EC9-97AC-BCF628C5D8B9}" type="slidenum">
               <a:rPr lang="en-US" smtClean="0"/>
-              <a:t>3</a:t>
+              <a:t>9</a:t>
             </a:fld>
             <a:endParaRPr lang="en-US"/>
           </a:p>
@@ -901,7 +911,7 @@
           <a:p>
             <a:fld id="{90C5D989-6414-4EC9-97AC-BCF628C5D8B9}" type="slidenum">
               <a:rPr lang="en-US" smtClean="0"/>
-              <a:t>4</a:t>
+              <a:t>10</a:t>
             </a:fld>
             <a:endParaRPr lang="en-US"/>
           </a:p>
@@ -1005,7 +1015,7 @@
           <a:p>
             <a:fld id="{90C5D989-6414-4EC9-97AC-BCF628C5D8B9}" type="slidenum">
               <a:rPr lang="en-US" smtClean="0"/>
-              <a:t>5</a:t>
+              <a:t>11</a:t>
             </a:fld>
             <a:endParaRPr lang="en-US"/>
           </a:p>
@@ -1120,7 +1130,7 @@
           <a:p>
             <a:fld id="{90C5D989-6414-4EC9-97AC-BCF628C5D8B9}" type="slidenum">
               <a:rPr lang="en-US" smtClean="0"/>
-              <a:t>6</a:t>
+              <a:t>12</a:t>
             </a:fld>
             <a:endParaRPr lang="en-US"/>
           </a:p>
@@ -1256,7 +1266,7 @@
           <a:p>
             <a:fld id="{90C5D989-6414-4EC9-97AC-BCF628C5D8B9}" type="slidenum">
               <a:rPr lang="en-US" smtClean="0"/>
-              <a:t>7</a:t>
+              <a:t>13</a:t>
             </a:fld>
             <a:endParaRPr lang="en-US"/>
           </a:p>
@@ -1352,7 +1362,7 @@
           <a:p>
             <a:fld id="{90C5D989-6414-4EC9-97AC-BCF628C5D8B9}" type="slidenum">
               <a:rPr lang="en-US" smtClean="0"/>
-              <a:t>8</a:t>
+              <a:t>14</a:t>
             </a:fld>
             <a:endParaRPr lang="en-US"/>
           </a:p>
@@ -1443,7 +1453,7 @@
           <a:p>
             <a:fld id="{90C5D989-6414-4EC9-97AC-BCF628C5D8B9}" type="slidenum">
               <a:rPr lang="en-US" smtClean="0"/>
-              <a:t>10</a:t>
+              <a:t>16</a:t>
             </a:fld>
             <a:endParaRPr lang="en-US"/>
           </a:p>
@@ -1609,7 +1619,7 @@
           <a:p>
             <a:fld id="{39DCAF25-EC8E-4E4C-BCE0-6880FDA81677}" type="datetimeFigureOut">
               <a:rPr lang="en-US" smtClean="0"/>
-              <a:t>04-Oct-21</a:t>
+              <a:t>08-Oct-21</a:t>
             </a:fld>
             <a:endParaRPr lang="en-US"/>
           </a:p>
@@ -1663,7 +1673,7 @@
           <a:p>
             <a:fld id="{ACB33697-2FA8-4DC4-A426-2A40D07A47EB}" type="slidenum">
               <a:rPr lang="en-US" smtClean="0"/>
-              <a:t>‹Nº›</a:t>
+              <a:t>‹#›</a:t>
             </a:fld>
             <a:endParaRPr lang="en-US"/>
           </a:p>
@@ -1807,7 +1817,7 @@
           <a:p>
             <a:fld id="{39DCAF25-EC8E-4E4C-BCE0-6880FDA81677}" type="datetimeFigureOut">
               <a:rPr lang="en-US" smtClean="0"/>
-              <a:t>04-Oct-21</a:t>
+              <a:t>08-Oct-21</a:t>
             </a:fld>
             <a:endParaRPr lang="en-US"/>
           </a:p>
@@ -1861,7 +1871,7 @@
           <a:p>
             <a:fld id="{ACB33697-2FA8-4DC4-A426-2A40D07A47EB}" type="slidenum">
               <a:rPr lang="en-US" smtClean="0"/>
-              <a:t>‹Nº›</a:t>
+              <a:t>‹#›</a:t>
             </a:fld>
             <a:endParaRPr lang="en-US"/>
           </a:p>
@@ -2015,7 +2025,7 @@
           <a:p>
             <a:fld id="{39DCAF25-EC8E-4E4C-BCE0-6880FDA81677}" type="datetimeFigureOut">
               <a:rPr lang="en-US" smtClean="0"/>
-              <a:t>04-Oct-21</a:t>
+              <a:t>08-Oct-21</a:t>
             </a:fld>
             <a:endParaRPr lang="en-US"/>
           </a:p>
@@ -2069,7 +2079,7 @@
           <a:p>
             <a:fld id="{ACB33697-2FA8-4DC4-A426-2A40D07A47EB}" type="slidenum">
               <a:rPr lang="en-US" smtClean="0"/>
-              <a:t>‹Nº›</a:t>
+              <a:t>‹#›</a:t>
             </a:fld>
             <a:endParaRPr lang="en-US"/>
           </a:p>
@@ -2213,7 +2223,7 @@
           <a:p>
             <a:fld id="{39DCAF25-EC8E-4E4C-BCE0-6880FDA81677}" type="datetimeFigureOut">
               <a:rPr lang="en-US" smtClean="0"/>
-              <a:t>04-Oct-21</a:t>
+              <a:t>08-Oct-21</a:t>
             </a:fld>
             <a:endParaRPr lang="en-US"/>
           </a:p>
@@ -2267,7 +2277,7 @@
           <a:p>
             <a:fld id="{ACB33697-2FA8-4DC4-A426-2A40D07A47EB}" type="slidenum">
               <a:rPr lang="en-US" smtClean="0"/>
-              <a:t>‹Nº›</a:t>
+              <a:t>‹#›</a:t>
             </a:fld>
             <a:endParaRPr lang="en-US"/>
           </a:p>
@@ -2488,7 +2498,7 @@
           <a:p>
             <a:fld id="{39DCAF25-EC8E-4E4C-BCE0-6880FDA81677}" type="datetimeFigureOut">
               <a:rPr lang="en-US" smtClean="0"/>
-              <a:t>04-Oct-21</a:t>
+              <a:t>08-Oct-21</a:t>
             </a:fld>
             <a:endParaRPr lang="en-US"/>
           </a:p>
@@ -2542,7 +2552,7 @@
           <a:p>
             <a:fld id="{ACB33697-2FA8-4DC4-A426-2A40D07A47EB}" type="slidenum">
               <a:rPr lang="en-US" smtClean="0"/>
-              <a:t>‹Nº›</a:t>
+              <a:t>‹#›</a:t>
             </a:fld>
             <a:endParaRPr lang="en-US"/>
           </a:p>
@@ -2753,7 +2763,7 @@
           <a:p>
             <a:fld id="{39DCAF25-EC8E-4E4C-BCE0-6880FDA81677}" type="datetimeFigureOut">
               <a:rPr lang="en-US" smtClean="0"/>
-              <a:t>04-Oct-21</a:t>
+              <a:t>08-Oct-21</a:t>
             </a:fld>
             <a:endParaRPr lang="en-US"/>
           </a:p>
@@ -2807,7 +2817,7 @@
           <a:p>
             <a:fld id="{ACB33697-2FA8-4DC4-A426-2A40D07A47EB}" type="slidenum">
               <a:rPr lang="en-US" smtClean="0"/>
-              <a:t>‹Nº›</a:t>
+              <a:t>‹#›</a:t>
             </a:fld>
             <a:endParaRPr lang="en-US"/>
           </a:p>
@@ -3165,7 +3175,7 @@
           <a:p>
             <a:fld id="{39DCAF25-EC8E-4E4C-BCE0-6880FDA81677}" type="datetimeFigureOut">
               <a:rPr lang="en-US" smtClean="0"/>
-              <a:t>04-Oct-21</a:t>
+              <a:t>08-Oct-21</a:t>
             </a:fld>
             <a:endParaRPr lang="en-US"/>
           </a:p>
@@ -3219,7 +3229,7 @@
           <a:p>
             <a:fld id="{ACB33697-2FA8-4DC4-A426-2A40D07A47EB}" type="slidenum">
               <a:rPr lang="en-US" smtClean="0"/>
-              <a:t>‹Nº›</a:t>
+              <a:t>‹#›</a:t>
             </a:fld>
             <a:endParaRPr lang="en-US"/>
           </a:p>
@@ -3306,7 +3316,7 @@
           <a:p>
             <a:fld id="{39DCAF25-EC8E-4E4C-BCE0-6880FDA81677}" type="datetimeFigureOut">
               <a:rPr lang="en-US" smtClean="0"/>
-              <a:t>04-Oct-21</a:t>
+              <a:t>08-Oct-21</a:t>
             </a:fld>
             <a:endParaRPr lang="en-US"/>
           </a:p>
@@ -3360,7 +3370,7 @@
           <a:p>
             <a:fld id="{ACB33697-2FA8-4DC4-A426-2A40D07A47EB}" type="slidenum">
               <a:rPr lang="en-US" smtClean="0"/>
-              <a:t>‹Nº›</a:t>
+              <a:t>‹#›</a:t>
             </a:fld>
             <a:endParaRPr lang="en-US"/>
           </a:p>
@@ -3419,7 +3429,7 @@
           <a:p>
             <a:fld id="{39DCAF25-EC8E-4E4C-BCE0-6880FDA81677}" type="datetimeFigureOut">
               <a:rPr lang="en-US" smtClean="0"/>
-              <a:t>04-Oct-21</a:t>
+              <a:t>08-Oct-21</a:t>
             </a:fld>
             <a:endParaRPr lang="en-US"/>
           </a:p>
@@ -3473,7 +3483,7 @@
           <a:p>
             <a:fld id="{ACB33697-2FA8-4DC4-A426-2A40D07A47EB}" type="slidenum">
               <a:rPr lang="en-US" smtClean="0"/>
-              <a:t>‹Nº›</a:t>
+              <a:t>‹#›</a:t>
             </a:fld>
             <a:endParaRPr lang="en-US"/>
           </a:p>
@@ -3730,7 +3740,7 @@
           <a:p>
             <a:fld id="{39DCAF25-EC8E-4E4C-BCE0-6880FDA81677}" type="datetimeFigureOut">
               <a:rPr lang="en-US" smtClean="0"/>
-              <a:t>04-Oct-21</a:t>
+              <a:t>08-Oct-21</a:t>
             </a:fld>
             <a:endParaRPr lang="en-US"/>
           </a:p>
@@ -3784,7 +3794,7 @@
           <a:p>
             <a:fld id="{ACB33697-2FA8-4DC4-A426-2A40D07A47EB}" type="slidenum">
               <a:rPr lang="en-US" smtClean="0"/>
-              <a:t>‹Nº›</a:t>
+              <a:t>‹#›</a:t>
             </a:fld>
             <a:endParaRPr lang="en-US"/>
           </a:p>
@@ -4018,7 +4028,7 @@
           <a:p>
             <a:fld id="{39DCAF25-EC8E-4E4C-BCE0-6880FDA81677}" type="datetimeFigureOut">
               <a:rPr lang="en-US" smtClean="0"/>
-              <a:t>04-Oct-21</a:t>
+              <a:t>08-Oct-21</a:t>
             </a:fld>
             <a:endParaRPr lang="en-US"/>
           </a:p>
@@ -4072,7 +4082,7 @@
           <a:p>
             <a:fld id="{ACB33697-2FA8-4DC4-A426-2A40D07A47EB}" type="slidenum">
               <a:rPr lang="en-US" smtClean="0"/>
-              <a:t>‹Nº›</a:t>
+              <a:t>‹#›</a:t>
             </a:fld>
             <a:endParaRPr lang="en-US"/>
           </a:p>
@@ -4259,7 +4269,7 @@
           <a:p>
             <a:fld id="{39DCAF25-EC8E-4E4C-BCE0-6880FDA81677}" type="datetimeFigureOut">
               <a:rPr lang="en-US" smtClean="0"/>
-              <a:t>04-Oct-21</a:t>
+              <a:t>08-Oct-21</a:t>
             </a:fld>
             <a:endParaRPr lang="en-US"/>
           </a:p>
@@ -4349,7 +4359,7 @@
           <a:p>
             <a:fld id="{ACB33697-2FA8-4DC4-A426-2A40D07A47EB}" type="slidenum">
               <a:rPr lang="en-US" smtClean="0"/>
-              <a:t>‹Nº›</a:t>
+              <a:t>‹#›</a:t>
             </a:fld>
             <a:endParaRPr lang="en-US"/>
           </a:p>
@@ -4740,7 +4750,7 @@
           <p:cNvPr id="5" name="Imagen 4">
             <a:extLst>
               <a:ext uri="{FF2B5EF4-FFF2-40B4-BE49-F238E27FC236}">
-                <a16:creationId xmlns:a16="http://schemas.microsoft.com/office/drawing/2014/main" id="{843D6288-85C8-48E6-AD62-E9908017366E}"/>
+                <a16:creationId xmlns:a16="http://schemas.microsoft.com/office/drawing/2014/main" id="{290A1FEA-22F5-4D71-9400-5C20FD52773C}"/>
               </a:ext>
             </a:extLst>
           </p:cNvPr>
@@ -4757,14 +4767,872 @@
         </p:blipFill>
         <p:spPr>
           <a:xfrm>
-            <a:off x="1223282" y="275785"/>
-            <a:ext cx="9745435" cy="6306430"/>
+            <a:off x="1080387" y="388853"/>
+            <a:ext cx="10031225" cy="5506218"/>
           </a:xfrm>
           <a:prstGeom prst="rect">
             <a:avLst/>
           </a:prstGeom>
         </p:spPr>
       </p:pic>
+      <p:sp>
+        <p:nvSpPr>
+          <p:cNvPr id="3" name="TextBox 2">
+            <a:extLst>
+              <a:ext uri="{FF2B5EF4-FFF2-40B4-BE49-F238E27FC236}">
+                <a16:creationId xmlns:a16="http://schemas.microsoft.com/office/drawing/2014/main" id="{3187E993-3AAA-4741-AD7B-1776FAA0ED03}"/>
+              </a:ext>
+            </a:extLst>
+          </p:cNvPr>
+          <p:cNvSpPr txBox="1"/>
+          <p:nvPr/>
+        </p:nvSpPr>
+        <p:spPr>
+          <a:xfrm>
+            <a:off x="1080387" y="6206544"/>
+            <a:ext cx="1899687" cy="369332"/>
+          </a:xfrm>
+          <a:prstGeom prst="rect">
+            <a:avLst/>
+          </a:prstGeom>
+          <a:noFill/>
+        </p:spPr>
+        <p:txBody>
+          <a:bodyPr wrap="none" rtlCol="0">
+            <a:spAutoFit/>
+          </a:bodyPr>
+          <a:lstStyle/>
+          <a:p>
+            <a:pPr algn="ctr"/>
+            <a:r>
+              <a:rPr lang="en-US" dirty="0" err="1"/>
+              <a:t>Fecha</a:t>
+            </a:r>
+            <a:r>
+              <a:rPr lang="en-US" dirty="0"/>
+              <a:t>: 28/9/2021 </a:t>
+            </a:r>
+          </a:p>
+        </p:txBody>
+      </p:sp>
+      <p:pic>
+        <p:nvPicPr>
+          <p:cNvPr id="4" name="Picture 3">
+            <a:extLst>
+              <a:ext uri="{FF2B5EF4-FFF2-40B4-BE49-F238E27FC236}">
+                <a16:creationId xmlns:a16="http://schemas.microsoft.com/office/drawing/2014/main" id="{2DE57B63-BF6A-406B-A961-5C68B99F5B3D}"/>
+              </a:ext>
+            </a:extLst>
+          </p:cNvPr>
+          <p:cNvPicPr>
+            <a:picLocks noChangeAspect="1"/>
+          </p:cNvPicPr>
+          <p:nvPr/>
+        </p:nvPicPr>
+        <p:blipFill>
+          <a:blip r:embed="rId4"/>
+          <a:stretch>
+            <a:fillRect/>
+          </a:stretch>
+        </p:blipFill>
+        <p:spPr>
+          <a:xfrm>
+            <a:off x="7539238" y="5924420"/>
+            <a:ext cx="3572374" cy="933580"/>
+          </a:xfrm>
+          <a:prstGeom prst="rect">
+            <a:avLst/>
+          </a:prstGeom>
+        </p:spPr>
+      </p:pic>
+    </p:spTree>
+    <p:extLst>
+      <p:ext uri="{BB962C8B-B14F-4D97-AF65-F5344CB8AC3E}">
+        <p14:creationId xmlns:p14="http://schemas.microsoft.com/office/powerpoint/2010/main" val="4112933987"/>
+      </p:ext>
+    </p:extLst>
+  </p:cSld>
+  <p:clrMapOvr>
+    <a:masterClrMapping/>
+  </p:clrMapOvr>
+</p:sld>
+</file>
+
+<file path=ppt/slides/slide11.xml><?xml version="1.0" encoding="utf-8"?>
+<p:sld xmlns:a="http://schemas.openxmlformats.org/drawingml/2006/main" xmlns:r="http://schemas.openxmlformats.org/officeDocument/2006/relationships" xmlns:p="http://schemas.openxmlformats.org/presentationml/2006/main">
+  <p:cSld>
+    <p:spTree>
+      <p:nvGrpSpPr>
+        <p:cNvPr id="1" name=""/>
+        <p:cNvGrpSpPr/>
+        <p:nvPr/>
+      </p:nvGrpSpPr>
+      <p:grpSpPr>
+        <a:xfrm>
+          <a:off x="0" y="0"/>
+          <a:ext cx="0" cy="0"/>
+          <a:chOff x="0" y="0"/>
+          <a:chExt cx="0" cy="0"/>
+        </a:xfrm>
+      </p:grpSpPr>
+      <p:pic>
+        <p:nvPicPr>
+          <p:cNvPr id="7" name="Picture 6">
+            <a:extLst>
+              <a:ext uri="{FF2B5EF4-FFF2-40B4-BE49-F238E27FC236}">
+                <a16:creationId xmlns:a16="http://schemas.microsoft.com/office/drawing/2014/main" id="{62D95D31-32D0-42F8-9EE7-07F76C09B7C6}"/>
+              </a:ext>
+            </a:extLst>
+          </p:cNvPr>
+          <p:cNvPicPr>
+            <a:picLocks noChangeAspect="1"/>
+          </p:cNvPicPr>
+          <p:nvPr/>
+        </p:nvPicPr>
+        <p:blipFill>
+          <a:blip r:embed="rId3"/>
+          <a:stretch>
+            <a:fillRect/>
+          </a:stretch>
+        </p:blipFill>
+        <p:spPr>
+          <a:xfrm>
+            <a:off x="170820" y="1151706"/>
+            <a:ext cx="11850360" cy="4554587"/>
+          </a:xfrm>
+          <a:prstGeom prst="rect">
+            <a:avLst/>
+          </a:prstGeom>
+        </p:spPr>
+      </p:pic>
+      <p:sp>
+        <p:nvSpPr>
+          <p:cNvPr id="3" name="TextBox 2">
+            <a:extLst>
+              <a:ext uri="{FF2B5EF4-FFF2-40B4-BE49-F238E27FC236}">
+                <a16:creationId xmlns:a16="http://schemas.microsoft.com/office/drawing/2014/main" id="{557C162E-51B8-47BB-A739-1AA812072996}"/>
+              </a:ext>
+            </a:extLst>
+          </p:cNvPr>
+          <p:cNvSpPr txBox="1"/>
+          <p:nvPr/>
+        </p:nvSpPr>
+        <p:spPr>
+          <a:xfrm>
+            <a:off x="170820" y="6098259"/>
+            <a:ext cx="1899687" cy="369332"/>
+          </a:xfrm>
+          <a:prstGeom prst="rect">
+            <a:avLst/>
+          </a:prstGeom>
+          <a:noFill/>
+        </p:spPr>
+        <p:txBody>
+          <a:bodyPr wrap="none" rtlCol="0">
+            <a:spAutoFit/>
+          </a:bodyPr>
+          <a:lstStyle/>
+          <a:p>
+            <a:pPr algn="ctr"/>
+            <a:r>
+              <a:rPr lang="en-US" dirty="0" err="1"/>
+              <a:t>Fecha</a:t>
+            </a:r>
+            <a:r>
+              <a:rPr lang="en-US" dirty="0"/>
+              <a:t>: 3/10/2021 </a:t>
+            </a:r>
+          </a:p>
+        </p:txBody>
+      </p:sp>
+      <p:pic>
+        <p:nvPicPr>
+          <p:cNvPr id="4" name="Picture 3">
+            <a:extLst>
+              <a:ext uri="{FF2B5EF4-FFF2-40B4-BE49-F238E27FC236}">
+                <a16:creationId xmlns:a16="http://schemas.microsoft.com/office/drawing/2014/main" id="{236C7DF9-8CE1-4A0A-AC48-568ACCECCA37}"/>
+              </a:ext>
+            </a:extLst>
+          </p:cNvPr>
+          <p:cNvPicPr>
+            <a:picLocks noChangeAspect="1"/>
+          </p:cNvPicPr>
+          <p:nvPr/>
+        </p:nvPicPr>
+        <p:blipFill>
+          <a:blip r:embed="rId4"/>
+          <a:stretch>
+            <a:fillRect/>
+          </a:stretch>
+        </p:blipFill>
+        <p:spPr>
+          <a:xfrm>
+            <a:off x="6292381" y="5799227"/>
+            <a:ext cx="5728799" cy="967396"/>
+          </a:xfrm>
+          <a:prstGeom prst="rect">
+            <a:avLst/>
+          </a:prstGeom>
+        </p:spPr>
+      </p:pic>
+    </p:spTree>
+    <p:extLst>
+      <p:ext uri="{BB962C8B-B14F-4D97-AF65-F5344CB8AC3E}">
+        <p14:creationId xmlns:p14="http://schemas.microsoft.com/office/powerpoint/2010/main" val="2223719436"/>
+      </p:ext>
+    </p:extLst>
+  </p:cSld>
+  <p:clrMapOvr>
+    <a:masterClrMapping/>
+  </p:clrMapOvr>
+</p:sld>
+</file>
+
+<file path=ppt/slides/slide12.xml><?xml version="1.0" encoding="utf-8"?>
+<p:sld xmlns:a="http://schemas.openxmlformats.org/drawingml/2006/main" xmlns:r="http://schemas.openxmlformats.org/officeDocument/2006/relationships" xmlns:p="http://schemas.openxmlformats.org/presentationml/2006/main">
+  <p:cSld>
+    <p:spTree>
+      <p:nvGrpSpPr>
+        <p:cNvPr id="1" name=""/>
+        <p:cNvGrpSpPr/>
+        <p:nvPr/>
+      </p:nvGrpSpPr>
+      <p:grpSpPr>
+        <a:xfrm>
+          <a:off x="0" y="0"/>
+          <a:ext cx="0" cy="0"/>
+          <a:chOff x="0" y="0"/>
+          <a:chExt cx="0" cy="0"/>
+        </a:xfrm>
+      </p:grpSpPr>
+      <p:pic>
+        <p:nvPicPr>
+          <p:cNvPr id="5" name="Imagen 4">
+            <a:extLst>
+              <a:ext uri="{FF2B5EF4-FFF2-40B4-BE49-F238E27FC236}">
+                <a16:creationId xmlns:a16="http://schemas.microsoft.com/office/drawing/2014/main" id="{7D904D1D-04FD-4F84-B92D-821D6435798E}"/>
+              </a:ext>
+            </a:extLst>
+          </p:cNvPr>
+          <p:cNvPicPr>
+            <a:picLocks noChangeAspect="1"/>
+          </p:cNvPicPr>
+          <p:nvPr/>
+        </p:nvPicPr>
+        <p:blipFill>
+          <a:blip r:embed="rId3"/>
+          <a:stretch>
+            <a:fillRect/>
+          </a:stretch>
+        </p:blipFill>
+        <p:spPr>
+          <a:xfrm>
+            <a:off x="1199466" y="1066470"/>
+            <a:ext cx="9793067" cy="4725059"/>
+          </a:xfrm>
+          <a:prstGeom prst="rect">
+            <a:avLst/>
+          </a:prstGeom>
+        </p:spPr>
+      </p:pic>
+      <p:pic>
+        <p:nvPicPr>
+          <p:cNvPr id="3" name="Picture 2">
+            <a:extLst>
+              <a:ext uri="{FF2B5EF4-FFF2-40B4-BE49-F238E27FC236}">
+                <a16:creationId xmlns:a16="http://schemas.microsoft.com/office/drawing/2014/main" id="{333CBBCF-5DDC-4A27-B744-0F9921EC8FC0}"/>
+              </a:ext>
+            </a:extLst>
+          </p:cNvPr>
+          <p:cNvPicPr>
+            <a:picLocks noChangeAspect="1"/>
+          </p:cNvPicPr>
+          <p:nvPr/>
+        </p:nvPicPr>
+        <p:blipFill>
+          <a:blip r:embed="rId4"/>
+          <a:stretch>
+            <a:fillRect/>
+          </a:stretch>
+        </p:blipFill>
+        <p:spPr>
+          <a:xfrm>
+            <a:off x="6773264" y="5903871"/>
+            <a:ext cx="4219269" cy="736698"/>
+          </a:xfrm>
+          <a:prstGeom prst="rect">
+            <a:avLst/>
+          </a:prstGeom>
+        </p:spPr>
+      </p:pic>
+      <p:sp>
+        <p:nvSpPr>
+          <p:cNvPr id="6" name="TextBox 5">
+            <a:extLst>
+              <a:ext uri="{FF2B5EF4-FFF2-40B4-BE49-F238E27FC236}">
+                <a16:creationId xmlns:a16="http://schemas.microsoft.com/office/drawing/2014/main" id="{3A0613C3-4A02-4356-AB84-3EB08C5753A0}"/>
+              </a:ext>
+            </a:extLst>
+          </p:cNvPr>
+          <p:cNvSpPr txBox="1"/>
+          <p:nvPr/>
+        </p:nvSpPr>
+        <p:spPr>
+          <a:xfrm>
+            <a:off x="1257976" y="6142517"/>
+            <a:ext cx="1782667" cy="369332"/>
+          </a:xfrm>
+          <a:prstGeom prst="rect">
+            <a:avLst/>
+          </a:prstGeom>
+          <a:noFill/>
+        </p:spPr>
+        <p:txBody>
+          <a:bodyPr wrap="none" rtlCol="0">
+            <a:spAutoFit/>
+          </a:bodyPr>
+          <a:lstStyle/>
+          <a:p>
+            <a:pPr algn="ctr"/>
+            <a:r>
+              <a:rPr lang="en-US" dirty="0" err="1"/>
+              <a:t>Fecha</a:t>
+            </a:r>
+            <a:r>
+              <a:rPr lang="en-US" dirty="0"/>
+              <a:t>: 3/9/2021 </a:t>
+            </a:r>
+          </a:p>
+        </p:txBody>
+      </p:sp>
+    </p:spTree>
+    <p:extLst>
+      <p:ext uri="{BB962C8B-B14F-4D97-AF65-F5344CB8AC3E}">
+        <p14:creationId xmlns:p14="http://schemas.microsoft.com/office/powerpoint/2010/main" val="2087786723"/>
+      </p:ext>
+    </p:extLst>
+  </p:cSld>
+  <p:clrMapOvr>
+    <a:masterClrMapping/>
+  </p:clrMapOvr>
+</p:sld>
+</file>
+
+<file path=ppt/slides/slide13.xml><?xml version="1.0" encoding="utf-8"?>
+<p:sld xmlns:a="http://schemas.openxmlformats.org/drawingml/2006/main" xmlns:r="http://schemas.openxmlformats.org/officeDocument/2006/relationships" xmlns:p="http://schemas.openxmlformats.org/presentationml/2006/main">
+  <p:cSld>
+    <p:spTree>
+      <p:nvGrpSpPr>
+        <p:cNvPr id="1" name=""/>
+        <p:cNvGrpSpPr/>
+        <p:nvPr/>
+      </p:nvGrpSpPr>
+      <p:grpSpPr>
+        <a:xfrm>
+          <a:off x="0" y="0"/>
+          <a:ext cx="0" cy="0"/>
+          <a:chOff x="0" y="0"/>
+          <a:chExt cx="0" cy="0"/>
+        </a:xfrm>
+      </p:grpSpPr>
+      <p:pic>
+        <p:nvPicPr>
+          <p:cNvPr id="5" name="Imagen 4">
+            <a:extLst>
+              <a:ext uri="{FF2B5EF4-FFF2-40B4-BE49-F238E27FC236}">
+                <a16:creationId xmlns:a16="http://schemas.microsoft.com/office/drawing/2014/main" id="{6AA6B252-525A-4612-8972-9442646E2AEA}"/>
+              </a:ext>
+            </a:extLst>
+          </p:cNvPr>
+          <p:cNvPicPr>
+            <a:picLocks noChangeAspect="1"/>
+          </p:cNvPicPr>
+          <p:nvPr/>
+        </p:nvPicPr>
+        <p:blipFill>
+          <a:blip r:embed="rId3"/>
+          <a:stretch>
+            <a:fillRect/>
+          </a:stretch>
+        </p:blipFill>
+        <p:spPr>
+          <a:xfrm>
+            <a:off x="1213756" y="1066470"/>
+            <a:ext cx="9764488" cy="4725059"/>
+          </a:xfrm>
+          <a:prstGeom prst="rect">
+            <a:avLst/>
+          </a:prstGeom>
+        </p:spPr>
+      </p:pic>
+      <p:sp>
+        <p:nvSpPr>
+          <p:cNvPr id="7" name="TextBox 6">
+            <a:extLst>
+              <a:ext uri="{FF2B5EF4-FFF2-40B4-BE49-F238E27FC236}">
+                <a16:creationId xmlns:a16="http://schemas.microsoft.com/office/drawing/2014/main" id="{84F8FD60-227D-4C59-B276-19BB839FE21D}"/>
+              </a:ext>
+            </a:extLst>
+          </p:cNvPr>
+          <p:cNvSpPr txBox="1"/>
+          <p:nvPr/>
+        </p:nvSpPr>
+        <p:spPr>
+          <a:xfrm>
+            <a:off x="1257976" y="6142517"/>
+            <a:ext cx="1782667" cy="369332"/>
+          </a:xfrm>
+          <a:prstGeom prst="rect">
+            <a:avLst/>
+          </a:prstGeom>
+          <a:noFill/>
+        </p:spPr>
+        <p:txBody>
+          <a:bodyPr wrap="none" rtlCol="0">
+            <a:spAutoFit/>
+          </a:bodyPr>
+          <a:lstStyle/>
+          <a:p>
+            <a:pPr algn="ctr"/>
+            <a:r>
+              <a:rPr lang="en-US" dirty="0" err="1"/>
+              <a:t>Fecha</a:t>
+            </a:r>
+            <a:r>
+              <a:rPr lang="en-US" dirty="0"/>
+              <a:t>: 3/9/2021 </a:t>
+            </a:r>
+          </a:p>
+        </p:txBody>
+      </p:sp>
+      <p:pic>
+        <p:nvPicPr>
+          <p:cNvPr id="9" name="Picture 8">
+            <a:extLst>
+              <a:ext uri="{FF2B5EF4-FFF2-40B4-BE49-F238E27FC236}">
+                <a16:creationId xmlns:a16="http://schemas.microsoft.com/office/drawing/2014/main" id="{3E58430D-3D9F-49BD-B096-F9A62C72A960}"/>
+              </a:ext>
+            </a:extLst>
+          </p:cNvPr>
+          <p:cNvPicPr>
+            <a:picLocks noChangeAspect="1"/>
+          </p:cNvPicPr>
+          <p:nvPr/>
+        </p:nvPicPr>
+        <p:blipFill>
+          <a:blip r:embed="rId4"/>
+          <a:stretch>
+            <a:fillRect/>
+          </a:stretch>
+        </p:blipFill>
+        <p:spPr>
+          <a:xfrm>
+            <a:off x="7443976" y="5879445"/>
+            <a:ext cx="3534268" cy="895475"/>
+          </a:xfrm>
+          <a:prstGeom prst="rect">
+            <a:avLst/>
+          </a:prstGeom>
+        </p:spPr>
+      </p:pic>
+    </p:spTree>
+    <p:extLst>
+      <p:ext uri="{BB962C8B-B14F-4D97-AF65-F5344CB8AC3E}">
+        <p14:creationId xmlns:p14="http://schemas.microsoft.com/office/powerpoint/2010/main" val="599276603"/>
+      </p:ext>
+    </p:extLst>
+  </p:cSld>
+  <p:clrMapOvr>
+    <a:masterClrMapping/>
+  </p:clrMapOvr>
+</p:sld>
+</file>
+
+<file path=ppt/slides/slide14.xml><?xml version="1.0" encoding="utf-8"?>
+<p:sld xmlns:a="http://schemas.openxmlformats.org/drawingml/2006/main" xmlns:r="http://schemas.openxmlformats.org/officeDocument/2006/relationships" xmlns:p="http://schemas.openxmlformats.org/presentationml/2006/main">
+  <p:cSld>
+    <p:bg>
+      <p:bgPr>
+        <a:solidFill>
+          <a:schemeClr val="bg1"/>
+        </a:solidFill>
+        <a:effectLst/>
+      </p:bgPr>
+    </p:bg>
+    <p:spTree>
+      <p:nvGrpSpPr>
+        <p:cNvPr id="1" name=""/>
+        <p:cNvGrpSpPr/>
+        <p:nvPr/>
+      </p:nvGrpSpPr>
+      <p:grpSpPr>
+        <a:xfrm>
+          <a:off x="0" y="0"/>
+          <a:ext cx="0" cy="0"/>
+          <a:chOff x="0" y="0"/>
+          <a:chExt cx="0" cy="0"/>
+        </a:xfrm>
+      </p:grpSpPr>
+      <p:pic>
+        <p:nvPicPr>
+          <p:cNvPr id="5" name="Picture 4">
+            <a:extLst>
+              <a:ext uri="{FF2B5EF4-FFF2-40B4-BE49-F238E27FC236}">
+                <a16:creationId xmlns:a16="http://schemas.microsoft.com/office/drawing/2014/main" id="{12A0EB7B-F21F-441D-8004-95D2A699BF17}"/>
+              </a:ext>
+            </a:extLst>
+          </p:cNvPr>
+          <p:cNvPicPr>
+            <a:picLocks noChangeAspect="1"/>
+          </p:cNvPicPr>
+          <p:nvPr/>
+        </p:nvPicPr>
+        <p:blipFill>
+          <a:blip r:embed="rId3"/>
+          <a:stretch>
+            <a:fillRect/>
+          </a:stretch>
+        </p:blipFill>
+        <p:spPr>
+          <a:xfrm>
+            <a:off x="1121834" y="643467"/>
+            <a:ext cx="9948331" cy="5571066"/>
+          </a:xfrm>
+          <a:prstGeom prst="rect">
+            <a:avLst/>
+          </a:prstGeom>
+        </p:spPr>
+      </p:pic>
+      <p:pic>
+        <p:nvPicPr>
+          <p:cNvPr id="3" name="Picture 2">
+            <a:extLst>
+              <a:ext uri="{FF2B5EF4-FFF2-40B4-BE49-F238E27FC236}">
+                <a16:creationId xmlns:a16="http://schemas.microsoft.com/office/drawing/2014/main" id="{0990E70F-7B96-48F4-B6A7-67EBD36A21B8}"/>
+              </a:ext>
+            </a:extLst>
+          </p:cNvPr>
+          <p:cNvPicPr>
+            <a:picLocks noChangeAspect="1"/>
+          </p:cNvPicPr>
+          <p:nvPr/>
+        </p:nvPicPr>
+        <p:blipFill>
+          <a:blip r:embed="rId4"/>
+          <a:stretch>
+            <a:fillRect/>
+          </a:stretch>
+        </p:blipFill>
+        <p:spPr>
+          <a:xfrm>
+            <a:off x="7497791" y="6214533"/>
+            <a:ext cx="3572374" cy="657317"/>
+          </a:xfrm>
+          <a:prstGeom prst="rect">
+            <a:avLst/>
+          </a:prstGeom>
+        </p:spPr>
+      </p:pic>
+      <p:sp>
+        <p:nvSpPr>
+          <p:cNvPr id="7" name="TextBox 6">
+            <a:extLst>
+              <a:ext uri="{FF2B5EF4-FFF2-40B4-BE49-F238E27FC236}">
+                <a16:creationId xmlns:a16="http://schemas.microsoft.com/office/drawing/2014/main" id="{C5EB2289-DD1F-466B-9883-F5E2D95B4433}"/>
+              </a:ext>
+            </a:extLst>
+          </p:cNvPr>
+          <p:cNvSpPr txBox="1"/>
+          <p:nvPr/>
+        </p:nvSpPr>
+        <p:spPr>
+          <a:xfrm>
+            <a:off x="1121834" y="6358525"/>
+            <a:ext cx="1782667" cy="369332"/>
+          </a:xfrm>
+          <a:prstGeom prst="rect">
+            <a:avLst/>
+          </a:prstGeom>
+          <a:noFill/>
+        </p:spPr>
+        <p:txBody>
+          <a:bodyPr wrap="none" rtlCol="0">
+            <a:spAutoFit/>
+          </a:bodyPr>
+          <a:lstStyle/>
+          <a:p>
+            <a:pPr algn="ctr"/>
+            <a:r>
+              <a:rPr lang="en-US" dirty="0" err="1"/>
+              <a:t>Fecha</a:t>
+            </a:r>
+            <a:r>
+              <a:rPr lang="en-US" dirty="0"/>
+              <a:t>: 3/9/2021 </a:t>
+            </a:r>
+          </a:p>
+        </p:txBody>
+      </p:sp>
+    </p:spTree>
+    <p:extLst>
+      <p:ext uri="{BB962C8B-B14F-4D97-AF65-F5344CB8AC3E}">
+        <p14:creationId xmlns:p14="http://schemas.microsoft.com/office/powerpoint/2010/main" val="1830856166"/>
+      </p:ext>
+    </p:extLst>
+  </p:cSld>
+  <p:clrMapOvr>
+    <a:masterClrMapping/>
+  </p:clrMapOvr>
+</p:sld>
+</file>
+
+<file path=ppt/slides/slide15.xml><?xml version="1.0" encoding="utf-8"?>
+<p:sld xmlns:a="http://schemas.openxmlformats.org/drawingml/2006/main" xmlns:r="http://schemas.openxmlformats.org/officeDocument/2006/relationships" xmlns:p="http://schemas.openxmlformats.org/presentationml/2006/main">
+  <p:cSld>
+    <p:spTree>
+      <p:nvGrpSpPr>
+        <p:cNvPr id="1" name=""/>
+        <p:cNvGrpSpPr/>
+        <p:nvPr/>
+      </p:nvGrpSpPr>
+      <p:grpSpPr>
+        <a:xfrm>
+          <a:off x="0" y="0"/>
+          <a:ext cx="0" cy="0"/>
+          <a:chOff x="0" y="0"/>
+          <a:chExt cx="0" cy="0"/>
+        </a:xfrm>
+      </p:grpSpPr>
+      <p:pic>
+        <p:nvPicPr>
+          <p:cNvPr id="5" name="Imagen 4">
+            <a:extLst>
+              <a:ext uri="{FF2B5EF4-FFF2-40B4-BE49-F238E27FC236}">
+                <a16:creationId xmlns:a16="http://schemas.microsoft.com/office/drawing/2014/main" id="{8213E0A6-FABD-45B3-928A-6CADFC0879F2}"/>
+              </a:ext>
+            </a:extLst>
+          </p:cNvPr>
+          <p:cNvPicPr>
+            <a:picLocks noChangeAspect="1"/>
+          </p:cNvPicPr>
+          <p:nvPr/>
+        </p:nvPicPr>
+        <p:blipFill>
+          <a:blip r:embed="rId2"/>
+          <a:stretch>
+            <a:fillRect/>
+          </a:stretch>
+        </p:blipFill>
+        <p:spPr>
+          <a:xfrm>
+            <a:off x="1801775" y="846008"/>
+            <a:ext cx="8588449" cy="5165984"/>
+          </a:xfrm>
+          <a:prstGeom prst="rect">
+            <a:avLst/>
+          </a:prstGeom>
+        </p:spPr>
+      </p:pic>
+      <p:pic>
+        <p:nvPicPr>
+          <p:cNvPr id="3" name="Picture 2">
+            <a:extLst>
+              <a:ext uri="{FF2B5EF4-FFF2-40B4-BE49-F238E27FC236}">
+                <a16:creationId xmlns:a16="http://schemas.microsoft.com/office/drawing/2014/main" id="{EC6AC369-8DAF-4AF2-92D6-C7C99A98DAAA}"/>
+              </a:ext>
+            </a:extLst>
+          </p:cNvPr>
+          <p:cNvPicPr>
+            <a:picLocks noChangeAspect="1"/>
+          </p:cNvPicPr>
+          <p:nvPr/>
+        </p:nvPicPr>
+        <p:blipFill>
+          <a:blip r:embed="rId3"/>
+          <a:stretch>
+            <a:fillRect/>
+          </a:stretch>
+        </p:blipFill>
+        <p:spPr>
+          <a:xfrm>
+            <a:off x="6941693" y="6172662"/>
+            <a:ext cx="3448531" cy="552527"/>
+          </a:xfrm>
+          <a:prstGeom prst="rect">
+            <a:avLst/>
+          </a:prstGeom>
+        </p:spPr>
+      </p:pic>
+      <p:sp>
+        <p:nvSpPr>
+          <p:cNvPr id="6" name="TextBox 5">
+            <a:extLst>
+              <a:ext uri="{FF2B5EF4-FFF2-40B4-BE49-F238E27FC236}">
+                <a16:creationId xmlns:a16="http://schemas.microsoft.com/office/drawing/2014/main" id="{CF00F48D-512C-44A9-99E3-B0322D5097EA}"/>
+              </a:ext>
+            </a:extLst>
+          </p:cNvPr>
+          <p:cNvSpPr txBox="1"/>
+          <p:nvPr/>
+        </p:nvSpPr>
+        <p:spPr>
+          <a:xfrm>
+            <a:off x="1801775" y="6264259"/>
+            <a:ext cx="1782667" cy="369332"/>
+          </a:xfrm>
+          <a:prstGeom prst="rect">
+            <a:avLst/>
+          </a:prstGeom>
+          <a:noFill/>
+        </p:spPr>
+        <p:txBody>
+          <a:bodyPr wrap="none" rtlCol="0">
+            <a:spAutoFit/>
+          </a:bodyPr>
+          <a:lstStyle/>
+          <a:p>
+            <a:pPr algn="ctr"/>
+            <a:r>
+              <a:rPr lang="en-US" dirty="0" err="1"/>
+              <a:t>Fecha</a:t>
+            </a:r>
+            <a:r>
+              <a:rPr lang="en-US" dirty="0"/>
+              <a:t>: 4/9/2021 </a:t>
+            </a:r>
+          </a:p>
+        </p:txBody>
+      </p:sp>
+    </p:spTree>
+    <p:extLst>
+      <p:ext uri="{BB962C8B-B14F-4D97-AF65-F5344CB8AC3E}">
+        <p14:creationId xmlns:p14="http://schemas.microsoft.com/office/powerpoint/2010/main" val="1146657534"/>
+      </p:ext>
+    </p:extLst>
+  </p:cSld>
+  <p:clrMapOvr>
+    <a:masterClrMapping/>
+  </p:clrMapOvr>
+</p:sld>
+</file>
+
+<file path=ppt/slides/slide16.xml><?xml version="1.0" encoding="utf-8"?>
+<p:sld xmlns:a="http://schemas.openxmlformats.org/drawingml/2006/main" xmlns:r="http://schemas.openxmlformats.org/officeDocument/2006/relationships" xmlns:p="http://schemas.openxmlformats.org/presentationml/2006/main">
+  <p:cSld>
+    <p:spTree>
+      <p:nvGrpSpPr>
+        <p:cNvPr id="1" name=""/>
+        <p:cNvGrpSpPr/>
+        <p:nvPr/>
+      </p:nvGrpSpPr>
+      <p:grpSpPr>
+        <a:xfrm>
+          <a:off x="0" y="0"/>
+          <a:ext cx="0" cy="0"/>
+          <a:chOff x="0" y="0"/>
+          <a:chExt cx="0" cy="0"/>
+        </a:xfrm>
+      </p:grpSpPr>
+      <p:pic>
+        <p:nvPicPr>
+          <p:cNvPr id="5" name="Imagen 4">
+            <a:extLst>
+              <a:ext uri="{FF2B5EF4-FFF2-40B4-BE49-F238E27FC236}">
+                <a16:creationId xmlns:a16="http://schemas.microsoft.com/office/drawing/2014/main" id="{843D6288-85C8-48E6-AD62-E9908017366E}"/>
+              </a:ext>
+            </a:extLst>
+          </p:cNvPr>
+          <p:cNvPicPr>
+            <a:picLocks noChangeAspect="1"/>
+          </p:cNvPicPr>
+          <p:nvPr/>
+        </p:nvPicPr>
+        <p:blipFill>
+          <a:blip r:embed="rId3"/>
+          <a:stretch>
+            <a:fillRect/>
+          </a:stretch>
+        </p:blipFill>
+        <p:spPr>
+          <a:xfrm>
+            <a:off x="1762662" y="624826"/>
+            <a:ext cx="8666676" cy="5608347"/>
+          </a:xfrm>
+          <a:prstGeom prst="rect">
+            <a:avLst/>
+          </a:prstGeom>
+        </p:spPr>
+      </p:pic>
+      <p:pic>
+        <p:nvPicPr>
+          <p:cNvPr id="3" name="Picture 2">
+            <a:extLst>
+              <a:ext uri="{FF2B5EF4-FFF2-40B4-BE49-F238E27FC236}">
+                <a16:creationId xmlns:a16="http://schemas.microsoft.com/office/drawing/2014/main" id="{2DF29C86-EBCB-4BE3-AE70-F9C09769FF29}"/>
+              </a:ext>
+            </a:extLst>
+          </p:cNvPr>
+          <p:cNvPicPr>
+            <a:picLocks noChangeAspect="1"/>
+          </p:cNvPicPr>
+          <p:nvPr/>
+        </p:nvPicPr>
+        <p:blipFill>
+          <a:blip r:embed="rId4"/>
+          <a:stretch>
+            <a:fillRect/>
+          </a:stretch>
+        </p:blipFill>
+        <p:spPr>
+          <a:xfrm>
+            <a:off x="6952228" y="6229262"/>
+            <a:ext cx="3477110" cy="628738"/>
+          </a:xfrm>
+          <a:prstGeom prst="rect">
+            <a:avLst/>
+          </a:prstGeom>
+        </p:spPr>
+      </p:pic>
+      <p:sp>
+        <p:nvSpPr>
+          <p:cNvPr id="6" name="TextBox 5">
+            <a:extLst>
+              <a:ext uri="{FF2B5EF4-FFF2-40B4-BE49-F238E27FC236}">
+                <a16:creationId xmlns:a16="http://schemas.microsoft.com/office/drawing/2014/main" id="{8630AC08-69D8-4056-AAEA-EC2593887D64}"/>
+              </a:ext>
+            </a:extLst>
+          </p:cNvPr>
+          <p:cNvSpPr txBox="1"/>
+          <p:nvPr/>
+        </p:nvSpPr>
+        <p:spPr>
+          <a:xfrm>
+            <a:off x="1762662" y="6360920"/>
+            <a:ext cx="1782667" cy="369332"/>
+          </a:xfrm>
+          <a:prstGeom prst="rect">
+            <a:avLst/>
+          </a:prstGeom>
+          <a:noFill/>
+        </p:spPr>
+        <p:txBody>
+          <a:bodyPr wrap="none" rtlCol="0">
+            <a:spAutoFit/>
+          </a:bodyPr>
+          <a:lstStyle/>
+          <a:p>
+            <a:pPr algn="ctr"/>
+            <a:r>
+              <a:rPr lang="en-US" dirty="0" err="1"/>
+              <a:t>Fecha</a:t>
+            </a:r>
+            <a:r>
+              <a:rPr lang="en-US" dirty="0"/>
+              <a:t>: 4/9/2021 </a:t>
+            </a:r>
+          </a:p>
+        </p:txBody>
+      </p:sp>
     </p:spTree>
     <p:extLst>
       <p:ext uri="{BB962C8B-B14F-4D97-AF65-F5344CB8AC3E}">
@@ -4825,8 +5693,78 @@
         </p:blipFill>
         <p:spPr>
           <a:xfrm>
-            <a:off x="1743603" y="643466"/>
+            <a:off x="1743603" y="426898"/>
             <a:ext cx="8704793" cy="5571067"/>
+          </a:xfrm>
+          <a:prstGeom prst="rect">
+            <a:avLst/>
+          </a:prstGeom>
+        </p:spPr>
+      </p:pic>
+      <p:sp>
+        <p:nvSpPr>
+          <p:cNvPr id="4" name="TextBox 3">
+            <a:extLst>
+              <a:ext uri="{FF2B5EF4-FFF2-40B4-BE49-F238E27FC236}">
+                <a16:creationId xmlns:a16="http://schemas.microsoft.com/office/drawing/2014/main" id="{9AB01C17-5E53-46D8-89C9-D822120F0184}"/>
+              </a:ext>
+            </a:extLst>
+          </p:cNvPr>
+          <p:cNvSpPr txBox="1"/>
+          <p:nvPr/>
+        </p:nvSpPr>
+        <p:spPr>
+          <a:xfrm>
+            <a:off x="1743603" y="6246436"/>
+            <a:ext cx="1899687" cy="369332"/>
+          </a:xfrm>
+          <a:prstGeom prst="rect">
+            <a:avLst/>
+          </a:prstGeom>
+          <a:noFill/>
+        </p:spPr>
+        <p:txBody>
+          <a:bodyPr wrap="none" rtlCol="0">
+            <a:spAutoFit/>
+          </a:bodyPr>
+          <a:lstStyle/>
+          <a:p>
+            <a:pPr algn="ctr"/>
+            <a:r>
+              <a:rPr lang="en-US" dirty="0" err="1"/>
+              <a:t>Fecha</a:t>
+            </a:r>
+            <a:r>
+              <a:rPr lang="en-US" dirty="0"/>
+              <a:t>: 28/9/2021 </a:t>
+            </a:r>
+          </a:p>
+        </p:txBody>
+      </p:sp>
+      <p:pic>
+        <p:nvPicPr>
+          <p:cNvPr id="6" name="Picture 5">
+            <a:extLst>
+              <a:ext uri="{FF2B5EF4-FFF2-40B4-BE49-F238E27FC236}">
+                <a16:creationId xmlns:a16="http://schemas.microsoft.com/office/drawing/2014/main" id="{6F3ABA3C-448C-4846-940A-59C980BA6583}"/>
+              </a:ext>
+            </a:extLst>
+          </p:cNvPr>
+          <p:cNvPicPr>
+            <a:picLocks noChangeAspect="1"/>
+          </p:cNvPicPr>
+          <p:nvPr/>
+        </p:nvPicPr>
+        <p:blipFill>
+          <a:blip r:embed="rId4"/>
+          <a:stretch>
+            <a:fillRect/>
+          </a:stretch>
+        </p:blipFill>
+        <p:spPr>
+          <a:xfrm>
+            <a:off x="6837917" y="5997965"/>
+            <a:ext cx="3610479" cy="819264"/>
           </a:xfrm>
           <a:prstGeom prst="rect">
             <a:avLst/>
@@ -4849,6 +5787,14 @@
 <file path=ppt/slides/slide3.xml><?xml version="1.0" encoding="utf-8"?>
 <p:sld xmlns:a="http://schemas.openxmlformats.org/drawingml/2006/main" xmlns:r="http://schemas.openxmlformats.org/officeDocument/2006/relationships" xmlns:p="http://schemas.openxmlformats.org/presentationml/2006/main">
   <p:cSld>
+    <p:bg>
+      <p:bgPr>
+        <a:solidFill>
+          <a:schemeClr val="bg1"/>
+        </a:solidFill>
+        <a:effectLst/>
+      </p:bgPr>
+    </p:bg>
     <p:spTree>
       <p:nvGrpSpPr>
         <p:cNvPr id="1" name=""/>
@@ -4865,10 +5811,10 @@
       </p:grpSpPr>
       <p:pic>
         <p:nvPicPr>
-          <p:cNvPr id="5" name="Imagen 4">
-            <a:extLst>
-              <a:ext uri="{FF2B5EF4-FFF2-40B4-BE49-F238E27FC236}">
-                <a16:creationId xmlns:a16="http://schemas.microsoft.com/office/drawing/2014/main" id="{B8C12871-577B-468F-8E9A-8E3A0F3FE046}"/>
+          <p:cNvPr id="5" name="Picture 4">
+            <a:extLst>
+              <a:ext uri="{FF2B5EF4-FFF2-40B4-BE49-F238E27FC236}">
+                <a16:creationId xmlns:a16="http://schemas.microsoft.com/office/drawing/2014/main" id="{0F6F4AA0-F203-4498-B77D-3C862A2E3B80}"/>
               </a:ext>
             </a:extLst>
           </p:cNvPr>
@@ -4878,15 +5824,15 @@
           <p:nvPr/>
         </p:nvPicPr>
         <p:blipFill>
-          <a:blip r:embed="rId3"/>
+          <a:blip r:embed="rId2"/>
           <a:stretch>
             <a:fillRect/>
           </a:stretch>
         </p:blipFill>
         <p:spPr>
           <a:xfrm>
-            <a:off x="1189940" y="666364"/>
-            <a:ext cx="9812119" cy="5525271"/>
+            <a:off x="1077020" y="643466"/>
+            <a:ext cx="10037959" cy="5571067"/>
           </a:xfrm>
           <a:prstGeom prst="rect">
             <a:avLst/>
@@ -4896,7 +5842,7 @@
     </p:spTree>
     <p:extLst>
       <p:ext uri="{BB962C8B-B14F-4D97-AF65-F5344CB8AC3E}">
-        <p14:creationId xmlns:p14="http://schemas.microsoft.com/office/powerpoint/2010/main" val="2879469989"/>
+        <p14:creationId xmlns:p14="http://schemas.microsoft.com/office/powerpoint/2010/main" val="4194608646"/>
       </p:ext>
     </p:extLst>
   </p:cSld>
@@ -4909,6 +5855,14 @@
 <file path=ppt/slides/slide4.xml><?xml version="1.0" encoding="utf-8"?>
 <p:sld xmlns:a="http://schemas.openxmlformats.org/drawingml/2006/main" xmlns:r="http://schemas.openxmlformats.org/officeDocument/2006/relationships" xmlns:p="http://schemas.openxmlformats.org/presentationml/2006/main">
   <p:cSld>
+    <p:bg>
+      <p:bgPr>
+        <a:solidFill>
+          <a:schemeClr val="bg1"/>
+        </a:solidFill>
+        <a:effectLst/>
+      </p:bgPr>
+    </p:bg>
     <p:spTree>
       <p:nvGrpSpPr>
         <p:cNvPr id="1" name=""/>
@@ -4925,10 +5879,10 @@
       </p:grpSpPr>
       <p:pic>
         <p:nvPicPr>
-          <p:cNvPr id="5" name="Imagen 4">
-            <a:extLst>
-              <a:ext uri="{FF2B5EF4-FFF2-40B4-BE49-F238E27FC236}">
-                <a16:creationId xmlns:a16="http://schemas.microsoft.com/office/drawing/2014/main" id="{290A1FEA-22F5-4D71-9400-5C20FD52773C}"/>
+          <p:cNvPr id="5" name="Picture 4">
+            <a:extLst>
+              <a:ext uri="{FF2B5EF4-FFF2-40B4-BE49-F238E27FC236}">
+                <a16:creationId xmlns:a16="http://schemas.microsoft.com/office/drawing/2014/main" id="{36E50AB6-A36C-49C4-8E3C-3906DE964E8B}"/>
               </a:ext>
             </a:extLst>
           </p:cNvPr>
@@ -4938,15 +5892,15 @@
           <p:nvPr/>
         </p:nvPicPr>
         <p:blipFill>
-          <a:blip r:embed="rId3"/>
+          <a:blip r:embed="rId2"/>
           <a:stretch>
             <a:fillRect/>
           </a:stretch>
         </p:blipFill>
         <p:spPr>
           <a:xfrm>
-            <a:off x="1080387" y="675891"/>
-            <a:ext cx="10031225" cy="5506218"/>
+            <a:off x="1230438" y="643466"/>
+            <a:ext cx="9731123" cy="5571067"/>
           </a:xfrm>
           <a:prstGeom prst="rect">
             <a:avLst/>
@@ -4956,7 +5910,7 @@
     </p:spTree>
     <p:extLst>
       <p:ext uri="{BB962C8B-B14F-4D97-AF65-F5344CB8AC3E}">
-        <p14:creationId xmlns:p14="http://schemas.microsoft.com/office/powerpoint/2010/main" val="4112933987"/>
+        <p14:creationId xmlns:p14="http://schemas.microsoft.com/office/powerpoint/2010/main" val="3922610053"/>
       </p:ext>
     </p:extLst>
   </p:cSld>
@@ -4969,6 +5923,82 @@
 <file path=ppt/slides/slide5.xml><?xml version="1.0" encoding="utf-8"?>
 <p:sld xmlns:a="http://schemas.openxmlformats.org/drawingml/2006/main" xmlns:r="http://schemas.openxmlformats.org/officeDocument/2006/relationships" xmlns:p="http://schemas.openxmlformats.org/presentationml/2006/main">
   <p:cSld>
+    <p:bg>
+      <p:bgPr>
+        <a:solidFill>
+          <a:schemeClr val="bg1"/>
+        </a:solidFill>
+        <a:effectLst/>
+      </p:bgPr>
+    </p:bg>
+    <p:spTree>
+      <p:nvGrpSpPr>
+        <p:cNvPr id="1" name=""/>
+        <p:cNvGrpSpPr/>
+        <p:nvPr/>
+      </p:nvGrpSpPr>
+      <p:grpSpPr>
+        <a:xfrm>
+          <a:off x="0" y="0"/>
+          <a:ext cx="0" cy="0"/>
+          <a:chOff x="0" y="0"/>
+          <a:chExt cx="0" cy="0"/>
+        </a:xfrm>
+      </p:grpSpPr>
+      <p:pic>
+        <p:nvPicPr>
+          <p:cNvPr id="5" name="Picture 4">
+            <a:extLst>
+              <a:ext uri="{FF2B5EF4-FFF2-40B4-BE49-F238E27FC236}">
+                <a16:creationId xmlns:a16="http://schemas.microsoft.com/office/drawing/2014/main" id="{7D9E89E5-94D5-4BA6-B366-003B008CA87B}"/>
+              </a:ext>
+            </a:extLst>
+          </p:cNvPr>
+          <p:cNvPicPr>
+            <a:picLocks noChangeAspect="1"/>
+          </p:cNvPicPr>
+          <p:nvPr/>
+        </p:nvPicPr>
+        <p:blipFill>
+          <a:blip r:embed="rId2"/>
+          <a:stretch>
+            <a:fillRect/>
+          </a:stretch>
+        </p:blipFill>
+        <p:spPr>
+          <a:xfrm>
+            <a:off x="2044315" y="643466"/>
+            <a:ext cx="8103369" cy="5571067"/>
+          </a:xfrm>
+          <a:prstGeom prst="rect">
+            <a:avLst/>
+          </a:prstGeom>
+        </p:spPr>
+      </p:pic>
+    </p:spTree>
+    <p:extLst>
+      <p:ext uri="{BB962C8B-B14F-4D97-AF65-F5344CB8AC3E}">
+        <p14:creationId xmlns:p14="http://schemas.microsoft.com/office/powerpoint/2010/main" val="269114780"/>
+      </p:ext>
+    </p:extLst>
+  </p:cSld>
+  <p:clrMapOvr>
+    <a:masterClrMapping/>
+  </p:clrMapOvr>
+</p:sld>
+</file>
+
+<file path=ppt/slides/slide6.xml><?xml version="1.0" encoding="utf-8"?>
+<p:sld xmlns:a="http://schemas.openxmlformats.org/drawingml/2006/main" xmlns:r="http://schemas.openxmlformats.org/officeDocument/2006/relationships" xmlns:p="http://schemas.openxmlformats.org/presentationml/2006/main">
+  <p:cSld>
+    <p:bg>
+      <p:bgPr>
+        <a:solidFill>
+          <a:schemeClr val="bg1"/>
+        </a:solidFill>
+        <a:effectLst/>
+      </p:bgPr>
+    </p:bg>
     <p:spTree>
       <p:nvGrpSpPr>
         <p:cNvPr id="1" name=""/>
@@ -4988,7 +6018,7 @@
           <p:cNvPr id="7" name="Picture 6">
             <a:extLst>
               <a:ext uri="{FF2B5EF4-FFF2-40B4-BE49-F238E27FC236}">
-                <a16:creationId xmlns:a16="http://schemas.microsoft.com/office/drawing/2014/main" id="{62D95D31-32D0-42F8-9EE7-07F76C09B7C6}"/>
+                <a16:creationId xmlns:a16="http://schemas.microsoft.com/office/drawing/2014/main" id="{2E6FF707-CC9E-406E-AF09-0275648285FC}"/>
               </a:ext>
             </a:extLst>
           </p:cNvPr>
@@ -4998,15 +6028,15 @@
           <p:nvPr/>
         </p:nvPicPr>
         <p:blipFill>
-          <a:blip r:embed="rId3"/>
+          <a:blip r:embed="rId2"/>
           <a:stretch>
             <a:fillRect/>
           </a:stretch>
         </p:blipFill>
         <p:spPr>
           <a:xfrm>
-            <a:off x="170820" y="1151706"/>
-            <a:ext cx="11850360" cy="4554587"/>
+            <a:off x="4249112" y="0"/>
+            <a:ext cx="3693775" cy="6858000"/>
           </a:xfrm>
           <a:prstGeom prst="rect">
             <a:avLst/>
@@ -5016,7 +6046,7 @@
     </p:spTree>
     <p:extLst>
       <p:ext uri="{BB962C8B-B14F-4D97-AF65-F5344CB8AC3E}">
-        <p14:creationId xmlns:p14="http://schemas.microsoft.com/office/powerpoint/2010/main" val="2223719436"/>
+        <p14:creationId xmlns:p14="http://schemas.microsoft.com/office/powerpoint/2010/main" val="3248619751"/>
       </p:ext>
     </p:extLst>
   </p:cSld>
@@ -5026,9 +6056,17 @@
 </p:sld>
 </file>
 
-<file path=ppt/slides/slide6.xml><?xml version="1.0" encoding="utf-8"?>
+<file path=ppt/slides/slide7.xml><?xml version="1.0" encoding="utf-8"?>
 <p:sld xmlns:a="http://schemas.openxmlformats.org/drawingml/2006/main" xmlns:r="http://schemas.openxmlformats.org/officeDocument/2006/relationships" xmlns:p="http://schemas.openxmlformats.org/presentationml/2006/main">
   <p:cSld>
+    <p:bg>
+      <p:bgPr>
+        <a:solidFill>
+          <a:schemeClr val="bg1"/>
+        </a:solidFill>
+        <a:effectLst/>
+      </p:bgPr>
+    </p:bg>
     <p:spTree>
       <p:nvGrpSpPr>
         <p:cNvPr id="1" name=""/>
@@ -5045,10 +6083,10 @@
       </p:grpSpPr>
       <p:pic>
         <p:nvPicPr>
-          <p:cNvPr id="5" name="Imagen 4">
-            <a:extLst>
-              <a:ext uri="{FF2B5EF4-FFF2-40B4-BE49-F238E27FC236}">
-                <a16:creationId xmlns:a16="http://schemas.microsoft.com/office/drawing/2014/main" id="{7D904D1D-04FD-4F84-B92D-821D6435798E}"/>
+          <p:cNvPr id="7" name="Picture 6">
+            <a:extLst>
+              <a:ext uri="{FF2B5EF4-FFF2-40B4-BE49-F238E27FC236}">
+                <a16:creationId xmlns:a16="http://schemas.microsoft.com/office/drawing/2014/main" id="{B43837CF-E93D-4A40-928E-B00C0A4358BD}"/>
               </a:ext>
             </a:extLst>
           </p:cNvPr>
@@ -5058,15 +6096,15 @@
           <p:nvPr/>
         </p:nvPicPr>
         <p:blipFill>
-          <a:blip r:embed="rId3"/>
+          <a:blip r:embed="rId2"/>
           <a:stretch>
             <a:fillRect/>
           </a:stretch>
         </p:blipFill>
         <p:spPr>
           <a:xfrm>
-            <a:off x="1199466" y="1066470"/>
-            <a:ext cx="9793067" cy="4725059"/>
+            <a:off x="889396" y="643466"/>
+            <a:ext cx="10413207" cy="5571067"/>
           </a:xfrm>
           <a:prstGeom prst="rect">
             <a:avLst/>
@@ -5076,67 +6114,7 @@
     </p:spTree>
     <p:extLst>
       <p:ext uri="{BB962C8B-B14F-4D97-AF65-F5344CB8AC3E}">
-        <p14:creationId xmlns:p14="http://schemas.microsoft.com/office/powerpoint/2010/main" val="2087786723"/>
-      </p:ext>
-    </p:extLst>
-  </p:cSld>
-  <p:clrMapOvr>
-    <a:masterClrMapping/>
-  </p:clrMapOvr>
-</p:sld>
-</file>
-
-<file path=ppt/slides/slide7.xml><?xml version="1.0" encoding="utf-8"?>
-<p:sld xmlns:a="http://schemas.openxmlformats.org/drawingml/2006/main" xmlns:r="http://schemas.openxmlformats.org/officeDocument/2006/relationships" xmlns:p="http://schemas.openxmlformats.org/presentationml/2006/main">
-  <p:cSld>
-    <p:spTree>
-      <p:nvGrpSpPr>
-        <p:cNvPr id="1" name=""/>
-        <p:cNvGrpSpPr/>
-        <p:nvPr/>
-      </p:nvGrpSpPr>
-      <p:grpSpPr>
-        <a:xfrm>
-          <a:off x="0" y="0"/>
-          <a:ext cx="0" cy="0"/>
-          <a:chOff x="0" y="0"/>
-          <a:chExt cx="0" cy="0"/>
-        </a:xfrm>
-      </p:grpSpPr>
-      <p:pic>
-        <p:nvPicPr>
-          <p:cNvPr id="5" name="Imagen 4">
-            <a:extLst>
-              <a:ext uri="{FF2B5EF4-FFF2-40B4-BE49-F238E27FC236}">
-                <a16:creationId xmlns:a16="http://schemas.microsoft.com/office/drawing/2014/main" id="{6AA6B252-525A-4612-8972-9442646E2AEA}"/>
-              </a:ext>
-            </a:extLst>
-          </p:cNvPr>
-          <p:cNvPicPr>
-            <a:picLocks noChangeAspect="1"/>
-          </p:cNvPicPr>
-          <p:nvPr/>
-        </p:nvPicPr>
-        <p:blipFill>
-          <a:blip r:embed="rId3"/>
-          <a:stretch>
-            <a:fillRect/>
-          </a:stretch>
-        </p:blipFill>
-        <p:spPr>
-          <a:xfrm>
-            <a:off x="1213756" y="1066470"/>
-            <a:ext cx="9764488" cy="4725059"/>
-          </a:xfrm>
-          <a:prstGeom prst="rect">
-            <a:avLst/>
-          </a:prstGeom>
-        </p:spPr>
-      </p:pic>
-    </p:spTree>
-    <p:extLst>
-      <p:ext uri="{BB962C8B-B14F-4D97-AF65-F5344CB8AC3E}">
-        <p14:creationId xmlns:p14="http://schemas.microsoft.com/office/powerpoint/2010/main" val="599276603"/>
+        <p14:creationId xmlns:p14="http://schemas.microsoft.com/office/powerpoint/2010/main" val="3311834576"/>
       </p:ext>
     </p:extLst>
   </p:cSld>
@@ -5171,145 +6149,12 @@
           <a:chExt cx="0" cy="0"/>
         </a:xfrm>
       </p:grpSpPr>
-      <p:sp>
-        <p:nvSpPr>
-          <p:cNvPr id="10" name="Rectangle 9">
-            <a:extLst>
-              <a:ext uri="{FF2B5EF4-FFF2-40B4-BE49-F238E27FC236}">
-                <a16:creationId xmlns:a16="http://schemas.microsoft.com/office/drawing/2014/main" id="{01D0AF59-99C3-4251-AB9A-C966C6AD4400}"/>
-              </a:ext>
-              <a:ext uri="{C183D7F6-B498-43B3-948B-1728B52AA6E4}">
-                <adec:decorative xmlns:adec="http://schemas.microsoft.com/office/drawing/2017/decorative" val="1"/>
-              </a:ext>
-            </a:extLst>
-          </p:cNvPr>
-          <p:cNvSpPr>
-            <a:spLocks noGrp="1" noRot="1" noChangeAspect="1" noMove="1" noResize="1" noEditPoints="1" noAdjustHandles="1" noChangeArrowheads="1" noChangeShapeType="1" noTextEdit="1"/>
-          </p:cNvSpPr>
-          <p:nvPr>
-            <p:extLst>
-              <p:ext uri="{386F3935-93C4-4BCD-93E2-E3B085C9AB24}">
-                <p16:designElem xmlns:p16="http://schemas.microsoft.com/office/powerpoint/2015/main" val="1"/>
-              </p:ext>
-            </p:extLst>
-          </p:nvPr>
-        </p:nvSpPr>
-        <p:spPr>
-          <a:xfrm>
-            <a:off x="0" y="0"/>
-            <a:ext cx="12192000" cy="6858000"/>
-          </a:xfrm>
-          <a:prstGeom prst="rect">
-            <a:avLst/>
-          </a:prstGeom>
-          <a:solidFill>
-            <a:schemeClr val="bg2"/>
-          </a:solidFill>
-          <a:ln>
-            <a:noFill/>
-          </a:ln>
-        </p:spPr>
-        <p:style>
-          <a:lnRef idx="2">
-            <a:schemeClr val="accent1">
-              <a:shade val="50000"/>
-            </a:schemeClr>
-          </a:lnRef>
-          <a:fillRef idx="1">
-            <a:schemeClr val="accent1"/>
-          </a:fillRef>
-          <a:effectRef idx="0">
-            <a:schemeClr val="accent1"/>
-          </a:effectRef>
-          <a:fontRef idx="minor">
-            <a:schemeClr val="lt1"/>
-          </a:fontRef>
-        </p:style>
-        <p:txBody>
-          <a:bodyPr rtlCol="0" anchor="ctr"/>
-          <a:lstStyle/>
-          <a:p>
-            <a:pPr algn="ctr"/>
-            <a:endParaRPr lang="en-US"/>
-          </a:p>
-        </p:txBody>
-      </p:sp>
-      <p:sp>
-        <p:nvSpPr>
-          <p:cNvPr id="12" name="Rectangle 11">
-            <a:extLst>
-              <a:ext uri="{FF2B5EF4-FFF2-40B4-BE49-F238E27FC236}">
-                <a16:creationId xmlns:a16="http://schemas.microsoft.com/office/drawing/2014/main" id="{1855405F-37A2-4869-9154-F8BE3BECE6C3}"/>
-              </a:ext>
-              <a:ext uri="{C183D7F6-B498-43B3-948B-1728B52AA6E4}">
-                <adec:decorative xmlns:adec="http://schemas.microsoft.com/office/drawing/2017/decorative" val="1"/>
-              </a:ext>
-            </a:extLst>
-          </p:cNvPr>
-          <p:cNvSpPr>
-            <a:spLocks noGrp="1" noRot="1" noChangeAspect="1" noMove="1" noResize="1" noEditPoints="1" noAdjustHandles="1" noChangeArrowheads="1" noChangeShapeType="1" noTextEdit="1"/>
-          </p:cNvSpPr>
-          <p:nvPr>
-            <p:extLst>
-              <p:ext uri="{386F3935-93C4-4BCD-93E2-E3B085C9AB24}">
-                <p16:designElem xmlns:p16="http://schemas.microsoft.com/office/powerpoint/2015/main" val="1"/>
-              </p:ext>
-            </p:extLst>
-          </p:nvPr>
-        </p:nvSpPr>
-        <p:spPr>
-          <a:xfrm>
-            <a:off x="477012" y="480060"/>
-            <a:ext cx="11237976" cy="5897880"/>
-          </a:xfrm>
-          <a:prstGeom prst="rect">
-            <a:avLst/>
-          </a:prstGeom>
-          <a:solidFill>
-            <a:srgbClr val="FFFFFF"/>
-          </a:solidFill>
-          <a:ln w="9525">
-            <a:noFill/>
-          </a:ln>
-          <a:effectLst>
-            <a:outerShdw blurRad="63500" dist="17780" dir="5400000" algn="t" rotWithShape="0">
-              <a:prstClr val="black">
-                <a:alpha val="43000"/>
-              </a:prstClr>
-            </a:outerShdw>
-          </a:effectLst>
-        </p:spPr>
-        <p:style>
-          <a:lnRef idx="2">
-            <a:schemeClr val="accent1">
-              <a:shade val="50000"/>
-            </a:schemeClr>
-          </a:lnRef>
-          <a:fillRef idx="1">
-            <a:schemeClr val="accent1"/>
-          </a:fillRef>
-          <a:effectRef idx="0">
-            <a:schemeClr val="accent1"/>
-          </a:effectRef>
-          <a:fontRef idx="minor">
-            <a:schemeClr val="lt1"/>
-          </a:fontRef>
-        </p:style>
-        <p:txBody>
-          <a:bodyPr rtlCol="0" anchor="ctr"/>
-          <a:lstStyle/>
-          <a:p>
-            <a:pPr algn="ctr"/>
-            <a:endParaRPr lang="en-US"/>
-          </a:p>
-        </p:txBody>
-      </p:sp>
       <p:pic>
         <p:nvPicPr>
           <p:cNvPr id="5" name="Picture 4">
             <a:extLst>
               <a:ext uri="{FF2B5EF4-FFF2-40B4-BE49-F238E27FC236}">
-                <a16:creationId xmlns:a16="http://schemas.microsoft.com/office/drawing/2014/main" id="{12A0EB7B-F21F-441D-8004-95D2A699BF17}"/>
+                <a16:creationId xmlns:a16="http://schemas.microsoft.com/office/drawing/2014/main" id="{BFF32E9D-6975-4457-948F-16E3E41A5312}"/>
               </a:ext>
             </a:extLst>
           </p:cNvPr>
@@ -5319,15 +6164,15 @@
           <p:nvPr/>
         </p:nvPicPr>
         <p:blipFill>
-          <a:blip r:embed="rId3"/>
+          <a:blip r:embed="rId2"/>
           <a:stretch>
             <a:fillRect/>
           </a:stretch>
         </p:blipFill>
         <p:spPr>
           <a:xfrm>
-            <a:off x="1121834" y="643467"/>
-            <a:ext cx="9948331" cy="5571066"/>
+            <a:off x="1165851" y="643466"/>
+            <a:ext cx="9860298" cy="5571067"/>
           </a:xfrm>
           <a:prstGeom prst="rect">
             <a:avLst/>
@@ -5337,7 +6182,7 @@
     </p:spTree>
     <p:extLst>
       <p:ext uri="{BB962C8B-B14F-4D97-AF65-F5344CB8AC3E}">
-        <p14:creationId xmlns:p14="http://schemas.microsoft.com/office/powerpoint/2010/main" val="1830856166"/>
+        <p14:creationId xmlns:p14="http://schemas.microsoft.com/office/powerpoint/2010/main" val="1344811141"/>
       </p:ext>
     </p:extLst>
   </p:cSld>
@@ -5369,7 +6214,7 @@
           <p:cNvPr id="5" name="Imagen 4">
             <a:extLst>
               <a:ext uri="{FF2B5EF4-FFF2-40B4-BE49-F238E27FC236}">
-                <a16:creationId xmlns:a16="http://schemas.microsoft.com/office/drawing/2014/main" id="{8213E0A6-FABD-45B3-928A-6CADFC0879F2}"/>
+                <a16:creationId xmlns:a16="http://schemas.microsoft.com/office/drawing/2014/main" id="{B8C12871-577B-468F-8E9A-8E3A0F3FE046}"/>
               </a:ext>
             </a:extLst>
           </p:cNvPr>
@@ -5379,15 +6224,85 @@
           <p:nvPr/>
         </p:nvPicPr>
         <p:blipFill>
-          <a:blip r:embed="rId2"/>
+          <a:blip r:embed="rId3"/>
           <a:stretch>
             <a:fillRect/>
           </a:stretch>
         </p:blipFill>
         <p:spPr>
           <a:xfrm>
-            <a:off x="1027992" y="380574"/>
-            <a:ext cx="10136015" cy="6096851"/>
+            <a:off x="1189940" y="509953"/>
+            <a:ext cx="9812119" cy="5525271"/>
+          </a:xfrm>
+          <a:prstGeom prst="rect">
+            <a:avLst/>
+          </a:prstGeom>
+        </p:spPr>
+      </p:pic>
+      <p:sp>
+        <p:nvSpPr>
+          <p:cNvPr id="3" name="TextBox 2">
+            <a:extLst>
+              <a:ext uri="{FF2B5EF4-FFF2-40B4-BE49-F238E27FC236}">
+                <a16:creationId xmlns:a16="http://schemas.microsoft.com/office/drawing/2014/main" id="{BA4C420B-91C2-4F53-A859-3116DBF4E3AF}"/>
+              </a:ext>
+            </a:extLst>
+          </p:cNvPr>
+          <p:cNvSpPr txBox="1"/>
+          <p:nvPr/>
+        </p:nvSpPr>
+        <p:spPr>
+          <a:xfrm>
+            <a:off x="1189940" y="6258468"/>
+            <a:ext cx="1899687" cy="369332"/>
+          </a:xfrm>
+          <a:prstGeom prst="rect">
+            <a:avLst/>
+          </a:prstGeom>
+          <a:noFill/>
+        </p:spPr>
+        <p:txBody>
+          <a:bodyPr wrap="none" rtlCol="0">
+            <a:spAutoFit/>
+          </a:bodyPr>
+          <a:lstStyle/>
+          <a:p>
+            <a:pPr algn="ctr"/>
+            <a:r>
+              <a:rPr lang="en-US" dirty="0" err="1"/>
+              <a:t>Fecha</a:t>
+            </a:r>
+            <a:r>
+              <a:rPr lang="en-US" dirty="0"/>
+              <a:t>: 28/9/2021 </a:t>
+            </a:r>
+          </a:p>
+        </p:txBody>
+      </p:sp>
+      <p:pic>
+        <p:nvPicPr>
+          <p:cNvPr id="7" name="Picture 6">
+            <a:extLst>
+              <a:ext uri="{FF2B5EF4-FFF2-40B4-BE49-F238E27FC236}">
+                <a16:creationId xmlns:a16="http://schemas.microsoft.com/office/drawing/2014/main" id="{2858D81D-76B3-4A30-A2A1-DA38974839D0}"/>
+              </a:ext>
+            </a:extLst>
+          </p:cNvPr>
+          <p:cNvPicPr>
+            <a:picLocks noChangeAspect="1"/>
+          </p:cNvPicPr>
+          <p:nvPr/>
+        </p:nvPicPr>
+        <p:blipFill>
+          <a:blip r:embed="rId4"/>
+          <a:stretch>
+            <a:fillRect/>
+          </a:stretch>
+        </p:blipFill>
+        <p:spPr>
+          <a:xfrm>
+            <a:off x="7439212" y="6114475"/>
+            <a:ext cx="3562847" cy="657317"/>
           </a:xfrm>
           <a:prstGeom prst="rect">
             <a:avLst/>
@@ -5397,7 +6312,7 @@
     </p:spTree>
     <p:extLst>
       <p:ext uri="{BB962C8B-B14F-4D97-AF65-F5344CB8AC3E}">
-        <p14:creationId xmlns:p14="http://schemas.microsoft.com/office/powerpoint/2010/main" val="1146657534"/>
+        <p14:creationId xmlns:p14="http://schemas.microsoft.com/office/powerpoint/2010/main" val="2879469989"/>
       </p:ext>
     </p:extLst>
   </p:cSld>

</xml_diff>